<commit_message>
NavMesh Agent Tutorial Renewal
- Designed to automatically move
  The movement of the NavMesh
  Agent to a specific area without
  Moving the mouse

- Update Mouse Function ppt Data

- Adding and deleting resource data
</commit_message>
<xml_diff>
--- a/Assets/Class/Mouse Function/PPT Data/Mouse Example.pptx
+++ b/Assets/Class/Mouse Function/PPT Data/Mouse Example.pptx
@@ -2,7 +2,7 @@
 <file path=ppt/presentation.xml><?xml version="1.0" encoding="utf-8"?>
 <p:presentation xmlns:a="http://schemas.openxmlformats.org/drawingml/2006/main" xmlns:r="http://schemas.openxmlformats.org/officeDocument/2006/relationships" xmlns:p="http://schemas.openxmlformats.org/presentationml/2006/main" xmlns:p14="http://schemas.microsoft.com/office/powerpoint/2010/main" saveSubsetFonts="1" firstSlideNum="0">
   <p:sldMasterIdLst>
-    <p:sldMasterId id="2147485448" r:id="rId12"/>
+    <p:sldMasterId id="2147485483" r:id="rId12"/>
   </p:sldMasterIdLst>
   <p:notesMasterIdLst>
     <p:notesMasterId r:id="rId14"/>
@@ -14,8 +14,9 @@
     <p:sldId id="280" r:id="rId19"/>
     <p:sldId id="281" r:id="rId20"/>
     <p:sldId id="283" r:id="rId21"/>
-    <p:sldId id="282" r:id="rId22"/>
-    <p:sldId id="284" r:id="rId23"/>
+    <p:sldId id="285" r:id="rId22"/>
+    <p:sldId id="282" r:id="rId23"/>
+    <p:sldId id="284" r:id="rId24"/>
   </p:sldIdLst>
   <p:sldSz cx="12192000" cy="6858000"/>
   <p:notesSz cx="6858000" cy="9144000"/>
@@ -5684,7 +5685,7 @@
       </p:sp>
       <p:pic>
         <p:nvPicPr>
-          <p:cNvPr id="28" name="그림 9" descr="C:/Users/Admin1/AppData/Roaming/PolarisOffice/ETemp/16636_18866920/fImage16105616500.png"/>
+          <p:cNvPr id="28" name="그림 9"/>
           <p:cNvPicPr>
             <a:picLocks noChangeAspect="1"/>
           </p:cNvPicPr>
@@ -5750,7 +5751,7 @@
       </p:cxnSp>
       <p:pic>
         <p:nvPicPr>
-          <p:cNvPr id="39" name="그림 4" descr="C:/Users/Admin1/AppData/Roaming/PolarisOffice/ETemp/16636_18866920/fImage202511141.png"/>
+          <p:cNvPr id="39" name="그림 4"/>
           <p:cNvPicPr>
             <a:picLocks noChangeAspect="1"/>
           </p:cNvPicPr>
@@ -5781,7 +5782,7 @@
       </p:pic>
       <p:pic>
         <p:nvPicPr>
-          <p:cNvPr id="40" name="그림 21" descr="C:/Users/Admin1/AppData/Roaming/PolarisOffice/ETemp/16636_18866920/fImage159531218467.png"/>
+          <p:cNvPr id="40" name="그림 21"/>
           <p:cNvPicPr>
             <a:picLocks noChangeAspect="1"/>
           </p:cNvPicPr>
@@ -5812,7 +5813,7 @@
       </p:pic>
       <p:pic>
         <p:nvPicPr>
-          <p:cNvPr id="41" name="그림 22" descr="C:/Users/Admin1/AppData/Roaming/PolarisOffice/ETemp/16636_18866920/fImage46921226334.png"/>
+          <p:cNvPr id="41" name="그림 22"/>
           <p:cNvPicPr>
             <a:picLocks noChangeAspect="1"/>
           </p:cNvPicPr>
@@ -5843,7 +5844,7 @@
       </p:pic>
       <p:pic>
         <p:nvPicPr>
-          <p:cNvPr id="42" name="그림 25" descr="C:/Users/Admin1/AppData/Roaming/PolarisOffice/ETemp/16636_18866920/fImage54631236500.png"/>
+          <p:cNvPr id="42" name="그림 25"/>
           <p:cNvPicPr>
             <a:picLocks noChangeAspect="1"/>
           </p:cNvPicPr>
@@ -5972,8 +5973,8 @@
         </p:nvSpPr>
         <p:spPr>
           <a:xfrm rot="0">
-            <a:off x="6833870" y="4367530"/>
-            <a:ext cx="4110990" cy="1815465"/>
+            <a:off x="6824980" y="4367530"/>
+            <a:ext cx="4129405" cy="1815465"/>
           </a:xfrm>
           <a:prstGeom prst="rect"/>
           <a:noFill/>
@@ -6017,43 +6018,18 @@
                 <a:latin typeface="맑은 고딕" charset="0"/>
                 <a:ea typeface="맑은 고딕" charset="0"/>
               </a:rPr>
-              <a:t>이제</a:t>
-            </a:r>
-            <a:r>
-              <a:rPr lang="ko-KR" sz="1800">
-                <a:latin typeface="맑은 고딕" charset="0"/>
-                <a:ea typeface="맑은 고딕" charset="0"/>
-              </a:rPr>
-              <a:t> Zoom 스크립트에서 Camera </a:t>
-            </a:r>
-            <a:r>
-              <a:rPr lang="ko-KR" sz="1800">
-                <a:latin typeface="맑은 고딕" charset="0"/>
-                <a:ea typeface="맑은 고딕" charset="0"/>
-              </a:rPr>
-              <a:t>변수</a:t>
-            </a:r>
-            <a:r>
-              <a:rPr lang="ko-KR" sz="1800">
-                <a:latin typeface="맑은 고딕" charset="0"/>
-                <a:ea typeface="맑은 고딕" charset="0"/>
-              </a:rPr>
-              <a:t>를 </a:t>
-            </a:r>
-            <a:r>
-              <a:rPr lang="ko-KR" sz="1800">
-                <a:latin typeface="맑은 고딕" charset="0"/>
-                <a:ea typeface="맑은 고딕" charset="0"/>
-              </a:rPr>
-              <a:t>선언합니다</a:t>
-            </a:r>
-            <a:r>
-              <a:rPr lang="ko-KR" sz="1800">
-                <a:latin typeface="맑은 고딕" charset="0"/>
-                <a:ea typeface="맑은 고딕" charset="0"/>
-              </a:rPr>
-              <a:t>.</a:t>
-            </a:r>
+              <a:t>이제 Zoom 스크립트에서 Camera 변수를 선언합니다.</a:t>
+            </a:r>
+            <a:endParaRPr lang="ko-KR" altLang="en-US" sz="1800">
+              <a:latin typeface="맑은 고딕" charset="0"/>
+              <a:ea typeface="맑은 고딕" charset="0"/>
+            </a:endParaRPr>
+          </a:p>
+          <a:p>
+            <a:pPr marL="0" indent="0" rtl="0" algn="l" defTabSz="914400" eaLnBrk="1" latinLnBrk="0" hangingPunct="1">
+              <a:buFontTx/>
+              <a:buNone/>
+            </a:pPr>
             <a:endParaRPr lang="ko-KR" altLang="en-US" sz="2000" b="1">
               <a:solidFill>
                 <a:srgbClr val="0611F2"/>
@@ -6067,74 +6043,12 @@
               <a:buFontTx/>
               <a:buNone/>
             </a:pPr>
-            <a:endParaRPr lang="ko-KR" altLang="en-US" sz="2000" b="1">
-              <a:solidFill>
-                <a:srgbClr val="0611F2"/>
-              </a:solidFill>
-              <a:latin typeface="맑은 고딕" charset="0"/>
-              <a:ea typeface="맑은 고딕" charset="0"/>
-            </a:endParaRPr>
-          </a:p>
-          <a:p>
-            <a:pPr marL="0" indent="0" rtl="0" algn="l" defTabSz="914400" eaLnBrk="1" latinLnBrk="0" hangingPunct="1">
-              <a:buFontTx/>
-              <a:buNone/>
-            </a:pPr>
             <a:r>
               <a:rPr lang="ko-KR" sz="1800">
                 <a:latin typeface="맑은 고딕" charset="0"/>
                 <a:ea typeface="맑은 고딕" charset="0"/>
               </a:rPr>
-              <a:t>그리고</a:t>
-            </a:r>
-            <a:r>
-              <a:rPr lang="ko-KR" sz="1800">
-                <a:latin typeface="맑은 고딕" charset="0"/>
-                <a:ea typeface="맑은 고딕" charset="0"/>
-              </a:rPr>
-              <a:t> Update( ) 함수에서 마우스</a:t>
-            </a:r>
-            <a:r>
-              <a:rPr lang="ko-KR" sz="1800">
-                <a:latin typeface="맑은 고딕" charset="0"/>
-                <a:ea typeface="맑은 고딕" charset="0"/>
-              </a:rPr>
-              <a:t> 입력 값을</a:t>
-            </a:r>
-            <a:r>
-              <a:rPr lang="ko-KR" sz="1800">
-                <a:latin typeface="맑은 고딕" charset="0"/>
-                <a:ea typeface="맑은 고딕" charset="0"/>
-              </a:rPr>
-              <a:t> </a:t>
-            </a:r>
-            <a:r>
-              <a:rPr lang="ko-KR" sz="1800">
-                <a:latin typeface="맑은 고딕" charset="0"/>
-                <a:ea typeface="맑은 고딕" charset="0"/>
-              </a:rPr>
-              <a:t>카메라의 </a:t>
-            </a:r>
-            <a:r>
-              <a:rPr lang="ko-KR" sz="1800">
-                <a:latin typeface="맑은 고딕" charset="0"/>
-                <a:ea typeface="맑은 고딕" charset="0"/>
-              </a:rPr>
-              <a:t>FieldOfView에</a:t>
-            </a:r>
-            <a:r>
-              <a:rPr lang="ko-KR" sz="1800">
-                <a:latin typeface="맑은 고딕" charset="0"/>
-                <a:ea typeface="맑은 고딕" charset="0"/>
-              </a:rPr>
-              <a:t> 적용될 수 있도록 설정합니다</a:t>
-            </a:r>
-            <a:r>
-              <a:rPr lang="ko-KR" sz="1800">
-                <a:latin typeface="맑은 고딕" charset="0"/>
-                <a:ea typeface="맑은 고딕" charset="0"/>
-              </a:rPr>
-              <a:t>.</a:t>
+              <a:t>그리고 Update( ) 함수에서 마우스 입력 값을 카메라의 FieldOfView에 적용될 수 있도록 설정합니다.</a:t>
             </a:r>
             <a:endParaRPr lang="ko-KR" altLang="en-US" sz="1800">
               <a:latin typeface="맑은 고딕" charset="0"/>
@@ -6153,8 +6067,8 @@
         </p:nvSpPr>
         <p:spPr>
           <a:xfrm rot="0">
-            <a:off x="1220470" y="3097530"/>
-            <a:ext cx="4125595" cy="677545"/>
+            <a:off x="1220470" y="2992755"/>
+            <a:ext cx="4126230" cy="678180"/>
           </a:xfrm>
           <a:prstGeom prst="rect"/>
           <a:noFill/>
@@ -6198,91 +6112,7 @@
                 <a:latin typeface="맑은 고딕" charset="0"/>
                 <a:ea typeface="맑은 고딕" charset="0"/>
               </a:rPr>
-              <a:t>그다음</a:t>
-            </a:r>
-            <a:r>
-              <a:rPr lang="ko-KR" sz="1800">
-                <a:latin typeface="맑은 고딕" charset="0"/>
-                <a:ea typeface="맑은 고딕" charset="0"/>
-              </a:rPr>
-              <a:t> Main</a:t>
-            </a:r>
-            <a:r>
-              <a:rPr lang="ko-KR" sz="1800">
-                <a:latin typeface="맑은 고딕" charset="0"/>
-                <a:ea typeface="맑은 고딕" charset="0"/>
-              </a:rPr>
-              <a:t> </a:t>
-            </a:r>
-            <a:r>
-              <a:rPr lang="ko-KR" sz="1800">
-                <a:latin typeface="맑은 고딕" charset="0"/>
-                <a:ea typeface="맑은 고딕" charset="0"/>
-              </a:rPr>
-              <a:t>Camera</a:t>
-            </a:r>
-            <a:r>
-              <a:rPr lang="ko-KR" sz="1800">
-                <a:latin typeface="맑은 고딕" charset="0"/>
-                <a:ea typeface="맑은 고딕" charset="0"/>
-              </a:rPr>
-              <a:t> 오브젝트의</a:t>
-            </a:r>
-            <a:r>
-              <a:rPr lang="ko-KR" sz="1800">
-                <a:latin typeface="맑은 고딕" charset="0"/>
-                <a:ea typeface="맑은 고딕" charset="0"/>
-              </a:rPr>
-              <a:t> </a:t>
-            </a:r>
-            <a:r>
-              <a:rPr lang="ko-KR" sz="1800">
-                <a:latin typeface="맑은 고딕" charset="0"/>
-                <a:ea typeface="맑은 고딕" charset="0"/>
-              </a:rPr>
-              <a:t>위치와</a:t>
-            </a:r>
-            <a:r>
-              <a:rPr lang="ko-KR" sz="1800">
-                <a:latin typeface="맑은 고딕" charset="0"/>
-                <a:ea typeface="맑은 고딕" charset="0"/>
-              </a:rPr>
-              <a:t> </a:t>
-            </a:r>
-            <a:r>
-              <a:rPr lang="ko-KR" sz="1800">
-                <a:latin typeface="맑은 고딕" charset="0"/>
-                <a:ea typeface="맑은 고딕" charset="0"/>
-              </a:rPr>
-              <a:t>회전</a:t>
-            </a:r>
-            <a:r>
-              <a:rPr lang="ko-KR" sz="1800">
-                <a:latin typeface="맑은 고딕" charset="0"/>
-                <a:ea typeface="맑은 고딕" charset="0"/>
-              </a:rPr>
-              <a:t> </a:t>
-            </a:r>
-            <a:r>
-              <a:rPr lang="ko-KR" sz="1800">
-                <a:latin typeface="맑은 고딕" charset="0"/>
-                <a:ea typeface="맑은 고딕" charset="0"/>
-              </a:rPr>
-              <a:t>값을</a:t>
-            </a:r>
-            <a:r>
-              <a:rPr lang="ko-KR" sz="1800">
-                <a:latin typeface="맑은 고딕" charset="0"/>
-                <a:ea typeface="맑은 고딕" charset="0"/>
-              </a:rPr>
-              <a:t> </a:t>
-            </a:r>
-            <a:r>
-              <a:rPr lang="ko-KR" sz="1800">
-                <a:latin typeface="맑은 고딕" charset="0"/>
-                <a:ea typeface="맑은 고딕" charset="0"/>
-              </a:rPr>
-              <a:t>설정합니다.</a:t>
+              <a:t>그다음 Main Camera 오브젝트의 위치와 회전 값을 설정합니다.</a:t>
             </a:r>
             <a:endParaRPr lang="ko-KR" altLang="en-US" sz="1800">
               <a:latin typeface="맑은 고딕" charset="0"/>
@@ -6301,8 +6131,8 @@
         </p:nvSpPr>
         <p:spPr>
           <a:xfrm rot="0">
-            <a:off x="1222375" y="5505450"/>
-            <a:ext cx="4140200" cy="677545"/>
+            <a:off x="1212215" y="5228590"/>
+            <a:ext cx="4131310" cy="954405"/>
           </a:xfrm>
           <a:prstGeom prst="rect"/>
           <a:noFill/>
@@ -6346,21 +6176,14 @@
                 <a:latin typeface="맑은 고딕" charset="0"/>
                 <a:ea typeface="맑은 고딕" charset="0"/>
               </a:rPr>
-              <a:t>그러고 나서</a:t>
+              <a:t>그러고 나서 </a:t>
             </a:r>
             <a:r>
               <a:rPr lang="ko-KR" sz="1800">
                 <a:latin typeface="맑은 고딕" charset="0"/>
                 <a:ea typeface="맑은 고딕" charset="0"/>
               </a:rPr>
-              <a:t> </a:t>
-            </a:r>
-            <a:r>
-              <a:rPr lang="ko-KR" sz="1800">
-                <a:latin typeface="맑은 고딕" charset="0"/>
-                <a:ea typeface="맑은 고딕" charset="0"/>
-              </a:rPr>
-              <a:t>Ground 오브젝트의 위치와 회전 값을 초기화합니다.</a:t>
+              <a:t>Zoom 스크립트를 생성한 다음 Main Camera 오브젝트에 넣어줍니다.</a:t>
             </a:r>
             <a:endParaRPr lang="ko-KR" altLang="en-US" sz="1800">
               <a:latin typeface="맑은 고딕" charset="0"/>
@@ -6371,17 +6194,17 @@
       </p:sp>
       <p:pic>
         <p:nvPicPr>
-          <p:cNvPr id="45" name="그림 16" descr="C:/Users/Admin1/AppData/Roaming/PolarisOffice/ETemp/16636_18866920/fImage122381159169.png"/>
+          <p:cNvPr id="45" name="그림 16" descr="C:/Users/Admin1/AppData/Roaming/PolarisOffice/ETemp/19904_10543744/fImage122381159169.png"/>
           <p:cNvPicPr>
             <a:picLocks noChangeAspect="1"/>
           </p:cNvPicPr>
           <p:nvPr/>
         </p:nvPicPr>
         <p:blipFill rotWithShape="1">
-          <a:blip r:embed="rId22" cstate="print">
+          <a:blip r:embed="rId22" cstate="hqprint">
             <a:extLst>
               <a:ext uri="{28A0092B-C50C-407E-A947-70E740481C1C}">
-                <a14:useLocalDpi xmlns:a14="http://schemas.microsoft.com/office/drawing/2010/main" val="0"/>
+                <a14:useLocalDpi xmlns:a14="http://schemas.microsoft.com/office/drawing/2010/main"/>
               </a:ext>
             </a:extLst>
           </a:blip>
@@ -6391,8 +6214,8 @@
         </p:blipFill>
         <p:spPr>
           <a:xfrm rot="0">
-            <a:off x="1210310" y="1437005"/>
-            <a:ext cx="4131945" cy="1535430"/>
+            <a:off x="1210310" y="1437640"/>
+            <a:ext cx="4132580" cy="1455420"/>
           </a:xfrm>
           <a:prstGeom prst="roundRect"/>
           <a:solidFill>
@@ -6402,7 +6225,7 @@
       </p:pic>
       <p:pic>
         <p:nvPicPr>
-          <p:cNvPr id="46" name="그림 40" descr="C:/Users/Admin1/AppData/Roaming/PolarisOffice/ETemp/16636_18866920/fImage532781265724.png"/>
+          <p:cNvPr id="46" name="그림 40"/>
           <p:cNvPicPr>
             <a:picLocks noChangeAspect="1"/>
           </p:cNvPicPr>
@@ -6433,14 +6256,14 @@
       </p:pic>
       <p:pic>
         <p:nvPicPr>
-          <p:cNvPr id="47" name="그림 43" descr="C:/Users/Admin1/AppData/Roaming/PolarisOffice/ETemp/16636_18866920/fImage113691271478.png"/>
+          <p:cNvPr id="47" name="그림 36" descr="C:/Users/Admin1/AppData/Roaming/PolarisOffice/ETemp/19904_10543744/fImage518712141.png"/>
           <p:cNvPicPr>
             <a:picLocks noChangeAspect="1"/>
           </p:cNvPicPr>
           <p:nvPr/>
         </p:nvPicPr>
         <p:blipFill rotWithShape="1">
-          <a:blip r:embed="rId24" cstate="print">
+          <a:blip r:embed="rId25" cstate="print">
             <a:extLst>
               <a:ext uri="{28A0092B-C50C-407E-A947-70E740481C1C}">
                 <a14:useLocalDpi xmlns:a14="http://schemas.microsoft.com/office/drawing/2010/main" val="0"/>
@@ -6453,8 +6276,8 @@
         </p:blipFill>
         <p:spPr>
           <a:xfrm rot="0">
-            <a:off x="1219200" y="3914775"/>
-            <a:ext cx="4115435" cy="1486535"/>
+            <a:off x="1212215" y="3827145"/>
+            <a:ext cx="2893060" cy="1290320"/>
           </a:xfrm>
           <a:prstGeom prst="roundRect"/>
           <a:solidFill>
@@ -6462,6 +6285,70 @@
           </a:solidFill>
         </p:spPr>
       </p:pic>
+      <p:pic>
+        <p:nvPicPr>
+          <p:cNvPr id="48" name="그림 39" descr="C:/Users/Admin1/AppData/Roaming/PolarisOffice/ETemp/19904_10543744/fImage18501228467.png"/>
+          <p:cNvPicPr>
+            <a:picLocks noChangeAspect="1"/>
+          </p:cNvPicPr>
+          <p:nvPr/>
+        </p:nvPicPr>
+        <p:blipFill rotWithShape="1">
+          <a:blip r:embed="rId26" cstate="print">
+            <a:extLst>
+              <a:ext uri="{28A0092B-C50C-407E-A947-70E740481C1C}">
+                <a14:useLocalDpi xmlns:a14="http://schemas.microsoft.com/office/drawing/2010/main" val="0"/>
+              </a:ext>
+            </a:extLst>
+          </a:blip>
+          <a:stretch>
+            <a:fillRect/>
+          </a:stretch>
+        </p:blipFill>
+        <p:spPr>
+          <a:xfrm rot="0">
+            <a:off x="4520565" y="4078605"/>
+            <a:ext cx="822960" cy="866775"/>
+          </a:xfrm>
+          <a:prstGeom prst="roundRect"/>
+          <a:solidFill>
+            <a:srgbClr val="EDEDED"/>
+          </a:solidFill>
+        </p:spPr>
+      </p:pic>
+      <p:cxnSp>
+        <p:nvCxnSpPr>
+          <p:cNvPr id="49" name="도형 42"/>
+          <p:cNvCxnSpPr/>
+          <p:nvPr/>
+        </p:nvCxnSpPr>
+        <p:spPr>
+          <a:xfrm rot="0" flipH="1" flipV="1">
+            <a:off x="3645535" y="4173855"/>
+            <a:ext cx="875665" cy="338455"/>
+          </a:xfrm>
+          <a:prstGeom prst="straightConnector1"/>
+          <a:ln w="6350" cap="flat" cmpd="sng">
+            <a:prstDash/>
+            <a:headEnd type="none" w="med" len="med"/>
+            <a:tailEnd type="triangle" w="med" len="med"/>
+          </a:ln>
+        </p:spPr>
+        <p:style>
+          <a:lnRef idx="1">
+            <a:schemeClr val="accent1"/>
+          </a:lnRef>
+          <a:fillRef idx="0">
+            <a:schemeClr val="accent1"/>
+          </a:fillRef>
+          <a:effectRef idx="0">
+            <a:schemeClr val="accent1"/>
+          </a:effectRef>
+          <a:fontRef idx="minor">
+            <a:schemeClr val="tx1"/>
+          </a:fontRef>
+        </p:style>
+      </p:cxnSp>
     </p:spTree>
   </p:cSld>
   <p:clrMapOvr>
@@ -7213,8 +7100,8 @@
         </p:nvSpPr>
         <p:spPr>
           <a:xfrm rot="0">
-            <a:off x="1228090" y="5160010"/>
-            <a:ext cx="4144645" cy="954405"/>
+            <a:off x="1254125" y="2917190"/>
+            <a:ext cx="4115435" cy="677545"/>
           </a:xfrm>
           <a:prstGeom prst="rect"/>
           <a:noFill/>
@@ -7258,14 +7145,21 @@
                 <a:latin typeface="맑은 고딕" charset="0"/>
                 <a:ea typeface="맑은 고딕" charset="0"/>
               </a:rPr>
-              <a:t>이제</a:t>
+              <a:t>이제 Left Wall 오브젝트</a:t>
             </a:r>
             <a:r>
               <a:rPr lang="ko-KR" sz="1800">
                 <a:latin typeface="맑은 고딕" charset="0"/>
                 <a:ea typeface="맑은 고딕" charset="0"/>
               </a:rPr>
-              <a:t> Left Wall 오브젝트와 Right Wall 오브젝트의 위치와 회전 값을 설정합니다.</a:t>
+              <a:t>의 </a:t>
+            </a:r>
+            <a:r>
+              <a:rPr lang="ko-KR" sz="1800">
+                <a:latin typeface="맑은 고딕" charset="0"/>
+                <a:ea typeface="맑은 고딕" charset="0"/>
+              </a:rPr>
+              <a:t>위치와 회전 값을 설정합니다.</a:t>
             </a:r>
             <a:endParaRPr lang="ko-KR" altLang="en-US" sz="1800">
               <a:latin typeface="맑은 고딕" charset="0"/>
@@ -7276,7 +7170,7 @@
       </p:sp>
       <p:pic>
         <p:nvPicPr>
-          <p:cNvPr id="46" name="그림 28"/>
+          <p:cNvPr id="46" name="그림 28" descr="C:/Users/Admin1/AppData/Roaming/PolarisOffice/ETemp/19904_10543744/fImage124272065705.png"/>
           <p:cNvPicPr>
             <a:picLocks noChangeAspect="1"/>
           </p:cNvPicPr>
@@ -7296,8 +7190,8 @@
         </p:blipFill>
         <p:spPr>
           <a:xfrm rot="0">
-            <a:off x="1247775" y="1457325"/>
-            <a:ext cx="4124325" cy="1649095"/>
+            <a:off x="1247775" y="1454785"/>
+            <a:ext cx="4124960" cy="1369060"/>
           </a:xfrm>
           <a:prstGeom prst="roundRect"/>
           <a:solidFill>
@@ -7305,68 +7199,6 @@
           </a:solidFill>
         </p:spPr>
       </p:pic>
-      <p:pic>
-        <p:nvPicPr>
-          <p:cNvPr id="47" name="그림 31"/>
-          <p:cNvPicPr>
-            <a:picLocks noChangeAspect="1"/>
-          </p:cNvPicPr>
-          <p:nvPr/>
-        </p:nvPicPr>
-        <p:blipFill rotWithShape="1">
-          <a:blip r:embed="rId9" cstate="hqprint">
-            <a:extLst>
-              <a:ext uri="{28A0092B-C50C-407E-A947-70E740481C1C}">
-                <a14:useLocalDpi xmlns:a14="http://schemas.microsoft.com/office/drawing/2010/main"/>
-              </a:ext>
-            </a:extLst>
-          </a:blip>
-          <a:stretch>
-            <a:fillRect/>
-          </a:stretch>
-        </p:blipFill>
-        <p:spPr>
-          <a:xfrm rot="0">
-            <a:off x="1238250" y="3361690"/>
-            <a:ext cx="4123690" cy="1639570"/>
-          </a:xfrm>
-          <a:prstGeom prst="roundRect"/>
-          <a:solidFill>
-            <a:srgbClr val="EDEDED"/>
-          </a:solidFill>
-        </p:spPr>
-      </p:pic>
-      <p:pic>
-        <p:nvPicPr>
-          <p:cNvPr id="48" name="그림 5" descr="C:/Users/Admin1/AppData/Roaming/PolarisOffice/ETemp/24108_19847768/fImage14086988467.png"/>
-          <p:cNvPicPr>
-            <a:picLocks noChangeAspect="1"/>
-          </p:cNvPicPr>
-          <p:nvPr/>
-        </p:nvPicPr>
-        <p:blipFill rotWithShape="1">
-          <a:blip r:embed="rId10" cstate="print">
-            <a:extLst>
-              <a:ext uri="{28A0092B-C50C-407E-A947-70E740481C1C}">
-                <a14:useLocalDpi xmlns:a14="http://schemas.microsoft.com/office/drawing/2010/main" val="0"/>
-              </a:ext>
-            </a:extLst>
-          </a:blip>
-          <a:stretch>
-            <a:fillRect/>
-          </a:stretch>
-        </p:blipFill>
-        <p:spPr>
-          <a:xfrm rot="0">
-            <a:off x="8163560" y="1446530"/>
-            <a:ext cx="2794000" cy="1097915"/>
-          </a:xfrm>
-          <a:prstGeom prst="roundRect"/>
-          <a:solidFill>
-            <a:srgbClr val="EDEDED"/>
-          </a:solidFill>
-        </p:spPr>
-      </p:pic>
       <p:sp>
         <p:nvSpPr>
           <p:cNvPr id="50" name="텍스트 상자 11"/>
@@ -7376,9 +7208,9 @@
           <p:nvPr/>
         </p:nvSpPr>
         <p:spPr>
-          <a:xfrm rot="0">
+          <a:xfrm>
             <a:off x="6816725" y="2671445"/>
-            <a:ext cx="4149090" cy="1231265"/>
+            <a:ext cx="4149725" cy="1231265"/>
           </a:xfrm>
           <a:prstGeom prst="rect"/>
           <a:noFill/>
@@ -7422,28 +7254,14 @@
                 <a:latin typeface="맑은 고딕" charset="0"/>
                 <a:ea typeface="맑은 고딕" charset="0"/>
               </a:rPr>
-              <a:t>그리고 </a:t>
+              <a:t>그런 다음</a:t>
             </a:r>
             <a:r>
               <a:rPr lang="ko-KR" sz="1800">
                 <a:latin typeface="맑은 고딕" charset="0"/>
                 <a:ea typeface="맑은 고딕" charset="0"/>
               </a:rPr>
-              <a:t>Project 폴더 아래에 있는 Textures 폴더에 </a:t>
-            </a:r>
-            <a:r>
-              <a:rPr lang="ko-KR" sz="1800">
-                <a:latin typeface="맑은 고딕" charset="0"/>
-                <a:ea typeface="맑은 고딕" charset="0"/>
-              </a:rPr>
-              <a:t>Wall</a:t>
-            </a:r>
-            <a:r>
-              <a:rPr lang="ko-KR" sz="1800">
-                <a:latin typeface="맑은 고딕" charset="0"/>
-                <a:ea typeface="맑은 고딕" charset="0"/>
-              </a:rPr>
-              <a:t> Texture </a:t>
+              <a:t> Project 폴더 아래에 있는 Textures 폴더에 Wall </a:t>
             </a:r>
             <a:r>
               <a:rPr lang="ko-KR" sz="1800" b="0">
@@ -7453,7 +7271,14 @@
                 <a:latin typeface="맑은 고딕" charset="0"/>
                 <a:ea typeface="맑은 고딕" charset="0"/>
               </a:rPr>
-              <a:t>텍스처를</a:t>
+              <a:t>텍스처를 선택하고 </a:t>
+            </a:r>
+            <a:r>
+              <a:rPr lang="ko-KR" sz="1800">
+                <a:latin typeface="맑은 고딕" charset="0"/>
+                <a:ea typeface="맑은 고딕" charset="0"/>
+              </a:rPr>
+              <a:t>Ground </a:t>
             </a:r>
             <a:r>
               <a:rPr lang="ko-KR" sz="1800" b="0">
@@ -7463,53 +7288,12 @@
                 <a:latin typeface="맑은 고딕" charset="0"/>
                 <a:ea typeface="맑은 고딕" charset="0"/>
               </a:rPr>
-              <a:t> </a:t>
-            </a:r>
-            <a:r>
-              <a:rPr lang="ko-KR" sz="1800" b="0">
-                <a:solidFill>
-                  <a:schemeClr val="tx1"/>
-                </a:solidFill>
-                <a:latin typeface="맑은 고딕" charset="0"/>
-                <a:ea typeface="맑은 고딕" charset="0"/>
-              </a:rPr>
-              <a:t>선택하고</a:t>
-            </a:r>
-            <a:r>
-              <a:rPr lang="ko-KR" sz="1800" b="0">
-                <a:solidFill>
-                  <a:schemeClr val="tx1"/>
-                </a:solidFill>
-                <a:latin typeface="맑은 고딕" charset="0"/>
-                <a:ea typeface="맑은 고딕" charset="0"/>
-              </a:rPr>
-              <a:t> </a:t>
-            </a:r>
-            <a:r>
-              <a:rPr lang="ko-KR" sz="1800">
-                <a:latin typeface="맑은 고딕" charset="0"/>
-                <a:ea typeface="맑은 고딕" charset="0"/>
-              </a:rPr>
-              <a:t>Ground</a:t>
-            </a:r>
-            <a:r>
-              <a:rPr lang="ko-KR" sz="1800">
-                <a:latin typeface="맑은 고딕" charset="0"/>
-                <a:ea typeface="맑은 고딕" charset="0"/>
-              </a:rPr>
-              <a:t> </a:t>
-            </a:r>
-            <a:r>
-              <a:rPr lang="ko-KR" sz="1800" b="0">
-                <a:solidFill>
-                  <a:schemeClr val="tx1"/>
-                </a:solidFill>
-                <a:latin typeface="맑은 고딕" charset="0"/>
-                <a:ea typeface="맑은 고딕" charset="0"/>
-              </a:rPr>
               <a:t>오브젝트에 넣어줍니다.</a:t>
             </a:r>
-            <a:endParaRPr lang="ko-KR" altLang="en-US" sz="1800">
+            <a:endParaRPr lang="ko-KR" altLang="en-US" sz="1800" b="0">
+              <a:solidFill>
+                <a:schemeClr val="tx1"/>
+              </a:solidFill>
               <a:latin typeface="맑은 고딕" charset="0"/>
               <a:ea typeface="맑은 고딕" charset="0"/>
             </a:endParaRPr>
@@ -7518,7 +7302,7 @@
       </p:sp>
       <p:pic>
         <p:nvPicPr>
-          <p:cNvPr id="51" name="그림 12" descr="C:/Users/Admin1/AppData/Roaming/PolarisOffice/ETemp/24108_19847768/fImage62521016334.png"/>
+          <p:cNvPr id="51" name="그림 12"/>
           <p:cNvPicPr>
             <a:picLocks noChangeAspect="1"/>
           </p:cNvPicPr>
@@ -7547,39 +7331,6 @@
           </a:solidFill>
         </p:spPr>
       </p:pic>
-      <p:cxnSp>
-        <p:nvCxnSpPr>
-          <p:cNvPr id="52" name="도형 15"/>
-          <p:cNvCxnSpPr/>
-          <p:nvPr/>
-        </p:nvCxnSpPr>
-        <p:spPr>
-          <a:xfrm rot="0" flipH="1">
-            <a:off x="7556500" y="1986915"/>
-            <a:ext cx="2245360" cy="635"/>
-          </a:xfrm>
-          <a:prstGeom prst="straightConnector1"/>
-          <a:ln w="6350" cap="flat" cmpd="sng">
-            <a:prstDash/>
-            <a:headEnd type="none" w="med" len="med"/>
-            <a:tailEnd type="triangle" w="med" len="med"/>
-          </a:ln>
-        </p:spPr>
-        <p:style>
-          <a:lnRef idx="1">
-            <a:schemeClr val="accent1"/>
-          </a:lnRef>
-          <a:fillRef idx="0">
-            <a:schemeClr val="accent1"/>
-          </a:fillRef>
-          <a:effectRef idx="0">
-            <a:schemeClr val="accent1"/>
-          </a:effectRef>
-          <a:fontRef idx="minor">
-            <a:schemeClr val="tx1"/>
-          </a:fontRef>
-        </p:style>
-      </p:cxnSp>
       <p:sp>
         <p:nvSpPr>
           <p:cNvPr id="54" name="텍스트 상자 18"/>
@@ -7590,8 +7341,8 @@
         </p:nvSpPr>
         <p:spPr>
           <a:xfrm rot="0">
-            <a:off x="6818630" y="5443220"/>
-            <a:ext cx="4147185" cy="677545"/>
+            <a:off x="6818630" y="5512435"/>
+            <a:ext cx="4147820" cy="678180"/>
           </a:xfrm>
           <a:prstGeom prst="rect"/>
           <a:noFill/>
@@ -7618,27 +7369,7 @@
                 <a:latin typeface="맑은 고딕" charset="0"/>
                 <a:ea typeface="맑은 고딕" charset="0"/>
               </a:rPr>
-              <a:t>1</a:t>
-            </a:r>
-            <a:r>
-              <a:rPr lang="ko-KR" sz="2000" b="1">
-                <a:solidFill>
-                  <a:srgbClr val="0611F2"/>
-                </a:solidFill>
-                <a:latin typeface="맑은 고딕" charset="0"/>
-                <a:ea typeface="맑은 고딕" charset="0"/>
-              </a:rPr>
-              <a:t>1</a:t>
-            </a:r>
-            <a:r>
-              <a:rPr lang="ko-KR" sz="2000" b="1">
-                <a:solidFill>
-                  <a:srgbClr val="0611F2"/>
-                </a:solidFill>
-                <a:latin typeface="맑은 고딕" charset="0"/>
-                <a:ea typeface="맑은 고딕" charset="0"/>
-              </a:rPr>
-              <a:t>.</a:t>
+              <a:t>11.</a:t>
             </a:r>
             <a:r>
               <a:rPr sz="2000" b="1">
@@ -7666,7 +7397,7 @@
       </p:sp>
       <p:pic>
         <p:nvPicPr>
-          <p:cNvPr id="55" name="그림 20" descr="C:/Users/Admin1/AppData/Roaming/PolarisOffice/ETemp/24108_19847768/fImage194481066500.png"/>
+          <p:cNvPr id="55" name="그림 20"/>
           <p:cNvPicPr>
             <a:picLocks noChangeAspect="1"/>
           </p:cNvPicPr>
@@ -7695,6 +7426,297 @@
           </a:solidFill>
         </p:spPr>
       </p:pic>
+      <p:pic>
+        <p:nvPicPr>
+          <p:cNvPr id="56" name="그림 11" descr="C:/Users/Admin1/AppData/Roaming/PolarisOffice/ETemp/19904_10543744/fImage138331066334.png"/>
+          <p:cNvPicPr>
+            <a:picLocks noChangeAspect="1"/>
+          </p:cNvPicPr>
+          <p:nvPr/>
+        </p:nvPicPr>
+        <p:blipFill rotWithShape="1">
+          <a:blip r:embed="rId13" cstate="print">
+            <a:extLst>
+              <a:ext uri="{28A0092B-C50C-407E-A947-70E740481C1C}">
+                <a14:useLocalDpi xmlns:a14="http://schemas.microsoft.com/office/drawing/2010/main" val="0"/>
+              </a:ext>
+            </a:extLst>
+          </a:blip>
+          <a:stretch>
+            <a:fillRect/>
+          </a:stretch>
+        </p:blipFill>
+        <p:spPr>
+          <a:xfrm rot="0">
+            <a:off x="8185785" y="1451610"/>
+            <a:ext cx="2768600" cy="1115060"/>
+          </a:xfrm>
+          <a:prstGeom prst="roundRect"/>
+          <a:solidFill>
+            <a:srgbClr val="EDEDED"/>
+          </a:solidFill>
+        </p:spPr>
+      </p:pic>
+      <p:cxnSp>
+        <p:nvCxnSpPr>
+          <p:cNvPr id="52" name="도형 15"/>
+          <p:cNvCxnSpPr/>
+          <p:nvPr/>
+        </p:nvCxnSpPr>
+        <p:spPr>
+          <a:xfrm rot="0" flipH="1">
+            <a:off x="7556500" y="1986915"/>
+            <a:ext cx="2245360" cy="635"/>
+          </a:xfrm>
+          <a:prstGeom prst="straightConnector1"/>
+          <a:ln w="6350" cap="flat" cmpd="sng">
+            <a:prstDash/>
+            <a:headEnd type="none" w="med" len="med"/>
+            <a:tailEnd type="triangle" w="med" len="med"/>
+          </a:ln>
+        </p:spPr>
+        <p:style>
+          <a:lnRef idx="1">
+            <a:schemeClr val="accent1"/>
+          </a:lnRef>
+          <a:fillRef idx="0">
+            <a:schemeClr val="accent1"/>
+          </a:fillRef>
+          <a:effectRef idx="0">
+            <a:schemeClr val="accent1"/>
+          </a:effectRef>
+          <a:fontRef idx="minor">
+            <a:schemeClr val="tx1"/>
+          </a:fontRef>
+        </p:style>
+      </p:cxnSp>
+      <p:pic>
+        <p:nvPicPr>
+          <p:cNvPr id="57" name="그림 27" descr="C:/Users/Admin1/AppData/Roaming/PolarisOffice/ETemp/19904_10543744/fImage80801146500.png"/>
+          <p:cNvPicPr>
+            <a:picLocks noChangeAspect="1"/>
+          </p:cNvPicPr>
+          <p:nvPr/>
+        </p:nvPicPr>
+        <p:blipFill rotWithShape="1">
+          <a:blip r:embed="rId14" cstate="print">
+            <a:extLst>
+              <a:ext uri="{28A0092B-C50C-407E-A947-70E740481C1C}">
+                <a14:useLocalDpi xmlns:a14="http://schemas.microsoft.com/office/drawing/2010/main" val="0"/>
+              </a:ext>
+            </a:extLst>
+          </a:blip>
+          <a:stretch>
+            <a:fillRect/>
+          </a:stretch>
+        </p:blipFill>
+        <p:spPr>
+          <a:xfrm rot="0">
+            <a:off x="1221105" y="3711575"/>
+            <a:ext cx="1198880" cy="1171575"/>
+          </a:xfrm>
+          <a:prstGeom prst="roundRect"/>
+          <a:solidFill>
+            <a:srgbClr val="EDEDED"/>
+          </a:solidFill>
+        </p:spPr>
+      </p:pic>
+      <p:sp>
+        <p:nvSpPr>
+          <p:cNvPr id="58" name="텍스트 상자 28"/>
+          <p:cNvSpPr txBox="1">
+            <a:spLocks/>
+          </p:cNvSpPr>
+          <p:nvPr/>
+        </p:nvSpPr>
+        <p:spPr>
+          <a:xfrm rot="0">
+            <a:off x="1247140" y="4965700"/>
+            <a:ext cx="4105275" cy="1231265"/>
+          </a:xfrm>
+          <a:prstGeom prst="rect"/>
+          <a:noFill/>
+          <a:ln w="0">
+            <a:noFill/>
+            <a:prstDash/>
+          </a:ln>
+        </p:spPr>
+        <p:txBody>
+          <a:bodyPr wrap="square" lIns="89535" tIns="46355" rIns="89535" bIns="46355" numCol="1" vert="horz" anchor="t">
+            <a:spAutoFit/>
+          </a:bodyPr>
+          <a:lstStyle/>
+          <a:p>
+            <a:pPr marL="0" indent="0" rtl="0" algn="l" defTabSz="914400" eaLnBrk="1" latinLnBrk="0" hangingPunct="1">
+              <a:buFontTx/>
+              <a:buNone/>
+            </a:pPr>
+            <a:r>
+              <a:rPr lang="ko-KR" sz="2000" b="1">
+                <a:solidFill>
+                  <a:srgbClr val="0611F2"/>
+                </a:solidFill>
+                <a:latin typeface="맑은 고딕" charset="0"/>
+                <a:ea typeface="맑은 고딕" charset="0"/>
+              </a:rPr>
+              <a:t>1</a:t>
+            </a:r>
+            <a:r>
+              <a:rPr lang="ko-KR" sz="2000" b="1">
+                <a:solidFill>
+                  <a:srgbClr val="0611F2"/>
+                </a:solidFill>
+                <a:latin typeface="맑은 고딕" charset="0"/>
+                <a:ea typeface="맑은 고딕" charset="0"/>
+              </a:rPr>
+              <a:t>0</a:t>
+            </a:r>
+            <a:r>
+              <a:rPr sz="2000" b="1">
+                <a:solidFill>
+                  <a:srgbClr val="0611F2"/>
+                </a:solidFill>
+                <a:latin typeface="맑은 고딕" charset="0"/>
+                <a:ea typeface="맑은 고딕" charset="0"/>
+              </a:rPr>
+              <a:t>. </a:t>
+            </a:r>
+            <a:r>
+              <a:rPr lang="ko-KR" sz="1800">
+                <a:latin typeface="맑은 고딕" charset="0"/>
+                <a:ea typeface="맑은 고딕" charset="0"/>
+              </a:rPr>
+              <a:t>그</a:t>
+            </a:r>
+            <a:r>
+              <a:rPr lang="ko-KR" sz="1800">
+                <a:latin typeface="맑은 고딕" charset="0"/>
+                <a:ea typeface="맑은 고딕" charset="0"/>
+              </a:rPr>
+              <a:t>리고</a:t>
+            </a:r>
+            <a:r>
+              <a:rPr lang="ko-KR" sz="1800">
+                <a:latin typeface="맑은 고딕" charset="0"/>
+                <a:ea typeface="맑은 고딕" charset="0"/>
+              </a:rPr>
+              <a:t> Project 폴더 아래에 있는 Textures 폴더에 Wall </a:t>
+            </a:r>
+            <a:r>
+              <a:rPr lang="ko-KR" sz="1800" b="0">
+                <a:solidFill>
+                  <a:schemeClr val="tx1"/>
+                </a:solidFill>
+                <a:latin typeface="맑은 고딕" charset="0"/>
+                <a:ea typeface="맑은 고딕" charset="0"/>
+              </a:rPr>
+              <a:t>텍스처를 선택하고</a:t>
+            </a:r>
+            <a:r>
+              <a:rPr lang="ko-KR" sz="1800">
+                <a:latin typeface="맑은 고딕" charset="0"/>
+                <a:ea typeface="맑은 고딕" charset="0"/>
+              </a:rPr>
+              <a:t> </a:t>
+            </a:r>
+            <a:r>
+              <a:rPr lang="ko-KR" sz="1800">
+                <a:latin typeface="맑은 고딕" charset="0"/>
+                <a:ea typeface="맑은 고딕" charset="0"/>
+              </a:rPr>
+              <a:t>Right</a:t>
+            </a:r>
+            <a:r>
+              <a:rPr lang="ko-KR" sz="1800">
+                <a:latin typeface="맑은 고딕" charset="0"/>
+                <a:ea typeface="맑은 고딕" charset="0"/>
+              </a:rPr>
+              <a:t> Wall </a:t>
+            </a:r>
+            <a:r>
+              <a:rPr lang="ko-KR" sz="1800" b="0">
+                <a:solidFill>
+                  <a:schemeClr val="tx1"/>
+                </a:solidFill>
+                <a:latin typeface="맑은 고딕" charset="0"/>
+                <a:ea typeface="맑은 고딕" charset="0"/>
+              </a:rPr>
+              <a:t>오브젝트에 넣어줍니다.</a:t>
+            </a:r>
+            <a:endParaRPr lang="ko-KR" altLang="en-US" sz="1800" b="0">
+              <a:solidFill>
+                <a:schemeClr val="tx1"/>
+              </a:solidFill>
+              <a:latin typeface="맑은 고딕" charset="0"/>
+              <a:ea typeface="맑은 고딕" charset="0"/>
+            </a:endParaRPr>
+          </a:p>
+        </p:txBody>
+      </p:sp>
+      <p:pic>
+        <p:nvPicPr>
+          <p:cNvPr id="59" name="그림 29" descr="C:/Users/Admin1/AppData/Roaming/PolarisOffice/ETemp/19904_10543744/fImage138331169169.png"/>
+          <p:cNvPicPr>
+            <a:picLocks noChangeAspect="1"/>
+          </p:cNvPicPr>
+          <p:nvPr/>
+        </p:nvPicPr>
+        <p:blipFill rotWithShape="1">
+          <a:blip r:embed="rId15" cstate="print">
+            <a:extLst>
+              <a:ext uri="{28A0092B-C50C-407E-A947-70E740481C1C}">
+                <a14:useLocalDpi xmlns:a14="http://schemas.microsoft.com/office/drawing/2010/main" val="0"/>
+              </a:ext>
+            </a:extLst>
+          </a:blip>
+          <a:stretch>
+            <a:fillRect/>
+          </a:stretch>
+        </p:blipFill>
+        <p:spPr>
+          <a:xfrm rot="0">
+            <a:off x="2600325" y="3714750"/>
+            <a:ext cx="2760345" cy="1178560"/>
+          </a:xfrm>
+          <a:prstGeom prst="roundRect"/>
+          <a:solidFill>
+            <a:srgbClr val="EDEDED"/>
+          </a:solidFill>
+        </p:spPr>
+      </p:pic>
+      <p:cxnSp>
+        <p:nvCxnSpPr>
+          <p:cNvPr id="60" name="도형 30"/>
+          <p:cNvCxnSpPr/>
+          <p:nvPr/>
+        </p:nvCxnSpPr>
+        <p:spPr>
+          <a:xfrm rot="0" flipH="1">
+            <a:off x="2104390" y="4217035"/>
+            <a:ext cx="2105025" cy="459740"/>
+          </a:xfrm>
+          <a:prstGeom prst="straightConnector1"/>
+          <a:ln w="6350" cap="flat" cmpd="sng">
+            <a:prstDash/>
+            <a:headEnd type="none" w="med" len="med"/>
+            <a:tailEnd type="triangle" w="med" len="med"/>
+          </a:ln>
+        </p:spPr>
+        <p:style>
+          <a:lnRef idx="1">
+            <a:schemeClr val="accent1"/>
+          </a:lnRef>
+          <a:fillRef idx="0">
+            <a:schemeClr val="accent1"/>
+          </a:fillRef>
+          <a:effectRef idx="0">
+            <a:schemeClr val="accent1"/>
+          </a:effectRef>
+          <a:fontRef idx="minor">
+            <a:schemeClr val="tx1"/>
+          </a:fontRef>
+        </p:style>
+      </p:cxnSp>
     </p:spTree>
   </p:cSld>
   <p:clrMapOvr>
@@ -7794,9 +7816,9 @@
           <p:nvPr/>
         </p:nvSpPr>
         <p:spPr>
-          <a:xfrm rot="0">
+          <a:xfrm>
             <a:off x="6816725" y="2682240"/>
-            <a:ext cx="4140835" cy="1231265"/>
+            <a:ext cx="4141470" cy="1231265"/>
           </a:xfrm>
           <a:prstGeom prst="rect"/>
           <a:noFill/>
@@ -7823,17 +7845,7 @@
                 <a:latin typeface="맑은 고딕" charset="0"/>
                 <a:ea typeface="맑은 고딕" charset="0"/>
               </a:rPr>
-              <a:t>1</a:t>
-            </a:r>
-            <a:r>
-              <a:rPr lang="ko-KR" sz="2000" b="1">
-                <a:solidFill>
-                  <a:srgbClr val="0611F2"/>
-                </a:solidFill>
-                <a:latin typeface="맑은 고딕" charset="0"/>
-                <a:ea typeface="맑은 고딕" charset="0"/>
-              </a:rPr>
-              <a:t>3</a:t>
+              <a:t>13</a:t>
             </a:r>
             <a:r>
               <a:rPr sz="2000" b="1">
@@ -7850,28 +7862,14 @@
                 <a:latin typeface="맑은 고딕" charset="0"/>
                 <a:ea typeface="맑은 고딕" charset="0"/>
               </a:rPr>
-              <a:t>그런 다음</a:t>
+              <a:t>이제</a:t>
             </a:r>
             <a:r>
               <a:rPr lang="ko-KR" sz="1800">
                 <a:latin typeface="맑은 고딕" charset="0"/>
                 <a:ea typeface="맑은 고딕" charset="0"/>
               </a:rPr>
-              <a:t> Project 폴더 아래에 있는 Textures 폴더에 </a:t>
-            </a:r>
-            <a:r>
-              <a:rPr lang="ko-KR" sz="1800">
-                <a:latin typeface="맑은 고딕" charset="0"/>
-                <a:ea typeface="맑은 고딕" charset="0"/>
-              </a:rPr>
-              <a:t>Wall</a:t>
-            </a:r>
-            <a:r>
-              <a:rPr lang="ko-KR" sz="1800">
-                <a:latin typeface="맑은 고딕" charset="0"/>
-                <a:ea typeface="맑은 고딕" charset="0"/>
-              </a:rPr>
-              <a:t> Texture </a:t>
+              <a:t> Project 폴더 아래에 있는 Textures 폴더에 Wall </a:t>
             </a:r>
             <a:r>
               <a:rPr lang="ko-KR" sz="1800" b="0">
@@ -7881,7 +7879,14 @@
                 <a:latin typeface="맑은 고딕" charset="0"/>
                 <a:ea typeface="맑은 고딕" charset="0"/>
               </a:rPr>
-              <a:t>텍스처를</a:t>
+              <a:t>텍스처를 선택하고</a:t>
+            </a:r>
+            <a:r>
+              <a:rPr lang="ko-KR" sz="1800">
+                <a:latin typeface="맑은 고딕" charset="0"/>
+                <a:ea typeface="맑은 고딕" charset="0"/>
+              </a:rPr>
+              <a:t> Left Wall </a:t>
             </a:r>
             <a:r>
               <a:rPr lang="ko-KR" sz="1800" b="0">
@@ -7891,176 +7896,7 @@
                 <a:latin typeface="맑은 고딕" charset="0"/>
                 <a:ea typeface="맑은 고딕" charset="0"/>
               </a:rPr>
-              <a:t> </a:t>
-            </a:r>
-            <a:r>
-              <a:rPr lang="ko-KR" sz="1800" b="0">
-                <a:solidFill>
-                  <a:schemeClr val="tx1"/>
-                </a:solidFill>
-                <a:latin typeface="맑은 고딕" charset="0"/>
-                <a:ea typeface="맑은 고딕" charset="0"/>
-              </a:rPr>
-              <a:t>선택하고</a:t>
-            </a:r>
-            <a:r>
-              <a:rPr lang="ko-KR" sz="1800">
-                <a:latin typeface="맑은 고딕" charset="0"/>
-                <a:ea typeface="맑은 고딕" charset="0"/>
-              </a:rPr>
-              <a:t> Left Wall</a:t>
-            </a:r>
-            <a:r>
-              <a:rPr lang="ko-KR" sz="1800">
-                <a:latin typeface="맑은 고딕" charset="0"/>
-                <a:ea typeface="맑은 고딕" charset="0"/>
-              </a:rPr>
-              <a:t> </a:t>
-            </a:r>
-            <a:r>
-              <a:rPr lang="ko-KR" sz="1800" b="0">
-                <a:solidFill>
-                  <a:schemeClr val="tx1"/>
-                </a:solidFill>
-                <a:latin typeface="맑은 고딕" charset="0"/>
-                <a:ea typeface="맑은 고딕" charset="0"/>
-              </a:rPr>
-              <a:t>오브</a:t>
-            </a:r>
-            <a:r>
-              <a:rPr lang="ko-KR" sz="1800" b="0">
-                <a:solidFill>
-                  <a:schemeClr val="tx1"/>
-                </a:solidFill>
-                <a:latin typeface="맑은 고딕" charset="0"/>
-                <a:ea typeface="맑은 고딕" charset="0"/>
-              </a:rPr>
-              <a:t>젝트에</a:t>
-            </a:r>
-            <a:r>
-              <a:rPr lang="ko-KR" sz="1800" b="0">
-                <a:solidFill>
-                  <a:schemeClr val="tx1"/>
-                </a:solidFill>
-                <a:latin typeface="맑은 고딕" charset="0"/>
-                <a:ea typeface="맑은 고딕" charset="0"/>
-              </a:rPr>
-              <a:t> 넣어줍니다.</a:t>
-            </a:r>
-            <a:endParaRPr lang="ko-KR" altLang="en-US" sz="1800">
-              <a:latin typeface="맑은 고딕" charset="0"/>
-              <a:ea typeface="맑은 고딕" charset="0"/>
-            </a:endParaRPr>
-          </a:p>
-        </p:txBody>
-      </p:sp>
-      <p:sp>
-        <p:nvSpPr>
-          <p:cNvPr id="49" name="텍스트 상자 89"/>
-          <p:cNvSpPr txBox="1">
-            <a:spLocks/>
-          </p:cNvSpPr>
-          <p:nvPr/>
-        </p:nvSpPr>
-        <p:spPr>
-          <a:xfrm rot="0">
-            <a:off x="1230630" y="4946650"/>
-            <a:ext cx="4140200" cy="1231265"/>
-          </a:xfrm>
-          <a:prstGeom prst="rect"/>
-          <a:noFill/>
-          <a:ln w="0">
-            <a:noFill/>
-            <a:prstDash/>
-          </a:ln>
-        </p:spPr>
-        <p:txBody>
-          <a:bodyPr wrap="square" lIns="89535" tIns="46355" rIns="89535" bIns="46355" numCol="1" vert="horz" anchor="t">
-            <a:spAutoFit/>
-          </a:bodyPr>
-          <a:lstStyle/>
-          <a:p>
-            <a:pPr marL="0" indent="0" rtl="0" algn="l" defTabSz="914400" eaLnBrk="1" latinLnBrk="0" hangingPunct="1">
-              <a:buFontTx/>
-              <a:buNone/>
-            </a:pPr>
-            <a:r>
-              <a:rPr lang="ko-KR" sz="2000" b="1">
-                <a:solidFill>
-                  <a:srgbClr val="0611F2"/>
-                </a:solidFill>
-                <a:latin typeface="맑은 고딕" charset="0"/>
-                <a:ea typeface="맑은 고딕" charset="0"/>
-              </a:rPr>
-              <a:t>1</a:t>
-            </a:r>
-            <a:r>
-              <a:rPr lang="ko-KR" sz="2000" b="1">
-                <a:solidFill>
-                  <a:srgbClr val="0611F2"/>
-                </a:solidFill>
-                <a:latin typeface="맑은 고딕" charset="0"/>
-                <a:ea typeface="맑은 고딕" charset="0"/>
-              </a:rPr>
-              <a:t>2</a:t>
-            </a:r>
-            <a:r>
-              <a:rPr lang="ko-KR" sz="2000" b="1">
-                <a:solidFill>
-                  <a:srgbClr val="0611F2"/>
-                </a:solidFill>
-                <a:latin typeface="맑은 고딕" charset="0"/>
-                <a:ea typeface="맑은 고딕" charset="0"/>
-              </a:rPr>
-              <a:t>.</a:t>
-            </a:r>
-            <a:r>
-              <a:rPr sz="2000" b="1">
-                <a:solidFill>
-                  <a:srgbClr val="0611F2"/>
-                </a:solidFill>
-                <a:latin typeface="맑은 고딕" charset="0"/>
-                <a:ea typeface="맑은 고딕" charset="0"/>
-              </a:rPr>
-              <a:t> </a:t>
-            </a:r>
-            <a:r>
-              <a:rPr lang="ko-KR" sz="1800">
-                <a:latin typeface="맑은 고딕" charset="0"/>
-                <a:ea typeface="맑은 고딕" charset="0"/>
-              </a:rPr>
-              <a:t>그</a:t>
-            </a:r>
-            <a:r>
-              <a:rPr lang="ko-KR" sz="1800">
-                <a:latin typeface="맑은 고딕" charset="0"/>
-                <a:ea typeface="맑은 고딕" charset="0"/>
-              </a:rPr>
-              <a:t>러고 나서</a:t>
-            </a:r>
-            <a:r>
-              <a:rPr lang="ko-KR" sz="1800">
-                <a:latin typeface="맑은 고딕" charset="0"/>
-                <a:ea typeface="맑은 고딕" charset="0"/>
-              </a:rPr>
-              <a:t> Physical Box</a:t>
-            </a:r>
-            <a:r>
-              <a:rPr lang="ko-KR" sz="1800">
-                <a:latin typeface="맑은 고딕" charset="0"/>
-                <a:ea typeface="맑은 고딕" charset="0"/>
-              </a:rPr>
-              <a:t> 오브젝트를 선택하고 </a:t>
-            </a:r>
-            <a:r>
-              <a:rPr lang="ko-KR" sz="1800" b="0">
-                <a:solidFill>
-                  <a:schemeClr val="tx1"/>
-                </a:solidFill>
-                <a:latin typeface="맑은 고딕" charset="0"/>
-                <a:ea typeface="맑은 고딕" charset="0"/>
-              </a:rPr>
-              <a:t>UI에서 Image를 생성한 다음 State라는 이름으로 정의합니다.</a:t>
+              <a:t>오브젝트에 넣어줍니다.</a:t>
             </a:r>
             <a:endParaRPr lang="ko-KR" altLang="en-US" sz="1800" b="0">
               <a:solidFill>
@@ -8072,9 +7908,86 @@
           </a:p>
         </p:txBody>
       </p:sp>
+      <p:sp>
+        <p:nvSpPr>
+          <p:cNvPr id="49" name="텍스트 상자 89"/>
+          <p:cNvSpPr txBox="1">
+            <a:spLocks/>
+          </p:cNvSpPr>
+          <p:nvPr/>
+        </p:nvSpPr>
+        <p:spPr>
+          <a:xfrm rot="0">
+            <a:off x="1230630" y="4946650"/>
+            <a:ext cx="4140835" cy="1231265"/>
+          </a:xfrm>
+          <a:prstGeom prst="rect"/>
+          <a:noFill/>
+          <a:ln w="0">
+            <a:noFill/>
+            <a:prstDash/>
+          </a:ln>
+        </p:spPr>
+        <p:txBody>
+          <a:bodyPr wrap="square" lIns="89535" tIns="46355" rIns="89535" bIns="46355" numCol="1" vert="horz" anchor="t">
+            <a:spAutoFit/>
+          </a:bodyPr>
+          <a:lstStyle/>
+          <a:p>
+            <a:pPr marL="0" indent="0" rtl="0" algn="l" defTabSz="914400" eaLnBrk="1" latinLnBrk="0" hangingPunct="1">
+              <a:buFontTx/>
+              <a:buNone/>
+            </a:pPr>
+            <a:r>
+              <a:rPr lang="ko-KR" sz="2000" b="1">
+                <a:solidFill>
+                  <a:srgbClr val="0611F2"/>
+                </a:solidFill>
+                <a:latin typeface="맑은 고딕" charset="0"/>
+                <a:ea typeface="맑은 고딕" charset="0"/>
+              </a:rPr>
+              <a:t>12.</a:t>
+            </a:r>
+            <a:r>
+              <a:rPr sz="2000" b="1">
+                <a:solidFill>
+                  <a:srgbClr val="0611F2"/>
+                </a:solidFill>
+                <a:latin typeface="맑은 고딕" charset="0"/>
+                <a:ea typeface="맑은 고딕" charset="0"/>
+              </a:rPr>
+              <a:t> </a:t>
+            </a:r>
+            <a:r>
+              <a:rPr lang="ko-KR" sz="1800">
+                <a:latin typeface="맑은 고딕" charset="0"/>
+                <a:ea typeface="맑은 고딕" charset="0"/>
+              </a:rPr>
+              <a:t>그러고 나서 Physical Box 오브젝트를 선택하고 </a:t>
+            </a:r>
+            <a:r>
+              <a:rPr lang="ko-KR" sz="1800" b="0">
+                <a:solidFill>
+                  <a:schemeClr val="tx1"/>
+                </a:solidFill>
+                <a:latin typeface="맑은 고딕" charset="0"/>
+                <a:ea typeface="맑은 고딕" charset="0"/>
+              </a:rPr>
+              <a:t>UI에서 Image를 생성한 다음 State라는 이름으로 정의합니다.</a:t>
+            </a:r>
+            <a:endParaRPr lang="ko-KR" altLang="en-US" sz="1800" b="0">
+              <a:solidFill>
+                <a:schemeClr val="tx1"/>
+              </a:solidFill>
+              <a:latin typeface="맑은 고딕" charset="0"/>
+              <a:ea typeface="맑은 고딕" charset="0"/>
+            </a:endParaRPr>
+          </a:p>
+        </p:txBody>
+      </p:sp>
       <p:pic>
         <p:nvPicPr>
-          <p:cNvPr id="58" name="그림 23" descr="C:/Users/Admin1/AppData/Roaming/PolarisOffice/ETemp/24108_19847768/fImage232801079169.png"/>
+          <p:cNvPr id="58" name="그림 23"/>
           <p:cNvPicPr>
             <a:picLocks noChangeAspect="1"/>
           </p:cNvPicPr>
@@ -8105,7 +8018,7 @@
       </p:pic>
       <p:pic>
         <p:nvPicPr>
-          <p:cNvPr id="59" name="그림 26" descr="C:/Users/Admin1/AppData/Roaming/PolarisOffice/ETemp/24108_19847768/fImage80001085724.png"/>
+          <p:cNvPr id="59" name="그림 26"/>
           <p:cNvPicPr>
             <a:picLocks noChangeAspect="1"/>
           </p:cNvPicPr>
@@ -8136,14 +8049,45 @@
       </p:pic>
       <p:pic>
         <p:nvPicPr>
-          <p:cNvPr id="61" name="그림 32" descr="C:/Users/Admin1/AppData/Roaming/PolarisOffice/ETemp/24108_19847768/fImage140861101478.png"/>
+          <p:cNvPr id="62" name="그림 33" descr="C:/Users/Admin1/AppData/Roaming/PolarisOffice/ETemp/19904_10543744/fImage81101119358.png"/>
           <p:cNvPicPr>
             <a:picLocks noChangeAspect="1"/>
           </p:cNvPicPr>
           <p:nvPr/>
         </p:nvPicPr>
         <p:blipFill rotWithShape="1">
-          <a:blip r:embed="rId11" cstate="print">
+          <a:blip r:embed="rId12" cstate="hqprint">
+            <a:extLst>
+              <a:ext uri="{28A0092B-C50C-407E-A947-70E740481C1C}">
+                <a14:useLocalDpi xmlns:a14="http://schemas.microsoft.com/office/drawing/2010/main"/>
+              </a:ext>
+            </a:extLst>
+          </a:blip>
+          <a:stretch>
+            <a:fillRect/>
+          </a:stretch>
+        </p:blipFill>
+        <p:spPr>
+          <a:xfrm rot="0">
+            <a:off x="6806565" y="1444625"/>
+            <a:ext cx="1291590" cy="1162685"/>
+          </a:xfrm>
+          <a:prstGeom prst="roundRect"/>
+          <a:solidFill>
+            <a:srgbClr val="EDEDED"/>
+          </a:solidFill>
+        </p:spPr>
+      </p:pic>
+      <p:pic>
+        <p:nvPicPr>
+          <p:cNvPr id="64" name="그림 46"/>
+          <p:cNvPicPr>
+            <a:picLocks noChangeAspect="1"/>
+          </p:cNvPicPr>
+          <p:nvPr/>
+        </p:nvPicPr>
+        <p:blipFill rotWithShape="1">
+          <a:blip r:embed="rId13" cstate="print">
             <a:extLst>
               <a:ext uri="{28A0092B-C50C-407E-A947-70E740481C1C}">
                 <a14:useLocalDpi xmlns:a14="http://schemas.microsoft.com/office/drawing/2010/main" val="0"/>
@@ -8156,8 +8100,8 @@
         </p:blipFill>
         <p:spPr>
           <a:xfrm rot="0">
-            <a:off x="8246745" y="1446530"/>
-            <a:ext cx="2710815" cy="1160780"/>
+            <a:off x="6817995" y="4000500"/>
+            <a:ext cx="1278890" cy="1148715"/>
           </a:xfrm>
           <a:prstGeom prst="roundRect"/>
           <a:solidFill>
@@ -8167,14 +8111,14 @@
       </p:pic>
       <p:pic>
         <p:nvPicPr>
-          <p:cNvPr id="62" name="그림 33" descr="C:/Users/Admin1/AppData/Roaming/PolarisOffice/ETemp/24108_19847768/fImage81101119358.png"/>
+          <p:cNvPr id="65" name="그림 47"/>
           <p:cNvPicPr>
             <a:picLocks noChangeAspect="1"/>
           </p:cNvPicPr>
           <p:nvPr/>
         </p:nvPicPr>
         <p:blipFill rotWithShape="1">
-          <a:blip r:embed="rId12" cstate="print">
+          <a:blip r:embed="rId14" cstate="print">
             <a:extLst>
               <a:ext uri="{28A0092B-C50C-407E-A947-70E740481C1C}">
                 <a14:useLocalDpi xmlns:a14="http://schemas.microsoft.com/office/drawing/2010/main" val="0"/>
@@ -8187,8 +8131,8 @@
         </p:blipFill>
         <p:spPr>
           <a:xfrm rot="0">
-            <a:off x="6816725" y="1444625"/>
-            <a:ext cx="1280795" cy="1162050"/>
+            <a:off x="8229600" y="3982720"/>
+            <a:ext cx="2727325" cy="1173480"/>
           </a:xfrm>
           <a:prstGeom prst="roundRect"/>
           <a:solidFill>
@@ -8196,16 +8140,87 @@
           </a:solidFill>
         </p:spPr>
       </p:pic>
+      <p:sp>
+        <p:nvSpPr>
+          <p:cNvPr id="66" name="텍스트 상자 52"/>
+          <p:cNvSpPr txBox="1">
+            <a:spLocks/>
+          </p:cNvSpPr>
+          <p:nvPr/>
+        </p:nvSpPr>
+        <p:spPr>
+          <a:xfrm>
+            <a:off x="6813550" y="5229860"/>
+            <a:ext cx="4141470" cy="954405"/>
+          </a:xfrm>
+          <a:prstGeom prst="rect"/>
+          <a:noFill/>
+          <a:ln w="0">
+            <a:noFill/>
+            <a:prstDash/>
+          </a:ln>
+        </p:spPr>
+        <p:txBody>
+          <a:bodyPr wrap="square" lIns="89535" tIns="46355" rIns="89535" bIns="46355" numCol="1" vert="horz" anchor="t">
+            <a:spAutoFit/>
+          </a:bodyPr>
+          <a:lstStyle/>
+          <a:p>
+            <a:pPr marL="0" indent="0" rtl="0" algn="l" defTabSz="914400" eaLnBrk="1" latinLnBrk="0" hangingPunct="1">
+              <a:buFontTx/>
+              <a:buNone/>
+            </a:pPr>
+            <a:r>
+              <a:rPr lang="ko-KR" sz="2000" b="1">
+                <a:solidFill>
+                  <a:srgbClr val="0611F2"/>
+                </a:solidFill>
+                <a:latin typeface="맑은 고딕" charset="0"/>
+                <a:ea typeface="맑은 고딕" charset="0"/>
+              </a:rPr>
+              <a:t>14</a:t>
+            </a:r>
+            <a:r>
+              <a:rPr sz="2000" b="1">
+                <a:solidFill>
+                  <a:srgbClr val="0611F2"/>
+                </a:solidFill>
+                <a:latin typeface="맑은 고딕" charset="0"/>
+                <a:ea typeface="맑은 고딕" charset="0"/>
+              </a:rPr>
+              <a:t>. </a:t>
+            </a:r>
+            <a:r>
+              <a:rPr lang="ko-KR" sz="1800">
+                <a:latin typeface="맑은 고딕" charset="0"/>
+                <a:ea typeface="맑은 고딕" charset="0"/>
+              </a:rPr>
+              <a:t>그리고</a:t>
+            </a:r>
+            <a:r>
+              <a:rPr lang="ko-KR" sz="1800">
+                <a:latin typeface="맑은 고딕" charset="0"/>
+                <a:ea typeface="맑은 고딕" charset="0"/>
+              </a:rPr>
+              <a:t> Zoom 스크립트에서 Main Camera 변수에 Main Camera 오브젝트를 넣어줍니다.</a:t>
+            </a:r>
+            <a:endParaRPr lang="ko-KR" altLang="en-US" sz="1800">
+              <a:latin typeface="맑은 고딕" charset="0"/>
+              <a:ea typeface="맑은 고딕" charset="0"/>
+            </a:endParaRPr>
+          </a:p>
+        </p:txBody>
+      </p:sp>
       <p:cxnSp>
         <p:nvCxnSpPr>
-          <p:cNvPr id="63" name="도형 36"/>
+          <p:cNvPr id="67" name="도형 53"/>
           <p:cNvCxnSpPr/>
           <p:nvPr/>
         </p:nvCxnSpPr>
         <p:spPr>
-          <a:xfrm rot="0" flipH="1">
-            <a:off x="7654925" y="1920240"/>
-            <a:ext cx="2188210" cy="349250"/>
+          <a:xfrm rot="0">
+            <a:off x="7923530" y="4182745"/>
+            <a:ext cx="2927350" cy="658495"/>
           </a:xfrm>
           <a:prstGeom prst="straightConnector1"/>
           <a:ln w="6350" cap="flat" cmpd="sng">
@@ -8231,14 +8246,14 @@
       </p:cxnSp>
       <p:pic>
         <p:nvPicPr>
-          <p:cNvPr id="64" name="그림 46" descr="C:/Users/Admin1/AppData/Roaming/PolarisOffice/ETemp/24108_19847768/fImage79401206962.png"/>
+          <p:cNvPr id="68" name="그림 7" descr="C:/Users/Admin1/AppData/Roaming/PolarisOffice/ETemp/19904_10543744/fImage138331045724.png"/>
           <p:cNvPicPr>
             <a:picLocks noChangeAspect="1"/>
           </p:cNvPicPr>
           <p:nvPr/>
         </p:nvPicPr>
         <p:blipFill rotWithShape="1">
-          <a:blip r:embed="rId13" cstate="print">
+          <a:blip r:embed="rId15" cstate="print">
             <a:extLst>
               <a:ext uri="{28A0092B-C50C-407E-A947-70E740481C1C}">
                 <a14:useLocalDpi xmlns:a14="http://schemas.microsoft.com/office/drawing/2010/main" val="0"/>
@@ -8251,8 +8266,8 @@
         </p:blipFill>
         <p:spPr>
           <a:xfrm rot="0">
-            <a:off x="6817995" y="4000500"/>
-            <a:ext cx="1278890" cy="1148715"/>
+            <a:off x="8255000" y="1451610"/>
+            <a:ext cx="2699385" cy="1155700"/>
           </a:xfrm>
           <a:prstGeom prst="roundRect"/>
           <a:solidFill>
@@ -8260,111 +8275,16 @@
           </a:solidFill>
         </p:spPr>
       </p:pic>
-      <p:pic>
-        <p:nvPicPr>
-          <p:cNvPr id="65" name="그림 47" descr="C:/Users/Admin1/AppData/Roaming/PolarisOffice/ETemp/24108_19847768/fImage67651214464.png"/>
-          <p:cNvPicPr>
-            <a:picLocks noChangeAspect="1"/>
-          </p:cNvPicPr>
-          <p:nvPr/>
-        </p:nvPicPr>
-        <p:blipFill rotWithShape="1">
-          <a:blip r:embed="rId14" cstate="print">
-            <a:extLst>
-              <a:ext uri="{28A0092B-C50C-407E-A947-70E740481C1C}">
-                <a14:useLocalDpi xmlns:a14="http://schemas.microsoft.com/office/drawing/2010/main" val="0"/>
-              </a:ext>
-            </a:extLst>
-          </a:blip>
-          <a:stretch>
-            <a:fillRect/>
-          </a:stretch>
-        </p:blipFill>
-        <p:spPr>
-          <a:xfrm rot="0">
-            <a:off x="8229600" y="3982720"/>
-            <a:ext cx="2727325" cy="1173480"/>
-          </a:xfrm>
-          <a:prstGeom prst="roundRect"/>
-          <a:solidFill>
-            <a:srgbClr val="EDEDED"/>
-          </a:solidFill>
-        </p:spPr>
-      </p:pic>
-      <p:sp>
-        <p:nvSpPr>
-          <p:cNvPr id="66" name="텍스트 상자 52"/>
-          <p:cNvSpPr txBox="1">
-            <a:spLocks/>
-          </p:cNvSpPr>
-          <p:nvPr/>
-        </p:nvSpPr>
-        <p:spPr>
-          <a:xfrm rot="0">
-            <a:off x="6813550" y="5229860"/>
-            <a:ext cx="4140835" cy="954405"/>
-          </a:xfrm>
-          <a:prstGeom prst="rect"/>
-          <a:noFill/>
-          <a:ln w="0">
-            <a:noFill/>
-            <a:prstDash/>
-          </a:ln>
-        </p:spPr>
-        <p:txBody>
-          <a:bodyPr wrap="square" lIns="89535" tIns="46355" rIns="89535" bIns="46355" numCol="1" vert="horz" anchor="t">
-            <a:spAutoFit/>
-          </a:bodyPr>
-          <a:lstStyle/>
-          <a:p>
-            <a:pPr marL="0" indent="0" rtl="0" algn="l" defTabSz="914400" eaLnBrk="1" latinLnBrk="0" hangingPunct="1">
-              <a:buFontTx/>
-              <a:buNone/>
-            </a:pPr>
-            <a:r>
-              <a:rPr lang="ko-KR" sz="2000" b="1">
-                <a:solidFill>
-                  <a:srgbClr val="0611F2"/>
-                </a:solidFill>
-                <a:latin typeface="맑은 고딕" charset="0"/>
-                <a:ea typeface="맑은 고딕" charset="0"/>
-              </a:rPr>
-              <a:t>14</a:t>
-            </a:r>
-            <a:r>
-              <a:rPr sz="2000" b="1">
-                <a:solidFill>
-                  <a:srgbClr val="0611F2"/>
-                </a:solidFill>
-                <a:latin typeface="맑은 고딕" charset="0"/>
-                <a:ea typeface="맑은 고딕" charset="0"/>
-              </a:rPr>
-              <a:t>. </a:t>
-            </a:r>
-            <a:r>
-              <a:rPr lang="ko-KR" sz="1800">
-                <a:latin typeface="맑은 고딕" charset="0"/>
-                <a:ea typeface="맑은 고딕" charset="0"/>
-              </a:rPr>
-              <a:t>이제 Zoom 스크립트에서 Main Camera 변수에 Main Camera 오브젝트를 넣어줍니다.</a:t>
-            </a:r>
-            <a:endParaRPr lang="ko-KR" altLang="en-US" sz="1800">
-              <a:latin typeface="맑은 고딕" charset="0"/>
-              <a:ea typeface="맑은 고딕" charset="0"/>
-            </a:endParaRPr>
-          </a:p>
-        </p:txBody>
-      </p:sp>
       <p:cxnSp>
         <p:nvCxnSpPr>
-          <p:cNvPr id="67" name="도형 53"/>
+          <p:cNvPr id="63" name="도형 36"/>
           <p:cNvCxnSpPr/>
           <p:nvPr/>
         </p:nvCxnSpPr>
         <p:spPr>
-          <a:xfrm rot="0">
-            <a:off x="7923530" y="4182745"/>
-            <a:ext cx="2927350" cy="658495"/>
+          <a:xfrm rot="0" flipH="1">
+            <a:off x="7654925" y="1920240"/>
+            <a:ext cx="2188210" cy="349250"/>
           </a:xfrm>
           <a:prstGeom prst="straightConnector1"/>
           <a:ln w="6350" cap="flat" cmpd="sng">
@@ -8490,14 +8410,255 @@
       </p:sp>
       <p:pic>
         <p:nvPicPr>
-          <p:cNvPr id="79" name="그림 39"/>
+          <p:cNvPr id="79" name="그림 39" descr="C:/Users/Admin1/AppData/Roaming/PolarisOffice/ETemp/19904_10543744/fImage157591155705.png"/>
           <p:cNvPicPr>
             <a:picLocks noChangeAspect="1"/>
           </p:cNvPicPr>
           <p:nvPr/>
         </p:nvPicPr>
         <p:blipFill rotWithShape="1">
-          <a:blip r:embed="rId17" cstate="print">
+          <a:blip r:embed="rId17" cstate="hqprint">
+            <a:extLst>
+              <a:ext uri="{28A0092B-C50C-407E-A947-70E740481C1C}">
+                <a14:useLocalDpi xmlns:a14="http://schemas.microsoft.com/office/drawing/2010/main"/>
+              </a:ext>
+            </a:extLst>
+          </a:blip>
+          <a:stretch>
+            <a:fillRect/>
+          </a:stretch>
+        </p:blipFill>
+        <p:spPr>
+          <a:xfrm rot="0">
+            <a:off x="2528570" y="1437640"/>
+            <a:ext cx="2842895" cy="1247140"/>
+          </a:xfrm>
+          <a:prstGeom prst="roundRect"/>
+          <a:solidFill>
+            <a:srgbClr val="EDEDED"/>
+          </a:solidFill>
+        </p:spPr>
+      </p:pic>
+      <p:sp>
+        <p:nvSpPr>
+          <p:cNvPr id="80" name="텍스트 상자 54"/>
+          <p:cNvSpPr txBox="1">
+            <a:spLocks/>
+          </p:cNvSpPr>
+          <p:nvPr/>
+        </p:nvSpPr>
+        <p:spPr>
+          <a:xfrm rot="0">
+            <a:off x="1221105" y="2795270"/>
+            <a:ext cx="4149725" cy="954405"/>
+          </a:xfrm>
+          <a:prstGeom prst="rect"/>
+          <a:noFill/>
+          <a:ln w="0">
+            <a:noFill/>
+            <a:prstDash/>
+          </a:ln>
+        </p:spPr>
+        <p:txBody>
+          <a:bodyPr wrap="square" lIns="89535" tIns="46355" rIns="89535" bIns="46355" numCol="1" vert="horz" anchor="t">
+            <a:spAutoFit/>
+          </a:bodyPr>
+          <a:lstStyle/>
+          <a:p>
+            <a:pPr marL="0" indent="0" rtl="0" algn="l" defTabSz="914400" eaLnBrk="1" latinLnBrk="0" hangingPunct="1">
+              <a:buFontTx/>
+              <a:buNone/>
+            </a:pPr>
+            <a:r>
+              <a:rPr lang="ko-KR" sz="2000" b="1">
+                <a:solidFill>
+                  <a:srgbClr val="0611F2"/>
+                </a:solidFill>
+                <a:latin typeface="맑은 고딕" charset="0"/>
+                <a:ea typeface="맑은 고딕" charset="0"/>
+              </a:rPr>
+              <a:t>15</a:t>
+            </a:r>
+            <a:r>
+              <a:rPr sz="2000" b="1">
+                <a:solidFill>
+                  <a:srgbClr val="0611F2"/>
+                </a:solidFill>
+                <a:latin typeface="맑은 고딕" charset="0"/>
+                <a:ea typeface="맑은 고딕" charset="0"/>
+              </a:rPr>
+              <a:t>. </a:t>
+            </a:r>
+            <a:r>
+              <a:rPr lang="ko-KR" sz="1800">
+                <a:latin typeface="맑은 고딕" charset="0"/>
+                <a:ea typeface="맑은 고딕" charset="0"/>
+              </a:rPr>
+              <a:t>그</a:t>
+            </a:r>
+            <a:r>
+              <a:rPr lang="ko-KR" sz="1800">
+                <a:latin typeface="맑은 고딕" charset="0"/>
+                <a:ea typeface="맑은 고딕" charset="0"/>
+              </a:rPr>
+              <a:t>런 다음</a:t>
+            </a:r>
+            <a:r>
+              <a:rPr lang="ko-KR" sz="1800">
+                <a:latin typeface="맑은 고딕" charset="0"/>
+                <a:ea typeface="맑은 고딕" charset="0"/>
+              </a:rPr>
+              <a:t> Canvas 오브젝트를 선택한 다음 Render Mode를 World Space를 설정합니다.</a:t>
+            </a:r>
+            <a:endParaRPr lang="ko-KR" altLang="en-US" sz="1800">
+              <a:latin typeface="맑은 고딕" charset="0"/>
+              <a:ea typeface="맑은 고딕" charset="0"/>
+            </a:endParaRPr>
+          </a:p>
+        </p:txBody>
+      </p:sp>
+      <p:pic>
+        <p:nvPicPr>
+          <p:cNvPr id="81" name="그림 59" descr="C:/Users/Admin1/AppData/Roaming/PolarisOffice/ETemp/19904_10543744/fImage80701258145.png"/>
+          <p:cNvPicPr>
+            <a:picLocks noChangeAspect="1"/>
+          </p:cNvPicPr>
+          <p:nvPr/>
+        </p:nvPicPr>
+        <p:blipFill rotWithShape="1">
+          <a:blip r:embed="rId18" cstate="hqprint">
+            <a:extLst>
+              <a:ext uri="{28A0092B-C50C-407E-A947-70E740481C1C}">
+                <a14:useLocalDpi xmlns:a14="http://schemas.microsoft.com/office/drawing/2010/main"/>
+              </a:ext>
+            </a:extLst>
+          </a:blip>
+          <a:stretch>
+            <a:fillRect/>
+          </a:stretch>
+        </p:blipFill>
+        <p:spPr>
+          <a:xfrm rot="0">
+            <a:off x="1223645" y="1428750"/>
+            <a:ext cx="1193800" cy="1254125"/>
+          </a:xfrm>
+          <a:prstGeom prst="roundRect"/>
+          <a:solidFill>
+            <a:srgbClr val="EDEDED"/>
+          </a:solidFill>
+        </p:spPr>
+      </p:pic>
+      <p:sp>
+        <p:nvSpPr>
+          <p:cNvPr id="84" name="텍스트 상자 5"/>
+          <p:cNvSpPr txBox="1">
+            <a:spLocks/>
+          </p:cNvSpPr>
+          <p:nvPr/>
+        </p:nvSpPr>
+        <p:spPr>
+          <a:xfrm rot="0">
+            <a:off x="1221105" y="5476875"/>
+            <a:ext cx="4113530" cy="677545"/>
+          </a:xfrm>
+          <a:prstGeom prst="rect"/>
+          <a:noFill/>
+          <a:ln w="0">
+            <a:noFill/>
+            <a:prstDash/>
+          </a:ln>
+        </p:spPr>
+        <p:txBody>
+          <a:bodyPr wrap="square" lIns="89535" tIns="46355" rIns="89535" bIns="46355" numCol="1" vert="horz" anchor="t">
+            <a:spAutoFit/>
+          </a:bodyPr>
+          <a:lstStyle/>
+          <a:p>
+            <a:pPr marL="0" indent="0" rtl="0" algn="l" defTabSz="914400" eaLnBrk="1" latinLnBrk="0" hangingPunct="1">
+              <a:buFontTx/>
+              <a:buNone/>
+            </a:pPr>
+            <a:r>
+              <a:rPr lang="ko-KR" sz="2000" b="1">
+                <a:solidFill>
+                  <a:srgbClr val="0611F2"/>
+                </a:solidFill>
+                <a:latin typeface="맑은 고딕" charset="0"/>
+                <a:ea typeface="맑은 고딕" charset="0"/>
+              </a:rPr>
+              <a:t>1</a:t>
+            </a:r>
+            <a:r>
+              <a:rPr lang="ko-KR" sz="2000" b="1">
+                <a:solidFill>
+                  <a:srgbClr val="0611F2"/>
+                </a:solidFill>
+                <a:latin typeface="맑은 고딕" charset="0"/>
+                <a:ea typeface="맑은 고딕" charset="0"/>
+              </a:rPr>
+              <a:t>6</a:t>
+            </a:r>
+            <a:r>
+              <a:rPr sz="2000" b="1">
+                <a:solidFill>
+                  <a:srgbClr val="0611F2"/>
+                </a:solidFill>
+                <a:latin typeface="맑은 고딕" charset="0"/>
+                <a:ea typeface="맑은 고딕" charset="0"/>
+              </a:rPr>
+              <a:t>. </a:t>
+            </a:r>
+            <a:r>
+              <a:rPr lang="ko-KR" sz="1800">
+                <a:latin typeface="맑은 고딕" charset="0"/>
+                <a:ea typeface="맑은 고딕" charset="0"/>
+              </a:rPr>
+              <a:t>그</a:t>
+            </a:r>
+            <a:r>
+              <a:rPr lang="ko-KR" sz="1800">
+                <a:latin typeface="맑은 고딕" charset="0"/>
+                <a:ea typeface="맑은 고딕" charset="0"/>
+              </a:rPr>
+              <a:t>다음</a:t>
+            </a:r>
+            <a:r>
+              <a:rPr lang="ko-KR" sz="1800">
+                <a:latin typeface="맑은 고딕" charset="0"/>
+                <a:ea typeface="맑은 고딕" charset="0"/>
+              </a:rPr>
+              <a:t> </a:t>
+            </a:r>
+            <a:r>
+              <a:rPr lang="ko-KR" sz="1800" b="0">
+                <a:solidFill>
+                  <a:schemeClr val="tx1"/>
+                </a:solidFill>
+                <a:latin typeface="맑은 고딕" charset="0"/>
+                <a:ea typeface="맑은 고딕" charset="0"/>
+              </a:rPr>
+              <a:t>Right Wall 오브젝트의 위치와 회전 값을 설정합니다.</a:t>
+            </a:r>
+            <a:endParaRPr lang="ko-KR" altLang="en-US" sz="1800" b="0">
+              <a:solidFill>
+                <a:schemeClr val="tx1"/>
+              </a:solidFill>
+              <a:latin typeface="맑은 고딕" charset="0"/>
+              <a:ea typeface="맑은 고딕" charset="0"/>
+            </a:endParaRPr>
+          </a:p>
+        </p:txBody>
+      </p:sp>
+      <p:pic>
+        <p:nvPicPr>
+          <p:cNvPr id="87" name="그림 16" descr="C:/Users/Admin1/AppData/Roaming/PolarisOffice/ETemp/19904_10543744/fImage161511091478.png"/>
+          <p:cNvPicPr>
+            <a:picLocks noChangeAspect="1"/>
+          </p:cNvPicPr>
+          <p:nvPr/>
+        </p:nvPicPr>
+        <p:blipFill rotWithShape="1">
+          <a:blip r:embed="rId19" cstate="print">
             <a:extLst>
               <a:ext uri="{28A0092B-C50C-407E-A947-70E740481C1C}">
                 <a14:useLocalDpi xmlns:a14="http://schemas.microsoft.com/office/drawing/2010/main" val="0"/>
@@ -8510,8 +8671,8 @@
         </p:blipFill>
         <p:spPr>
           <a:xfrm rot="0">
-            <a:off x="2528570" y="1437640"/>
-            <a:ext cx="2842260" cy="1334135"/>
+            <a:off x="8122285" y="1420495"/>
+            <a:ext cx="2832100" cy="1446530"/>
           </a:xfrm>
           <a:prstGeom prst="roundRect"/>
           <a:solidFill>
@@ -8521,7 +8682,7 @@
       </p:pic>
       <p:sp>
         <p:nvSpPr>
-          <p:cNvPr id="80" name="텍스트 상자 54"/>
+          <p:cNvPr id="88" name="텍스트 상자 19"/>
           <p:cNvSpPr txBox="1">
             <a:spLocks/>
           </p:cNvSpPr>
@@ -8529,8 +8690,8 @@
         </p:nvSpPr>
         <p:spPr>
           <a:xfrm rot="0">
-            <a:off x="1229360" y="2884170"/>
-            <a:ext cx="4149090" cy="954405"/>
+            <a:off x="6840855" y="2983865"/>
+            <a:ext cx="4105275" cy="677545"/>
           </a:xfrm>
           <a:prstGeom prst="rect"/>
           <a:noFill/>
@@ -8557,7 +8718,17 @@
                 <a:latin typeface="맑은 고딕" charset="0"/>
                 <a:ea typeface="맑은 고딕" charset="0"/>
               </a:rPr>
-              <a:t>15</a:t>
+              <a:t>1</a:t>
+            </a:r>
+            <a:r>
+              <a:rPr lang="ko-KR" sz="2000" b="1">
+                <a:solidFill>
+                  <a:srgbClr val="0611F2"/>
+                </a:solidFill>
+                <a:latin typeface="맑은 고딕" charset="0"/>
+                <a:ea typeface="맑은 고딕" charset="0"/>
+              </a:rPr>
+              <a:t>7</a:t>
             </a:r>
             <a:r>
               <a:rPr sz="2000" b="1">
@@ -8574,9 +8745,36 @@
                 <a:latin typeface="맑은 고딕" charset="0"/>
                 <a:ea typeface="맑은 고딕" charset="0"/>
               </a:rPr>
-              <a:t>그리고 Canvas 오브젝트를 선택한 다음 Render Mode를 World Space를 설정합니다.</a:t>
-            </a:r>
-            <a:endParaRPr lang="ko-KR" altLang="en-US" sz="1800">
+              <a:t>그</a:t>
+            </a:r>
+            <a:r>
+              <a:rPr lang="ko-KR" sz="1800">
+                <a:latin typeface="맑은 고딕" charset="0"/>
+                <a:ea typeface="맑은 고딕" charset="0"/>
+              </a:rPr>
+              <a:t>러고 나서</a:t>
+            </a:r>
+            <a:r>
+              <a:rPr lang="ko-KR" sz="1800">
+                <a:latin typeface="맑은 고딕" charset="0"/>
+                <a:ea typeface="맑은 고딕" charset="0"/>
+              </a:rPr>
+              <a:t> </a:t>
+            </a:r>
+            <a:r>
+              <a:rPr lang="ko-KR" sz="1800" b="0">
+                <a:solidFill>
+                  <a:schemeClr val="tx1"/>
+                </a:solidFill>
+                <a:latin typeface="맑은 고딕" charset="0"/>
+                <a:ea typeface="맑은 고딕" charset="0"/>
+              </a:rPr>
+              <a:t>Canvas 오브젝트를 선택하고 크기를 설정합니다.</a:t>
+            </a:r>
+            <a:endParaRPr lang="ko-KR" altLang="en-US" sz="1800" b="0">
+              <a:solidFill>
+                <a:schemeClr val="tx1"/>
+              </a:solidFill>
               <a:latin typeface="맑은 고딕" charset="0"/>
               <a:ea typeface="맑은 고딕" charset="0"/>
             </a:endParaRPr>
@@ -8585,14 +8783,14 @@
       </p:sp>
       <p:pic>
         <p:nvPicPr>
-          <p:cNvPr id="81" name="그림 59"/>
+          <p:cNvPr id="89" name="그림 20" descr="C:/Users/Admin1/AppData/Roaming/PolarisOffice/ETemp/19904_10543744/fImage80461119358.png"/>
           <p:cNvPicPr>
             <a:picLocks noChangeAspect="1"/>
           </p:cNvPicPr>
           <p:nvPr/>
         </p:nvPicPr>
         <p:blipFill rotWithShape="1">
-          <a:blip r:embed="rId18" cstate="print">
+          <a:blip r:embed="rId20" cstate="print">
             <a:extLst>
               <a:ext uri="{28A0092B-C50C-407E-A947-70E740481C1C}">
                 <a14:useLocalDpi xmlns:a14="http://schemas.microsoft.com/office/drawing/2010/main" val="0"/>
@@ -8605,8 +8803,141 @@
         </p:blipFill>
         <p:spPr>
           <a:xfrm rot="0">
-            <a:off x="1223645" y="1428750"/>
-            <a:ext cx="1193165" cy="1343025"/>
+            <a:off x="6849745" y="1428750"/>
+            <a:ext cx="1117600" cy="1438275"/>
+          </a:xfrm>
+          <a:prstGeom prst="roundRect"/>
+          <a:solidFill>
+            <a:srgbClr val="EDEDED"/>
+          </a:solidFill>
+        </p:spPr>
+      </p:pic>
+      <p:pic>
+        <p:nvPicPr>
+          <p:cNvPr id="90" name="그림 33" descr="C:/Users/Admin1/AppData/Roaming/PolarisOffice/ETemp/19904_10543744/fImage125992078145.png"/>
+          <p:cNvPicPr>
+            <a:picLocks noChangeAspect="1"/>
+          </p:cNvPicPr>
+          <p:nvPr/>
+        </p:nvPicPr>
+        <p:blipFill rotWithShape="1">
+          <a:blip r:embed="rId21" cstate="hqprint">
+            <a:extLst>
+              <a:ext uri="{28A0092B-C50C-407E-A947-70E740481C1C}">
+                <a14:useLocalDpi xmlns:a14="http://schemas.microsoft.com/office/drawing/2010/main"/>
+              </a:ext>
+            </a:extLst>
+          </a:blip>
+          <a:stretch>
+            <a:fillRect/>
+          </a:stretch>
+        </p:blipFill>
+        <p:spPr>
+          <a:xfrm rot="0">
+            <a:off x="1212215" y="3895725"/>
+            <a:ext cx="4157345" cy="1516380"/>
+          </a:xfrm>
+          <a:prstGeom prst="roundRect"/>
+          <a:solidFill>
+            <a:srgbClr val="EDEDED"/>
+          </a:solidFill>
+        </p:spPr>
+      </p:pic>
+      <p:sp>
+        <p:nvSpPr>
+          <p:cNvPr id="91" name="텍스트 상자 34"/>
+          <p:cNvSpPr txBox="1">
+            <a:spLocks/>
+          </p:cNvSpPr>
+          <p:nvPr/>
+        </p:nvSpPr>
+        <p:spPr>
+          <a:xfrm rot="0">
+            <a:off x="6851015" y="5479415"/>
+            <a:ext cx="4095115" cy="677545"/>
+          </a:xfrm>
+          <a:prstGeom prst="rect"/>
+          <a:noFill/>
+          <a:ln w="0">
+            <a:noFill/>
+            <a:prstDash/>
+          </a:ln>
+        </p:spPr>
+        <p:txBody>
+          <a:bodyPr wrap="square" lIns="89535" tIns="46355" rIns="89535" bIns="46355" numCol="1" vert="horz" anchor="t">
+            <a:spAutoFit/>
+          </a:bodyPr>
+          <a:lstStyle/>
+          <a:p>
+            <a:pPr marL="0" indent="0" rtl="0" algn="l" defTabSz="914400" eaLnBrk="1" latinLnBrk="0" hangingPunct="1">
+              <a:buFontTx/>
+              <a:buNone/>
+            </a:pPr>
+            <a:r>
+              <a:rPr lang="ko-KR" sz="2000" b="1">
+                <a:solidFill>
+                  <a:srgbClr val="0611F2"/>
+                </a:solidFill>
+                <a:latin typeface="맑은 고딕" charset="0"/>
+                <a:ea typeface="맑은 고딕" charset="0"/>
+              </a:rPr>
+              <a:t>18</a:t>
+            </a:r>
+            <a:r>
+              <a:rPr sz="2000" b="1">
+                <a:solidFill>
+                  <a:srgbClr val="0611F2"/>
+                </a:solidFill>
+                <a:latin typeface="맑은 고딕" charset="0"/>
+                <a:ea typeface="맑은 고딕" charset="0"/>
+              </a:rPr>
+              <a:t>. </a:t>
+            </a:r>
+            <a:r>
+              <a:rPr lang="ko-KR" sz="1800">
+                <a:latin typeface="맑은 고딕" charset="0"/>
+                <a:ea typeface="맑은 고딕" charset="0"/>
+              </a:rPr>
+              <a:t>이제 </a:t>
+            </a:r>
+            <a:r>
+              <a:rPr lang="ko-KR" sz="1800">
+                <a:latin typeface="맑은 고딕" charset="0"/>
+                <a:ea typeface="맑은 고딕" charset="0"/>
+              </a:rPr>
+              <a:t>Ground 오브젝트의 위치와 회전 값을 초기화합니다.</a:t>
+            </a:r>
+            <a:endParaRPr lang="ko-KR" altLang="en-US" sz="1800">
+              <a:latin typeface="맑은 고딕" charset="0"/>
+              <a:ea typeface="맑은 고딕" charset="0"/>
+            </a:endParaRPr>
+          </a:p>
+        </p:txBody>
+      </p:sp>
+      <p:pic>
+        <p:nvPicPr>
+          <p:cNvPr id="92" name="그림 35" descr="C:/Users/Admin1/AppData/Roaming/PolarisOffice/ETemp/19904_10543744/fImage113691271478.png"/>
+          <p:cNvPicPr>
+            <a:picLocks noChangeAspect="1"/>
+          </p:cNvPicPr>
+          <p:nvPr/>
+        </p:nvPicPr>
+        <p:blipFill rotWithShape="1">
+          <a:blip r:embed="rId22" cstate="hqprint">
+            <a:extLst>
+              <a:ext uri="{28A0092B-C50C-407E-A947-70E740481C1C}">
+                <a14:useLocalDpi xmlns:a14="http://schemas.microsoft.com/office/drawing/2010/main"/>
+              </a:ext>
+            </a:extLst>
+          </a:blip>
+          <a:stretch>
+            <a:fillRect/>
+          </a:stretch>
+        </p:blipFill>
+        <p:spPr>
+          <a:xfrm rot="0">
+            <a:off x="6838950" y="3792855"/>
+            <a:ext cx="4115435" cy="1584960"/>
           </a:xfrm>
           <a:prstGeom prst="roundRect"/>
           <a:solidFill>
@@ -8638,7 +8969,7 @@
 </file>
 
 <file path=ppt/slides/slide7.xml><?xml version="1.0" encoding="utf-8"?>
-<p:sld xmlns:a="http://schemas.openxmlformats.org/drawingml/2006/main" xmlns:r="http://schemas.openxmlformats.org/officeDocument/2006/relationships" xmlns:p="http://schemas.openxmlformats.org/presentationml/2006/main" xmlns:p14="http://schemas.microsoft.com/office/powerpoint/2010/main">
+<p:sld xmlns:a="http://schemas.openxmlformats.org/drawingml/2006/main" xmlns:r="http://schemas.openxmlformats.org/officeDocument/2006/relationships" xmlns:p="http://schemas.openxmlformats.org/presentationml/2006/main">
   <p:cSld>
     <p:spTree>
       <p:nvGrpSpPr>
@@ -8664,8 +8995,8 @@
         </p:nvSpPr>
         <p:spPr>
           <a:xfrm rot="0">
-            <a:off x="4658995" y="450215"/>
-            <a:ext cx="2877185" cy="478155"/>
+            <a:off x="4339590" y="383540"/>
+            <a:ext cx="3524250" cy="478155"/>
           </a:xfrm>
           <a:prstGeom prst="rect"/>
           <a:noFill/>
@@ -8692,7 +9023,17 @@
                 <a:latin typeface="나눔바른고딕" charset="0"/>
                 <a:ea typeface="나눔바른고딕" charset="0"/>
               </a:rPr>
-              <a:t>RayCast</a:t>
+              <a:t>일곱</a:t>
+            </a:r>
+            <a:r>
+              <a:rPr lang="ko-KR" sz="2500" b="1">
+                <a:solidFill>
+                  <a:schemeClr val="tx1"/>
+                </a:solidFill>
+                <a:latin typeface="나눔바른고딕" charset="0"/>
+                <a:ea typeface="나눔바른고딕" charset="0"/>
+              </a:rPr>
+              <a:t> 번째 튜토리얼</a:t>
             </a:r>
             <a:endParaRPr lang="ko-KR" altLang="en-US" sz="2500" b="1">
               <a:solidFill>
@@ -8706,7 +9047,7 @@
       </p:sp>
       <p:sp>
         <p:nvSpPr>
-          <p:cNvPr id="61" name="텍스트 상자 4"/>
+          <p:cNvPr id="84" name="Rect 0"/>
           <p:cNvSpPr txBox="1">
             <a:spLocks/>
           </p:cNvSpPr>
@@ -8714,8 +9055,8 @@
         </p:nvSpPr>
         <p:spPr>
           <a:xfrm rot="0">
-            <a:off x="1229995" y="1454785"/>
-            <a:ext cx="4132580" cy="923925"/>
+            <a:off x="1221105" y="5476875"/>
+            <a:ext cx="4148455" cy="677545"/>
           </a:xfrm>
           <a:prstGeom prst="rect"/>
           <a:noFill/>
@@ -8725,7 +9066,7 @@
           </a:ln>
         </p:spPr>
         <p:txBody>
-          <a:bodyPr wrap="square" lIns="89535" tIns="46355" rIns="89535" bIns="46355" vert="horz" anchor="t">
+          <a:bodyPr wrap="square" lIns="89535" tIns="46355" rIns="89535" bIns="46355" numCol="1" vert="horz" anchor="t">
             <a:spAutoFit/>
           </a:bodyPr>
           <a:lstStyle/>
@@ -8735,48 +9076,53 @@
               <a:buNone/>
             </a:pPr>
             <a:r>
-              <a:rPr sz="1800">
-                <a:latin typeface="맑은 고딕" charset="0"/>
-                <a:ea typeface="맑은 고딕" charset="0"/>
-              </a:rPr>
-              <a:t>Physics.Raycast( ) 함수는 3</a:t>
-            </a:r>
-            <a:r>
-              <a:rPr sz="1800">
+              <a:rPr lang="ko-KR" sz="2000" b="1">
+                <a:solidFill>
+                  <a:srgbClr val="0611F2"/>
+                </a:solidFill>
+                <a:latin typeface="맑은 고딕" charset="0"/>
+                <a:ea typeface="맑은 고딕" charset="0"/>
+              </a:rPr>
+              <a:t>20</a:t>
+            </a:r>
+            <a:r>
+              <a:rPr sz="2000" b="1">
+                <a:solidFill>
+                  <a:srgbClr val="0611F2"/>
+                </a:solidFill>
+                <a:latin typeface="맑은 고딕" charset="0"/>
+                <a:ea typeface="맑은 고딕" charset="0"/>
+              </a:rPr>
+              <a:t>. </a:t>
+            </a:r>
+            <a:r>
+              <a:rPr lang="ko-KR" sz="1800">
+                <a:latin typeface="맑은 고딕" charset="0"/>
+                <a:ea typeface="맑은 고딕" charset="0"/>
+              </a:rPr>
+              <a:t>그리고</a:t>
+            </a:r>
+            <a:r>
+              <a:rPr lang="ko-KR" sz="1800">
                 <a:latin typeface="맑은 고딕" charset="0"/>
                 <a:ea typeface="맑은 고딕" charset="0"/>
               </a:rPr>
               <a:t> </a:t>
             </a:r>
             <a:r>
-              <a:rPr sz="1800">
-                <a:latin typeface="맑은 고딕" charset="0"/>
-                <a:ea typeface="맑은 고딕" charset="0"/>
-              </a:rPr>
-              <a:t>차원 공간에서 </a:t>
-            </a:r>
-            <a:r>
-              <a:rPr lang="ko-KR" sz="1800">
-                <a:latin typeface="맑은 고딕" charset="0"/>
-                <a:ea typeface="맑은 고딕" charset="0"/>
-              </a:rPr>
-              <a:t>특정한</a:t>
-            </a:r>
-            <a:r>
-              <a:rPr sz="1800">
-                <a:latin typeface="맑은 고딕" charset="0"/>
-                <a:ea typeface="맑은 고딕" charset="0"/>
-              </a:rPr>
-              <a:t> 방향으로 광선을 발사하</a:t>
-            </a:r>
-            <a:r>
-              <a:rPr lang="ko-KR" sz="1800">
-                <a:latin typeface="맑은 고딕" charset="0"/>
-                <a:ea typeface="맑은 고딕" charset="0"/>
-              </a:rPr>
-              <a:t>는 함수입니다.</a:t>
-            </a:r>
-            <a:endParaRPr lang="ko-KR" altLang="en-US" sz="1800">
+              <a:rPr lang="ko-KR" sz="1800" b="0">
+                <a:solidFill>
+                  <a:schemeClr val="tx1"/>
+                </a:solidFill>
+                <a:latin typeface="맑은 고딕" charset="0"/>
+                <a:ea typeface="맑은 고딕" charset="0"/>
+              </a:rPr>
+              <a:t>Canvas의 Event Camera에 Main Camera 오브젝트를 넣어줍니다.</a:t>
+            </a:r>
+            <a:endParaRPr lang="ko-KR" altLang="en-US" sz="1800" b="0">
+              <a:solidFill>
+                <a:schemeClr val="tx1"/>
+              </a:solidFill>
               <a:latin typeface="맑은 고딕" charset="0"/>
               <a:ea typeface="맑은 고딕" charset="0"/>
             </a:endParaRPr>
@@ -8785,7 +9131,7 @@
       </p:sp>
       <p:sp>
         <p:nvSpPr>
-          <p:cNvPr id="62" name="텍스트 상자 5"/>
+          <p:cNvPr id="91" name="Rect 0"/>
           <p:cNvSpPr txBox="1">
             <a:spLocks/>
           </p:cNvSpPr>
@@ -8793,8 +9139,8 @@
         </p:nvSpPr>
         <p:spPr>
           <a:xfrm rot="0">
-            <a:off x="1230630" y="5034915"/>
-            <a:ext cx="4140200" cy="1200785"/>
+            <a:off x="6859905" y="4925060"/>
+            <a:ext cx="4103370" cy="1231265"/>
           </a:xfrm>
           <a:prstGeom prst="rect"/>
           <a:noFill/>
@@ -8804,7 +9150,7 @@
           </a:ln>
         </p:spPr>
         <p:txBody>
-          <a:bodyPr wrap="square" lIns="89535" tIns="46355" rIns="89535" bIns="46355" vert="horz" anchor="t">
+          <a:bodyPr wrap="square" lIns="89535" tIns="46355" rIns="89535" bIns="46355" numCol="1" vert="horz" anchor="t">
             <a:spAutoFit/>
           </a:bodyPr>
           <a:lstStyle/>
@@ -8814,46 +9160,31 @@
               <a:buNone/>
             </a:pPr>
             <a:r>
-              <a:rPr sz="1800">
-                <a:latin typeface="맑은 고딕" charset="0"/>
-                <a:ea typeface="맑은 고딕" charset="0"/>
-              </a:rPr>
-              <a:t>Physics.Raycast( ) 함수</a:t>
+              <a:rPr lang="ko-KR" sz="2000" b="1">
+                <a:solidFill>
+                  <a:srgbClr val="0611F2"/>
+                </a:solidFill>
+                <a:latin typeface="맑은 고딕" charset="0"/>
+                <a:ea typeface="맑은 고딕" charset="0"/>
+              </a:rPr>
+              <a:t>21</a:t>
+            </a:r>
+            <a:r>
+              <a:rPr sz="2000" b="1">
+                <a:solidFill>
+                  <a:srgbClr val="0611F2"/>
+                </a:solidFill>
+                <a:latin typeface="맑은 고딕" charset="0"/>
+                <a:ea typeface="맑은 고딕" charset="0"/>
+              </a:rPr>
+              <a:t>. </a:t>
             </a:r>
             <a:r>
               <a:rPr lang="ko-KR" sz="1800">
                 <a:latin typeface="맑은 고딕" charset="0"/>
                 <a:ea typeface="맑은 고딕" charset="0"/>
               </a:rPr>
-              <a:t>의 경우</a:t>
-            </a:r>
-            <a:r>
-              <a:rPr sz="1800">
-                <a:latin typeface="맑은 고딕" charset="0"/>
-                <a:ea typeface="맑은 고딕" charset="0"/>
-              </a:rPr>
-              <a:t> </a:t>
-            </a:r>
-            <a:r>
-              <a:rPr lang="ko-KR" sz="1800">
-                <a:latin typeface="맑은 고딕" charset="0"/>
-                <a:ea typeface="맑은 고딕" charset="0"/>
-              </a:rPr>
-              <a:t>광선과 충돌한 오브젝트는</a:t>
-            </a:r>
-            <a:r>
-              <a:rPr sz="1800">
-                <a:latin typeface="맑은 고딕" charset="0"/>
-                <a:ea typeface="맑은 고딕" charset="0"/>
-              </a:rPr>
-              <a:t> 콜라이더 컴포넌트를 가지고 있어야 </a:t>
-            </a:r>
-            <a:r>
-              <a:rPr lang="ko-KR" sz="1800">
-                <a:latin typeface="맑은 고딕" charset="0"/>
-                <a:ea typeface="맑은 고딕" charset="0"/>
-              </a:rPr>
-              <a:t>감지할 수 있습니다.</a:t>
+              <a:t>그런 다음 Project 폴더 아래에 있는 Texture 폴더에 Location 텍스처를 선택하고 State 오브젝트의 Source Image에 넣어줍니다.</a:t>
             </a:r>
             <a:endParaRPr lang="ko-KR" altLang="en-US" sz="1800">
               <a:latin typeface="맑은 고딕" charset="0"/>
@@ -8864,7 +9195,220 @@
       </p:sp>
       <p:pic>
         <p:nvPicPr>
-          <p:cNvPr id="63" name="그림 6" descr="C:/Users/Admin1/AppData/Roaming/PolarisOffice/ETemp/21188_18992288/fImage394759941.png"/>
+          <p:cNvPr id="93" name="그림 43" descr="C:/Users/Admin1/AppData/Roaming/PolarisOffice/ETemp/19904_10543744/fImage173662076962.png"/>
+          <p:cNvPicPr>
+            <a:picLocks noChangeAspect="1"/>
+          </p:cNvPicPr>
+          <p:nvPr/>
+        </p:nvPicPr>
+        <p:blipFill rotWithShape="1">
+          <a:blip r:embed="rId2" cstate="print">
+            <a:extLst>
+              <a:ext uri="{28A0092B-C50C-407E-A947-70E740481C1C}">
+                <a14:useLocalDpi xmlns:a14="http://schemas.microsoft.com/office/drawing/2010/main" val="0"/>
+              </a:ext>
+            </a:extLst>
+          </a:blip>
+          <a:stretch>
+            <a:fillRect/>
+          </a:stretch>
+        </p:blipFill>
+        <p:spPr>
+          <a:xfrm rot="0">
+            <a:off x="1221105" y="1420495"/>
+            <a:ext cx="4157345" cy="1749425"/>
+          </a:xfrm>
+          <a:prstGeom prst="roundRect"/>
+          <a:solidFill>
+            <a:srgbClr val="EDEDED"/>
+          </a:solidFill>
+        </p:spPr>
+      </p:pic>
+      <p:sp>
+        <p:nvSpPr>
+          <p:cNvPr id="94" name="텍스트 상자 46"/>
+          <p:cNvSpPr txBox="1">
+            <a:spLocks/>
+          </p:cNvSpPr>
+          <p:nvPr/>
+        </p:nvSpPr>
+        <p:spPr>
+          <a:xfrm rot="0">
+            <a:off x="1223645" y="3288030"/>
+            <a:ext cx="4145915" cy="677545"/>
+          </a:xfrm>
+          <a:prstGeom prst="rect"/>
+          <a:noFill/>
+          <a:ln w="0">
+            <a:noFill/>
+            <a:prstDash/>
+          </a:ln>
+        </p:spPr>
+        <p:txBody>
+          <a:bodyPr wrap="square" lIns="89535" tIns="46355" rIns="89535" bIns="46355" numCol="1" vert="horz" anchor="t">
+            <a:spAutoFit/>
+          </a:bodyPr>
+          <a:lstStyle/>
+          <a:p>
+            <a:pPr marL="0" indent="0" rtl="0" algn="l" defTabSz="914400" eaLnBrk="1" latinLnBrk="0" hangingPunct="1">
+              <a:buFontTx/>
+              <a:buNone/>
+            </a:pPr>
+            <a:r>
+              <a:rPr lang="ko-KR" sz="2000" b="1">
+                <a:solidFill>
+                  <a:srgbClr val="0611F2"/>
+                </a:solidFill>
+                <a:latin typeface="맑은 고딕" charset="0"/>
+                <a:ea typeface="맑은 고딕" charset="0"/>
+              </a:rPr>
+              <a:t>1</a:t>
+            </a:r>
+            <a:r>
+              <a:rPr lang="ko-KR" sz="2000" b="1">
+                <a:solidFill>
+                  <a:srgbClr val="0611F2"/>
+                </a:solidFill>
+                <a:latin typeface="맑은 고딕" charset="0"/>
+                <a:ea typeface="맑은 고딕" charset="0"/>
+              </a:rPr>
+              <a:t>9</a:t>
+            </a:r>
+            <a:r>
+              <a:rPr sz="2000" b="1">
+                <a:solidFill>
+                  <a:srgbClr val="0611F2"/>
+                </a:solidFill>
+                <a:latin typeface="맑은 고딕" charset="0"/>
+                <a:ea typeface="맑은 고딕" charset="0"/>
+              </a:rPr>
+              <a:t>. </a:t>
+            </a:r>
+            <a:r>
+              <a:rPr lang="ko-KR" sz="1800">
+                <a:latin typeface="맑은 고딕" charset="0"/>
+                <a:ea typeface="맑은 고딕" charset="0"/>
+              </a:rPr>
+              <a:t>그다음 </a:t>
+            </a:r>
+            <a:r>
+              <a:rPr lang="ko-KR" sz="1800" b="0">
+                <a:solidFill>
+                  <a:schemeClr val="tx1"/>
+                </a:solidFill>
+                <a:latin typeface="맑은 고딕" charset="0"/>
+                <a:ea typeface="맑은 고딕" charset="0"/>
+              </a:rPr>
+              <a:t>State 오브젝트의 위치와 크기 그리고 회전 값을 설정합니다. </a:t>
+            </a:r>
+            <a:endParaRPr lang="ko-KR" altLang="en-US" sz="1800" b="0">
+              <a:solidFill>
+                <a:schemeClr val="tx1"/>
+              </a:solidFill>
+              <a:latin typeface="맑은 고딕" charset="0"/>
+              <a:ea typeface="맑은 고딕" charset="0"/>
+            </a:endParaRPr>
+          </a:p>
+        </p:txBody>
+      </p:sp>
+      <p:pic>
+        <p:nvPicPr>
+          <p:cNvPr id="95" name="그림 47" descr="C:/Users/Admin1/AppData/Roaming/PolarisOffice/ETemp/19904_10543744/fImage164012094464.png"/>
+          <p:cNvPicPr>
+            <a:picLocks noChangeAspect="1"/>
+          </p:cNvPicPr>
+          <p:nvPr/>
+        </p:nvPicPr>
+        <p:blipFill rotWithShape="1">
+          <a:blip r:embed="rId3" cstate="print">
+            <a:extLst>
+              <a:ext uri="{28A0092B-C50C-407E-A947-70E740481C1C}">
+                <a14:useLocalDpi xmlns:a14="http://schemas.microsoft.com/office/drawing/2010/main" val="0"/>
+              </a:ext>
+            </a:extLst>
+          </a:blip>
+          <a:stretch>
+            <a:fillRect/>
+          </a:stretch>
+        </p:blipFill>
+        <p:spPr>
+          <a:xfrm rot="0">
+            <a:off x="6848475" y="1420495"/>
+            <a:ext cx="4105910" cy="2096135"/>
+          </a:xfrm>
+          <a:prstGeom prst="roundRect"/>
+          <a:solidFill>
+            <a:srgbClr val="EDEDED"/>
+          </a:solidFill>
+        </p:spPr>
+      </p:pic>
+      <p:pic>
+        <p:nvPicPr>
+          <p:cNvPr id="96" name="그림 50" descr="C:/Users/Admin1/AppData/Roaming/PolarisOffice/ETemp/19904_10543744/fImage212342105705.png"/>
+          <p:cNvPicPr>
+            <a:picLocks noChangeAspect="1"/>
+          </p:cNvPicPr>
+          <p:nvPr/>
+        </p:nvPicPr>
+        <p:blipFill rotWithShape="1">
+          <a:blip r:embed="rId4" cstate="print">
+            <a:extLst>
+              <a:ext uri="{28A0092B-C50C-407E-A947-70E740481C1C}">
+                <a14:useLocalDpi xmlns:a14="http://schemas.microsoft.com/office/drawing/2010/main" val="0"/>
+              </a:ext>
+            </a:extLst>
+          </a:blip>
+          <a:stretch>
+            <a:fillRect/>
+          </a:stretch>
+        </p:blipFill>
+        <p:spPr>
+          <a:xfrm rot="0">
+            <a:off x="6858000" y="3696970"/>
+            <a:ext cx="4114165" cy="1135380"/>
+          </a:xfrm>
+          <a:prstGeom prst="roundRect"/>
+          <a:solidFill>
+            <a:srgbClr val="EDEDED"/>
+          </a:solidFill>
+        </p:spPr>
+      </p:pic>
+      <p:cxnSp>
+        <p:nvCxnSpPr>
+          <p:cNvPr id="97" name="도형 53"/>
+          <p:cNvCxnSpPr/>
+          <p:nvPr/>
+        </p:nvCxnSpPr>
+        <p:spPr>
+          <a:xfrm rot="0" flipV="1">
+            <a:off x="8979535" y="1731645"/>
+            <a:ext cx="1836420" cy="2226310"/>
+          </a:xfrm>
+          <a:prstGeom prst="straightConnector1"/>
+          <a:ln w="6350" cap="flat" cmpd="sng">
+            <a:prstDash/>
+            <a:headEnd type="none" w="med" len="med"/>
+            <a:tailEnd type="triangle" w="med" len="med"/>
+          </a:ln>
+        </p:spPr>
+        <p:style>
+          <a:lnRef idx="1">
+            <a:schemeClr val="accent1"/>
+          </a:lnRef>
+          <a:fillRef idx="0">
+            <a:schemeClr val="accent1"/>
+          </a:fillRef>
+          <a:effectRef idx="0">
+            <a:schemeClr val="accent1"/>
+          </a:effectRef>
+          <a:fontRef idx="minor">
+            <a:schemeClr val="tx1"/>
+          </a:fontRef>
+        </p:style>
+      </p:cxnSp>
+      <p:pic>
+        <p:nvPicPr>
+          <p:cNvPr id="98" name="그림 55" descr="C:/Users/Admin1/AppData/Roaming/PolarisOffice/ETemp/19904_10543744/fImage70042138145.png"/>
           <p:cNvPicPr>
             <a:picLocks noChangeAspect="1"/>
           </p:cNvPicPr>
@@ -8884,8 +9428,8 @@
         </p:blipFill>
         <p:spPr>
           <a:xfrm rot="0">
-            <a:off x="1229995" y="2560320"/>
-            <a:ext cx="4140835" cy="2303145"/>
+            <a:off x="1219200" y="4112260"/>
+            <a:ext cx="1310005" cy="1272540"/>
           </a:xfrm>
           <a:prstGeom prst="roundRect"/>
           <a:solidFill>
@@ -8895,17 +9439,17 @@
       </p:pic>
       <p:pic>
         <p:nvPicPr>
-          <p:cNvPr id="64" name="그림 25" descr="C:/Users/Admin1/AppData/Roaming/PolarisOffice/ETemp/21188_18992288/fImage1464831178467.png"/>
+          <p:cNvPr id="99" name="그림 56" descr="C:/Users/Admin1/AppData/Roaming/PolarisOffice/ETemp/19904_10543744/fImage120842143281.png"/>
           <p:cNvPicPr>
             <a:picLocks noChangeAspect="1"/>
           </p:cNvPicPr>
           <p:nvPr/>
         </p:nvPicPr>
         <p:blipFill rotWithShape="1">
-          <a:blip r:embed="rId6" cstate="hqprint">
+          <a:blip r:embed="rId6" cstate="print">
             <a:extLst>
               <a:ext uri="{28A0092B-C50C-407E-A947-70E740481C1C}">
-                <a14:useLocalDpi xmlns:a14="http://schemas.microsoft.com/office/drawing/2010/main"/>
+                <a14:useLocalDpi xmlns:a14="http://schemas.microsoft.com/office/drawing/2010/main" val="0"/>
               </a:ext>
             </a:extLst>
           </a:blip>
@@ -8915,8 +9459,8 @@
         </p:blipFill>
         <p:spPr>
           <a:xfrm rot="0">
-            <a:off x="6814820" y="2571750"/>
-            <a:ext cx="4148455" cy="2459990"/>
+            <a:off x="2658745" y="4112895"/>
+            <a:ext cx="2719705" cy="1264920"/>
           </a:xfrm>
           <a:prstGeom prst="roundRect"/>
           <a:solidFill>
@@ -8924,131 +9468,39 @@
           </a:solidFill>
         </p:spPr>
       </p:pic>
-      <p:sp>
-        <p:nvSpPr>
-          <p:cNvPr id="65" name="텍스트 상자 26"/>
-          <p:cNvSpPr txBox="1">
-            <a:spLocks/>
-          </p:cNvSpPr>
+      <p:cxnSp>
+        <p:nvCxnSpPr>
+          <p:cNvPr id="100" name="도형 61"/>
+          <p:cNvCxnSpPr/>
           <p:nvPr/>
-        </p:nvSpPr>
-        <p:spPr>
-          <a:xfrm rot="0">
-            <a:off x="6826885" y="1463675"/>
-            <a:ext cx="4145280" cy="961390"/>
-          </a:xfrm>
-          <a:prstGeom prst="rect"/>
-          <a:noFill/>
-        </p:spPr>
-        <p:txBody>
-          <a:bodyPr wrap="square" lIns="0" tIns="0" rIns="0" bIns="0" vert="horz" anchor="t">
-            <a:noAutofit/>
-          </a:bodyPr>
-          <a:lstStyle/>
-          <a:p>
-            <a:pPr marL="0" indent="0" rtl="0" algn="l" defTabSz="914400" eaLnBrk="1" latinLnBrk="0" hangingPunct="1">
-              <a:buFontTx/>
-              <a:buNone/>
-            </a:pPr>
-            <a:r>
-              <a:rPr sz="1800">
-                <a:latin typeface="맑은 고딕" charset="0"/>
-                <a:ea typeface="맑은 고딕" charset="0"/>
-              </a:rPr>
-              <a:t>Physics.Raycast( )</a:t>
-            </a:r>
-            <a:r>
-              <a:rPr sz="1800">
-                <a:latin typeface="맑은 고딕" charset="0"/>
-                <a:ea typeface="맑은 고딕" charset="0"/>
-              </a:rPr>
-              <a:t> </a:t>
-            </a:r>
-            <a:r>
-              <a:rPr lang="ko-KR" sz="1800">
-                <a:latin typeface="맑은 고딕" charset="0"/>
-                <a:ea typeface="맑은 고딕" charset="0"/>
-              </a:rPr>
-              <a:t>함수로</a:t>
-            </a:r>
-            <a:r>
-              <a:rPr sz="1800">
-                <a:latin typeface="맑은 고딕" charset="0"/>
-                <a:ea typeface="맑은 고딕" charset="0"/>
-              </a:rPr>
-              <a:t> 특정한 Layer만 검출하여 충돌하도록 설정할 수 있습니다.</a:t>
-            </a:r>
-            <a:endParaRPr lang="ko-KR" altLang="en-US" sz="1800">
-              <a:latin typeface="맑은 고딕" charset="0"/>
-              <a:ea typeface="맑은 고딕" charset="0"/>
-            </a:endParaRPr>
-          </a:p>
-          <a:p>
-            <a:pPr marL="0" indent="0" rtl="0" algn="l" defTabSz="914400" eaLnBrk="1" latinLnBrk="0" hangingPunct="1">
-              <a:buFontTx/>
-              <a:buNone/>
-            </a:pPr>
-            <a:endParaRPr lang="ko-KR" altLang="en-US" sz="1800">
-              <a:latin typeface="맑은 고딕" charset="0"/>
-              <a:ea typeface="맑은 고딕" charset="0"/>
-            </a:endParaRPr>
-          </a:p>
-        </p:txBody>
-      </p:sp>
-      <p:sp>
-        <p:nvSpPr>
-          <p:cNvPr id="66" name="텍스트 상자 27"/>
-          <p:cNvSpPr txBox="1">
-            <a:spLocks/>
-          </p:cNvSpPr>
-          <p:nvPr/>
-        </p:nvSpPr>
-        <p:spPr>
-          <a:xfrm rot="0">
-            <a:off x="6812280" y="5274310"/>
-            <a:ext cx="4159885" cy="961390"/>
-          </a:xfrm>
-          <a:prstGeom prst="rect"/>
-          <a:noFill/>
-        </p:spPr>
-        <p:txBody>
-          <a:bodyPr wrap="square" lIns="0" tIns="0" rIns="0" bIns="0" vert="horz" anchor="t">
-            <a:noAutofit/>
-          </a:bodyPr>
-          <a:lstStyle/>
-          <a:p>
-            <a:pPr marL="0" indent="0" rtl="0" algn="l" defTabSz="914400" eaLnBrk="1" latinLnBrk="0" hangingPunct="1">
-              <a:buFontTx/>
-              <a:buNone/>
-            </a:pPr>
-            <a:r>
-              <a:rPr sz="1800">
-                <a:latin typeface="맑은 고딕" charset="0"/>
-                <a:ea typeface="맑은 고딕" charset="0"/>
-              </a:rPr>
-              <a:t>LayerMask의 경우 32 bit의 int 형으로 bit로 각각의 </a:t>
-            </a:r>
-            <a:r>
-              <a:rPr lang="ko-KR" sz="1800">
-                <a:latin typeface="맑은 고딕" charset="0"/>
-                <a:ea typeface="맑은 고딕" charset="0"/>
-              </a:rPr>
-              <a:t>Layer</a:t>
-            </a:r>
-            <a:r>
-              <a:rPr sz="1800">
-                <a:latin typeface="맑은 고딕" charset="0"/>
-                <a:ea typeface="맑은 고딕" charset="0"/>
-              </a:rPr>
-              <a:t>를 구분하여 사용합니다.</a:t>
-            </a:r>
-            <a:endParaRPr lang="ko-KR" altLang="en-US" sz="1800">
-              <a:latin typeface="맑은 고딕" charset="0"/>
-              <a:ea typeface="맑은 고딕" charset="0"/>
-            </a:endParaRPr>
-          </a:p>
-        </p:txBody>
-      </p:sp>
+        </p:nvCxnSpPr>
+        <p:spPr>
+          <a:xfrm rot="0">
+            <a:off x="2277745" y="4347210"/>
+            <a:ext cx="2996565" cy="260350"/>
+          </a:xfrm>
+          <a:prstGeom prst="straightConnector1"/>
+          <a:ln w="6350" cap="flat" cmpd="sng">
+            <a:prstDash/>
+            <a:headEnd type="none" w="med" len="med"/>
+            <a:tailEnd type="triangle" w="med" len="med"/>
+          </a:ln>
+        </p:spPr>
+        <p:style>
+          <a:lnRef idx="1">
+            <a:schemeClr val="accent1"/>
+          </a:lnRef>
+          <a:fillRef idx="0">
+            <a:schemeClr val="accent1"/>
+          </a:fillRef>
+          <a:effectRef idx="0">
+            <a:schemeClr val="accent1"/>
+          </a:effectRef>
+          <a:fontRef idx="minor">
+            <a:schemeClr val="tx1"/>
+          </a:fontRef>
+        </p:style>
+      </p:cxnSp>
     </p:spTree>
   </p:cSld>
   <p:clrMapOvr>
@@ -9099,8 +9551,8 @@
         </p:nvSpPr>
         <p:spPr>
           <a:xfrm rot="0">
-            <a:off x="4339590" y="441960"/>
-            <a:ext cx="3508375" cy="478155"/>
+            <a:off x="4658995" y="450215"/>
+            <a:ext cx="2877185" cy="478155"/>
           </a:xfrm>
           <a:prstGeom prst="rect"/>
           <a:noFill/>
@@ -9127,7 +9579,7 @@
                 <a:latin typeface="나눔바른고딕" charset="0"/>
                 <a:ea typeface="나눔바른고딕" charset="0"/>
               </a:rPr>
-              <a:t>Space Conversion</a:t>
+              <a:t>RayCast</a:t>
             </a:r>
             <a:endParaRPr lang="ko-KR" altLang="en-US" sz="2500" b="1">
               <a:solidFill>
@@ -9141,7 +9593,7 @@
       </p:sp>
       <p:sp>
         <p:nvSpPr>
-          <p:cNvPr id="3" name="텍스트 상자 9"/>
+          <p:cNvPr id="61" name="텍스트 상자 4"/>
           <p:cNvSpPr txBox="1">
             <a:spLocks/>
           </p:cNvSpPr>
@@ -9149,8 +9601,8 @@
         </p:nvSpPr>
         <p:spPr>
           <a:xfrm rot="0">
-            <a:off x="1222375" y="1445895"/>
-            <a:ext cx="4156710" cy="1200785"/>
+            <a:off x="1229995" y="1454785"/>
+            <a:ext cx="4132580" cy="923925"/>
           </a:xfrm>
           <a:prstGeom prst="rect"/>
           <a:noFill/>
@@ -9174,7 +9626,42 @@
                 <a:latin typeface="맑은 고딕" charset="0"/>
                 <a:ea typeface="맑은 고딕" charset="0"/>
               </a:rPr>
-              <a:t>ScreenPointToRay( ) 함수는 스크린 공간의 좌표를 월드 공간의 좌표로 변환하여 시작점으로 설정하는 함수입니다. </a:t>
+              <a:t>Physics.Raycast( ) 함수는 3</a:t>
+            </a:r>
+            <a:r>
+              <a:rPr sz="1800">
+                <a:latin typeface="맑은 고딕" charset="0"/>
+                <a:ea typeface="맑은 고딕" charset="0"/>
+              </a:rPr>
+              <a:t> </a:t>
+            </a:r>
+            <a:r>
+              <a:rPr sz="1800">
+                <a:latin typeface="맑은 고딕" charset="0"/>
+                <a:ea typeface="맑은 고딕" charset="0"/>
+              </a:rPr>
+              <a:t>차원 공간에서 </a:t>
+            </a:r>
+            <a:r>
+              <a:rPr lang="ko-KR" sz="1800">
+                <a:latin typeface="맑은 고딕" charset="0"/>
+                <a:ea typeface="맑은 고딕" charset="0"/>
+              </a:rPr>
+              <a:t>특정한</a:t>
+            </a:r>
+            <a:r>
+              <a:rPr sz="1800">
+                <a:latin typeface="맑은 고딕" charset="0"/>
+                <a:ea typeface="맑은 고딕" charset="0"/>
+              </a:rPr>
+              <a:t> 방향으로 광선을 발사하</a:t>
+            </a:r>
+            <a:r>
+              <a:rPr lang="ko-KR" sz="1800">
+                <a:latin typeface="맑은 고딕" charset="0"/>
+                <a:ea typeface="맑은 고딕" charset="0"/>
+              </a:rPr>
+              <a:t>는 함수입니다.</a:t>
             </a:r>
             <a:endParaRPr lang="ko-KR" altLang="en-US" sz="1800">
               <a:latin typeface="맑은 고딕" charset="0"/>
@@ -9185,7 +9672,7 @@
       </p:sp>
       <p:sp>
         <p:nvSpPr>
-          <p:cNvPr id="4" name="텍스트 상자 10"/>
+          <p:cNvPr id="62" name="텍스트 상자 5"/>
           <p:cNvSpPr txBox="1">
             <a:spLocks/>
           </p:cNvSpPr>
@@ -9193,8 +9680,8 @@
         </p:nvSpPr>
         <p:spPr>
           <a:xfrm rot="0">
-            <a:off x="1214120" y="5578475"/>
-            <a:ext cx="4156710" cy="647065"/>
+            <a:off x="1230630" y="5034915"/>
+            <a:ext cx="4140200" cy="1200785"/>
           </a:xfrm>
           <a:prstGeom prst="rect"/>
           <a:noFill/>
@@ -9218,7 +9705,42 @@
                 <a:latin typeface="맑은 고딕" charset="0"/>
                 <a:ea typeface="맑은 고딕" charset="0"/>
               </a:rPr>
-              <a:t>방향은 카메라가 비추는 방향으로 설정된 광선 객체를 반환합니다.</a:t>
+              <a:t>Physics.Raycast( ) 함수</a:t>
+            </a:r>
+            <a:r>
+              <a:rPr lang="ko-KR" sz="1800">
+                <a:latin typeface="맑은 고딕" charset="0"/>
+                <a:ea typeface="맑은 고딕" charset="0"/>
+              </a:rPr>
+              <a:t>의 경우</a:t>
+            </a:r>
+            <a:r>
+              <a:rPr sz="1800">
+                <a:latin typeface="맑은 고딕" charset="0"/>
+                <a:ea typeface="맑은 고딕" charset="0"/>
+              </a:rPr>
+              <a:t> </a:t>
+            </a:r>
+            <a:r>
+              <a:rPr lang="ko-KR" sz="1800">
+                <a:latin typeface="맑은 고딕" charset="0"/>
+                <a:ea typeface="맑은 고딕" charset="0"/>
+              </a:rPr>
+              <a:t>광선과 충돌한 오브젝트는</a:t>
+            </a:r>
+            <a:r>
+              <a:rPr sz="1800">
+                <a:latin typeface="맑은 고딕" charset="0"/>
+                <a:ea typeface="맑은 고딕" charset="0"/>
+              </a:rPr>
+              <a:t> 콜라이더 컴포넌트를 가지고 있어야 </a:t>
+            </a:r>
+            <a:r>
+              <a:rPr lang="ko-KR" sz="1800">
+                <a:latin typeface="맑은 고딕" charset="0"/>
+                <a:ea typeface="맑은 고딕" charset="0"/>
+              </a:rPr>
+              <a:t>감지할 수 있습니다.</a:t>
             </a:r>
             <a:endParaRPr lang="ko-KR" altLang="en-US" sz="1800">
               <a:latin typeface="맑은 고딕" charset="0"/>
@@ -9229,7 +9751,372 @@
       </p:sp>
       <p:pic>
         <p:nvPicPr>
-          <p:cNvPr id="6" name="그림 12" descr="C:/Users/Admin1/AppData/Roaming/PolarisOffice/ETemp/21188_18992288/fImage741231046334.png"/>
+          <p:cNvPr id="63" name="그림 6"/>
+          <p:cNvPicPr>
+            <a:picLocks noChangeAspect="1"/>
+          </p:cNvPicPr>
+          <p:nvPr/>
+        </p:nvPicPr>
+        <p:blipFill rotWithShape="1">
+          <a:blip r:embed="rId5" cstate="print">
+            <a:extLst>
+              <a:ext uri="{28A0092B-C50C-407E-A947-70E740481C1C}">
+                <a14:useLocalDpi xmlns:a14="http://schemas.microsoft.com/office/drawing/2010/main" val="0"/>
+              </a:ext>
+            </a:extLst>
+          </a:blip>
+          <a:stretch>
+            <a:fillRect/>
+          </a:stretch>
+        </p:blipFill>
+        <p:spPr>
+          <a:xfrm rot="0">
+            <a:off x="1229995" y="2560320"/>
+            <a:ext cx="4140835" cy="2303145"/>
+          </a:xfrm>
+          <a:prstGeom prst="roundRect"/>
+          <a:solidFill>
+            <a:srgbClr val="EDEDED"/>
+          </a:solidFill>
+        </p:spPr>
+      </p:pic>
+      <p:pic>
+        <p:nvPicPr>
+          <p:cNvPr id="64" name="그림 25"/>
+          <p:cNvPicPr>
+            <a:picLocks noChangeAspect="1"/>
+          </p:cNvPicPr>
+          <p:nvPr/>
+        </p:nvPicPr>
+        <p:blipFill rotWithShape="1">
+          <a:blip r:embed="rId6" cstate="hqprint">
+            <a:extLst>
+              <a:ext uri="{28A0092B-C50C-407E-A947-70E740481C1C}">
+                <a14:useLocalDpi xmlns:a14="http://schemas.microsoft.com/office/drawing/2010/main"/>
+              </a:ext>
+            </a:extLst>
+          </a:blip>
+          <a:stretch>
+            <a:fillRect/>
+          </a:stretch>
+        </p:blipFill>
+        <p:spPr>
+          <a:xfrm rot="0">
+            <a:off x="6814820" y="2571750"/>
+            <a:ext cx="4148455" cy="2459990"/>
+          </a:xfrm>
+          <a:prstGeom prst="roundRect"/>
+          <a:solidFill>
+            <a:srgbClr val="EDEDED"/>
+          </a:solidFill>
+        </p:spPr>
+      </p:pic>
+      <p:sp>
+        <p:nvSpPr>
+          <p:cNvPr id="65" name="텍스트 상자 26"/>
+          <p:cNvSpPr txBox="1">
+            <a:spLocks/>
+          </p:cNvSpPr>
+          <p:nvPr/>
+        </p:nvSpPr>
+        <p:spPr>
+          <a:xfrm rot="0">
+            <a:off x="6826885" y="1463675"/>
+            <a:ext cx="4145280" cy="961390"/>
+          </a:xfrm>
+          <a:prstGeom prst="rect"/>
+          <a:noFill/>
+        </p:spPr>
+        <p:txBody>
+          <a:bodyPr wrap="square" lIns="0" tIns="0" rIns="0" bIns="0" vert="horz" anchor="t">
+            <a:noAutofit/>
+          </a:bodyPr>
+          <a:lstStyle/>
+          <a:p>
+            <a:pPr marL="0" indent="0" rtl="0" algn="l" defTabSz="914400" eaLnBrk="1" latinLnBrk="0" hangingPunct="1">
+              <a:buFontTx/>
+              <a:buNone/>
+            </a:pPr>
+            <a:r>
+              <a:rPr sz="1800">
+                <a:latin typeface="맑은 고딕" charset="0"/>
+                <a:ea typeface="맑은 고딕" charset="0"/>
+              </a:rPr>
+              <a:t>Physics.Raycast( )</a:t>
+            </a:r>
+            <a:r>
+              <a:rPr sz="1800">
+                <a:latin typeface="맑은 고딕" charset="0"/>
+                <a:ea typeface="맑은 고딕" charset="0"/>
+              </a:rPr>
+              <a:t> </a:t>
+            </a:r>
+            <a:r>
+              <a:rPr lang="ko-KR" sz="1800">
+                <a:latin typeface="맑은 고딕" charset="0"/>
+                <a:ea typeface="맑은 고딕" charset="0"/>
+              </a:rPr>
+              <a:t>함수로</a:t>
+            </a:r>
+            <a:r>
+              <a:rPr sz="1800">
+                <a:latin typeface="맑은 고딕" charset="0"/>
+                <a:ea typeface="맑은 고딕" charset="0"/>
+              </a:rPr>
+              <a:t> 특정한 Layer만 검출하여 충돌하도록 설정할 수 있습니다.</a:t>
+            </a:r>
+            <a:endParaRPr lang="ko-KR" altLang="en-US" sz="1800">
+              <a:latin typeface="맑은 고딕" charset="0"/>
+              <a:ea typeface="맑은 고딕" charset="0"/>
+            </a:endParaRPr>
+          </a:p>
+          <a:p>
+            <a:pPr marL="0" indent="0" rtl="0" algn="l" defTabSz="914400" eaLnBrk="1" latinLnBrk="0" hangingPunct="1">
+              <a:buFontTx/>
+              <a:buNone/>
+            </a:pPr>
+            <a:endParaRPr lang="ko-KR" altLang="en-US" sz="1800">
+              <a:latin typeface="맑은 고딕" charset="0"/>
+              <a:ea typeface="맑은 고딕" charset="0"/>
+            </a:endParaRPr>
+          </a:p>
+        </p:txBody>
+      </p:sp>
+      <p:sp>
+        <p:nvSpPr>
+          <p:cNvPr id="66" name="텍스트 상자 27"/>
+          <p:cNvSpPr txBox="1">
+            <a:spLocks/>
+          </p:cNvSpPr>
+          <p:nvPr/>
+        </p:nvSpPr>
+        <p:spPr>
+          <a:xfrm rot="0">
+            <a:off x="6812280" y="5274310"/>
+            <a:ext cx="4159885" cy="961390"/>
+          </a:xfrm>
+          <a:prstGeom prst="rect"/>
+          <a:noFill/>
+        </p:spPr>
+        <p:txBody>
+          <a:bodyPr wrap="square" lIns="0" tIns="0" rIns="0" bIns="0" vert="horz" anchor="t">
+            <a:noAutofit/>
+          </a:bodyPr>
+          <a:lstStyle/>
+          <a:p>
+            <a:pPr marL="0" indent="0" rtl="0" algn="l" defTabSz="914400" eaLnBrk="1" latinLnBrk="0" hangingPunct="1">
+              <a:buFontTx/>
+              <a:buNone/>
+            </a:pPr>
+            <a:r>
+              <a:rPr sz="1800">
+                <a:latin typeface="맑은 고딕" charset="0"/>
+                <a:ea typeface="맑은 고딕" charset="0"/>
+              </a:rPr>
+              <a:t>LayerMask의 경우 32 bit의 int 형으로 bit로 각각의 </a:t>
+            </a:r>
+            <a:r>
+              <a:rPr lang="ko-KR" sz="1800">
+                <a:latin typeface="맑은 고딕" charset="0"/>
+                <a:ea typeface="맑은 고딕" charset="0"/>
+              </a:rPr>
+              <a:t>Layer</a:t>
+            </a:r>
+            <a:r>
+              <a:rPr sz="1800">
+                <a:latin typeface="맑은 고딕" charset="0"/>
+                <a:ea typeface="맑은 고딕" charset="0"/>
+              </a:rPr>
+              <a:t>를 구분하여 사용합니다.</a:t>
+            </a:r>
+            <a:endParaRPr lang="ko-KR" altLang="en-US" sz="1800">
+              <a:latin typeface="맑은 고딕" charset="0"/>
+              <a:ea typeface="맑은 고딕" charset="0"/>
+            </a:endParaRPr>
+          </a:p>
+        </p:txBody>
+      </p:sp>
+    </p:spTree>
+  </p:cSld>
+  <p:clrMapOvr>
+    <a:masterClrMapping/>
+  </p:clrMapOvr>
+  <mc:AlternateContent xmlns:mc="http://schemas.openxmlformats.org/markup-compatibility/2006">
+    <mc:Choice xmlns:p14="http://schemas.microsoft.com/office/powerpoint/2010/main" Requires="p14">
+      <p:transition spd="slow" p14:dur="1000"/>
+    </mc:Choice>
+    <mc:Fallback>
+      <p:transition spd="slow"/>
+    </mc:Fallback>
+  </mc:AlternateContent>
+  <p:timing>
+    <p:tnLst>
+      <p:par>
+        <p:cTn id="1" dur="indefinite" restart="never" nodeType="tmRoot"/>
+      </p:par>
+    </p:tnLst>
+  </p:timing>
+</p:sld>
+</file>
+
+<file path=ppt/slides/slide9.xml><?xml version="1.0" encoding="utf-8"?>
+<p:sld xmlns:a="http://schemas.openxmlformats.org/drawingml/2006/main" xmlns:r="http://schemas.openxmlformats.org/officeDocument/2006/relationships" xmlns:p="http://schemas.openxmlformats.org/presentationml/2006/main" xmlns:p14="http://schemas.microsoft.com/office/powerpoint/2010/main">
+  <p:cSld>
+    <p:spTree>
+      <p:nvGrpSpPr>
+        <p:cNvPr id="1" name=""/>
+        <p:cNvGrpSpPr/>
+        <p:nvPr/>
+      </p:nvGrpSpPr>
+      <p:grpSpPr>
+        <a:xfrm>
+          <a:off x="0" y="0"/>
+          <a:ext cx="0" cy="0"/>
+          <a:chOff x="0" y="0"/>
+          <a:chExt cx="0" cy="0"/>
+        </a:xfrm>
+      </p:grpSpPr>
+      <p:sp>
+        <p:nvSpPr>
+          <p:cNvPr id="2" name="Rect 0"/>
+          <p:cNvSpPr txBox="1">
+            <a:spLocks/>
+          </p:cNvSpPr>
+          <p:nvPr/>
+        </p:nvSpPr>
+        <p:spPr>
+          <a:xfrm rot="0">
+            <a:off x="4339590" y="441960"/>
+            <a:ext cx="3508375" cy="478155"/>
+          </a:xfrm>
+          <a:prstGeom prst="rect"/>
+          <a:noFill/>
+          <a:ln w="0">
+            <a:noFill/>
+            <a:prstDash/>
+          </a:ln>
+        </p:spPr>
+        <p:txBody>
+          <a:bodyPr wrap="square" lIns="89535" tIns="46355" rIns="89535" bIns="46355" numCol="1" vert="horz" anchor="t">
+            <a:spAutoFit/>
+          </a:bodyPr>
+          <a:lstStyle/>
+          <a:p>
+            <a:pPr marL="0" indent="0" rtl="0" algn="ctr" defTabSz="914400" eaLnBrk="1" latinLnBrk="0" hangingPunct="1">
+              <a:buFontTx/>
+              <a:buNone/>
+            </a:pPr>
+            <a:r>
+              <a:rPr lang="ko-KR" sz="2500" b="1">
+                <a:solidFill>
+                  <a:schemeClr val="tx1"/>
+                </a:solidFill>
+                <a:latin typeface="나눔바른고딕" charset="0"/>
+                <a:ea typeface="나눔바른고딕" charset="0"/>
+              </a:rPr>
+              <a:t>Space Conversion</a:t>
+            </a:r>
+            <a:endParaRPr lang="ko-KR" altLang="en-US" sz="2500" b="1">
+              <a:solidFill>
+                <a:schemeClr val="tx1"/>
+              </a:solidFill>
+              <a:latin typeface="나눔바른고딕" charset="0"/>
+              <a:ea typeface="나눔바른고딕" charset="0"/>
+            </a:endParaRPr>
+          </a:p>
+        </p:txBody>
+      </p:sp>
+      <p:sp>
+        <p:nvSpPr>
+          <p:cNvPr id="3" name="텍스트 상자 9"/>
+          <p:cNvSpPr txBox="1">
+            <a:spLocks/>
+          </p:cNvSpPr>
+          <p:nvPr/>
+        </p:nvSpPr>
+        <p:spPr>
+          <a:xfrm rot="0">
+            <a:off x="1222375" y="1445895"/>
+            <a:ext cx="4156710" cy="1200785"/>
+          </a:xfrm>
+          <a:prstGeom prst="rect"/>
+          <a:noFill/>
+          <a:ln w="0">
+            <a:noFill/>
+            <a:prstDash/>
+          </a:ln>
+        </p:spPr>
+        <p:txBody>
+          <a:bodyPr wrap="square" lIns="89535" tIns="46355" rIns="89535" bIns="46355" vert="horz" anchor="t">
+            <a:spAutoFit/>
+          </a:bodyPr>
+          <a:lstStyle/>
+          <a:p>
+            <a:pPr marL="0" indent="0" rtl="0" algn="l" defTabSz="914400" eaLnBrk="1" latinLnBrk="0" hangingPunct="1">
+              <a:buFontTx/>
+              <a:buNone/>
+            </a:pPr>
+            <a:r>
+              <a:rPr sz="1800">
+                <a:latin typeface="맑은 고딕" charset="0"/>
+                <a:ea typeface="맑은 고딕" charset="0"/>
+              </a:rPr>
+              <a:t>ScreenPointToRay( ) 함수는 스크린 공간의 좌표를 월드 공간의 좌표로 변환하여 시작점으로 설정하는 함수입니다. </a:t>
+            </a:r>
+            <a:endParaRPr lang="ko-KR" altLang="en-US" sz="1800">
+              <a:latin typeface="맑은 고딕" charset="0"/>
+              <a:ea typeface="맑은 고딕" charset="0"/>
+            </a:endParaRPr>
+          </a:p>
+        </p:txBody>
+      </p:sp>
+      <p:sp>
+        <p:nvSpPr>
+          <p:cNvPr id="4" name="텍스트 상자 10"/>
+          <p:cNvSpPr txBox="1">
+            <a:spLocks/>
+          </p:cNvSpPr>
+          <p:nvPr/>
+        </p:nvSpPr>
+        <p:spPr>
+          <a:xfrm rot="0">
+            <a:off x="1214120" y="5578475"/>
+            <a:ext cx="4156710" cy="647065"/>
+          </a:xfrm>
+          <a:prstGeom prst="rect"/>
+          <a:noFill/>
+          <a:ln w="0">
+            <a:noFill/>
+            <a:prstDash/>
+          </a:ln>
+        </p:spPr>
+        <p:txBody>
+          <a:bodyPr wrap="square" lIns="89535" tIns="46355" rIns="89535" bIns="46355" vert="horz" anchor="t">
+            <a:spAutoFit/>
+          </a:bodyPr>
+          <a:lstStyle/>
+          <a:p>
+            <a:pPr marL="0" indent="0" rtl="0" algn="l" defTabSz="914400" eaLnBrk="1" latinLnBrk="0" hangingPunct="1">
+              <a:buFontTx/>
+              <a:buNone/>
+            </a:pPr>
+            <a:r>
+              <a:rPr sz="1800">
+                <a:latin typeface="맑은 고딕" charset="0"/>
+                <a:ea typeface="맑은 고딕" charset="0"/>
+              </a:rPr>
+              <a:t>방향은 카메라가 비추는 방향으로 설정된 광선 객체를 반환합니다.</a:t>
+            </a:r>
+            <a:endParaRPr lang="ko-KR" altLang="en-US" sz="1800">
+              <a:latin typeface="맑은 고딕" charset="0"/>
+              <a:ea typeface="맑은 고딕" charset="0"/>
+            </a:endParaRPr>
+          </a:p>
+        </p:txBody>
+      </p:sp>
+      <p:pic>
+        <p:nvPicPr>
+          <p:cNvPr id="6" name="그림 12"/>
           <p:cNvPicPr>
             <a:picLocks noChangeAspect="1"/>
           </p:cNvPicPr>
@@ -9260,7 +10147,7 @@
       </p:pic>
       <p:pic>
         <p:nvPicPr>
-          <p:cNvPr id="7" name="그림 21" descr="C:/Users/Admin1/AppData/Roaming/PolarisOffice/ETemp/21188_18992288/fImage577502664771.png"/>
+          <p:cNvPr id="7" name="그림 21"/>
           <p:cNvPicPr>
             <a:picLocks noChangeAspect="1"/>
           </p:cNvPicPr>

</xml_diff>

<commit_message>
Define how to use Raycast
- Raycast PPT Data Update

- Implementation of On/Off function
  of video player using Raycast

- Add and set up layers
</commit_message>
<xml_diff>
--- a/Assets/Class/Mouse Function/PPT Data/Mouse Example.pptx
+++ b/Assets/Class/Mouse Function/PPT Data/Mouse Example.pptx
@@ -2,7 +2,7 @@
 <file path=ppt/presentation.xml><?xml version="1.0" encoding="utf-8"?>
 <p:presentation xmlns:a="http://schemas.openxmlformats.org/drawingml/2006/main" xmlns:r="http://schemas.openxmlformats.org/officeDocument/2006/relationships" xmlns:p="http://schemas.openxmlformats.org/presentationml/2006/main" xmlns:p14="http://schemas.microsoft.com/office/powerpoint/2010/main" saveSubsetFonts="1" firstSlideNum="0">
   <p:sldMasterIdLst>
-    <p:sldMasterId id="2147485483" r:id="rId12"/>
+    <p:sldMasterId id="2147485512" r:id="rId12"/>
   </p:sldMasterIdLst>
   <p:notesMasterIdLst>
     <p:notesMasterId r:id="rId14"/>
@@ -15,8 +15,12 @@
     <p:sldId id="281" r:id="rId20"/>
     <p:sldId id="283" r:id="rId21"/>
     <p:sldId id="285" r:id="rId22"/>
-    <p:sldId id="282" r:id="rId23"/>
-    <p:sldId id="284" r:id="rId24"/>
+    <p:sldId id="286" r:id="rId23"/>
+    <p:sldId id="287" r:id="rId24"/>
+    <p:sldId id="288" r:id="rId25"/>
+    <p:sldId id="284" r:id="rId26"/>
+    <p:sldId id="289" r:id="rId27"/>
+    <p:sldId id="282" r:id="rId28"/>
   </p:sldIdLst>
   <p:sldSz cx="12192000" cy="6858000"/>
   <p:notesSz cx="6858000" cy="9144000"/>
@@ -5725,8 +5729,8 @@
         </p:nvCxnSpPr>
         <p:spPr>
           <a:xfrm rot="0" flipH="1" flipV="1">
-            <a:off x="10329545" y="2828925"/>
-            <a:ext cx="2540" cy="534035"/>
+            <a:off x="10330180" y="2829560"/>
+            <a:ext cx="2540" cy="533400"/>
           </a:xfrm>
           <a:prstGeom prst="straightConnector1"/>
           <a:ln w="6350" cap="flat" cmpd="sng">
@@ -5844,14 +5848,337 @@
       </p:pic>
       <p:pic>
         <p:nvPicPr>
-          <p:cNvPr id="42" name="그림 25"/>
+          <p:cNvPr id="42" name="그림 25" descr="C:/Users/Admin1/AppData/Roaming/PolarisOffice/ETemp/3976_17614504/fImage54631236500.png"/>
           <p:cNvPicPr>
             <a:picLocks noChangeAspect="1"/>
           </p:cNvPicPr>
           <p:nvPr/>
         </p:nvPicPr>
         <p:blipFill rotWithShape="1">
-          <a:blip r:embed="rId30" cstate="print">
+          <a:blip r:embed="rId30" cstate="hqprint">
+            <a:extLst>
+              <a:ext uri="{28A0092B-C50C-407E-A947-70E740481C1C}">
+                <a14:useLocalDpi xmlns:a14="http://schemas.microsoft.com/office/drawing/2010/main"/>
+              </a:ext>
+            </a:extLst>
+          </a:blip>
+          <a:stretch>
+            <a:fillRect/>
+          </a:stretch>
+        </p:blipFill>
+        <p:spPr>
+          <a:xfrm rot="0">
+            <a:off x="9686925" y="1446530"/>
+            <a:ext cx="1287145" cy="1383665"/>
+          </a:xfrm>
+          <a:prstGeom prst="roundRect"/>
+          <a:solidFill>
+            <a:srgbClr val="EDEDED"/>
+          </a:solidFill>
+        </p:spPr>
+      </p:pic>
+    </p:spTree>
+  </p:cSld>
+  <p:clrMapOvr>
+    <a:masterClrMapping/>
+  </p:clrMapOvr>
+  <mc:AlternateContent xmlns:mc="http://schemas.openxmlformats.org/markup-compatibility/2006">
+    <mc:Choice xmlns:p14="http://schemas.microsoft.com/office/powerpoint/2010/main" Requires="p14">
+      <p:transition spd="slow" p14:dur="1000"/>
+    </mc:Choice>
+    <mc:Fallback>
+      <p:transition spd="slow"/>
+    </mc:Fallback>
+  </mc:AlternateContent>
+  <p:timing>
+    <p:tnLst>
+      <p:par>
+        <p:cTn id="1" dur="indefinite" restart="never" nodeType="tmRoot"/>
+      </p:par>
+    </p:tnLst>
+  </p:timing>
+</p:sld>
+</file>
+
+<file path=ppt/slides/slide10.xml><?xml version="1.0" encoding="utf-8"?>
+<p:sld xmlns:a="http://schemas.openxmlformats.org/drawingml/2006/main" xmlns:r="http://schemas.openxmlformats.org/officeDocument/2006/relationships" xmlns:p="http://schemas.openxmlformats.org/presentationml/2006/main">
+  <p:cSld>
+    <p:spTree>
+      <p:nvGrpSpPr>
+        <p:cNvPr id="1" name=""/>
+        <p:cNvGrpSpPr/>
+        <p:nvPr/>
+      </p:nvGrpSpPr>
+      <p:grpSpPr>
+        <a:xfrm>
+          <a:off x="0" y="0"/>
+          <a:ext cx="0" cy="0"/>
+          <a:chOff x="0" y="0"/>
+          <a:chExt cx="0" cy="0"/>
+        </a:xfrm>
+      </p:grpSpPr>
+      <p:sp>
+        <p:nvSpPr>
+          <p:cNvPr id="2" name="Rect 0"/>
+          <p:cNvSpPr txBox="1">
+            <a:spLocks/>
+          </p:cNvSpPr>
+          <p:nvPr/>
+        </p:nvSpPr>
+        <p:spPr>
+          <a:xfrm rot="0">
+            <a:off x="4339590" y="383540"/>
+            <a:ext cx="3524885" cy="478155"/>
+          </a:xfrm>
+          <a:prstGeom prst="rect"/>
+          <a:noFill/>
+          <a:ln w="0">
+            <a:noFill/>
+            <a:prstDash/>
+          </a:ln>
+        </p:spPr>
+        <p:txBody>
+          <a:bodyPr wrap="square" lIns="89535" tIns="46355" rIns="89535" bIns="46355" numCol="1" vert="horz" anchor="t">
+            <a:spAutoFit/>
+          </a:bodyPr>
+          <a:lstStyle/>
+          <a:p>
+            <a:pPr marL="0" indent="0" rtl="0" algn="ctr" defTabSz="914400" eaLnBrk="1" latinLnBrk="0" hangingPunct="1">
+              <a:buFontTx/>
+              <a:buNone/>
+            </a:pPr>
+            <a:r>
+              <a:rPr lang="ko-KR" sz="2500" b="1">
+                <a:solidFill>
+                  <a:schemeClr val="tx1"/>
+                </a:solidFill>
+                <a:latin typeface="나눔바른고딕" charset="0"/>
+                <a:ea typeface="나눔바른고딕" charset="0"/>
+              </a:rPr>
+              <a:t>열</a:t>
+            </a:r>
+            <a:r>
+              <a:rPr lang="ko-KR" sz="2500" b="1">
+                <a:solidFill>
+                  <a:schemeClr val="tx1"/>
+                </a:solidFill>
+                <a:latin typeface="나눔바른고딕" charset="0"/>
+                <a:ea typeface="나눔바른고딕" charset="0"/>
+              </a:rPr>
+              <a:t> 번째 튜토리얼</a:t>
+            </a:r>
+            <a:endParaRPr lang="ko-KR" altLang="en-US" sz="2500" b="1">
+              <a:solidFill>
+                <a:schemeClr val="tx1"/>
+              </a:solidFill>
+              <a:latin typeface="나눔바른고딕" charset="0"/>
+              <a:ea typeface="나눔바른고딕" charset="0"/>
+            </a:endParaRPr>
+          </a:p>
+        </p:txBody>
+      </p:sp>
+      <p:sp>
+        <p:nvSpPr>
+          <p:cNvPr id="91" name="Rect 0"/>
+          <p:cNvSpPr txBox="1">
+            <a:spLocks/>
+          </p:cNvSpPr>
+          <p:nvPr/>
+        </p:nvSpPr>
+        <p:spPr>
+          <a:xfrm rot="0">
+            <a:off x="1238885" y="3859530"/>
+            <a:ext cx="4139565" cy="2338705"/>
+          </a:xfrm>
+          <a:prstGeom prst="rect"/>
+          <a:noFill/>
+          <a:ln w="0">
+            <a:noFill/>
+            <a:prstDash/>
+          </a:ln>
+        </p:spPr>
+        <p:txBody>
+          <a:bodyPr wrap="square" lIns="89535" tIns="46355" rIns="89535" bIns="46355" numCol="1" vert="horz" anchor="t">
+            <a:spAutoFit/>
+          </a:bodyPr>
+          <a:lstStyle/>
+          <a:p>
+            <a:pPr marL="0" indent="0" rtl="0" algn="l" defTabSz="914400" eaLnBrk="1" latinLnBrk="0" hangingPunct="1">
+              <a:buFontTx/>
+              <a:buNone/>
+            </a:pPr>
+            <a:r>
+              <a:rPr lang="ko-KR" sz="2000" b="1">
+                <a:solidFill>
+                  <a:srgbClr val="0611F2"/>
+                </a:solidFill>
+                <a:latin typeface="맑은 고딕" charset="0"/>
+                <a:ea typeface="맑은 고딕" charset="0"/>
+              </a:rPr>
+              <a:t>2</a:t>
+            </a:r>
+            <a:r>
+              <a:rPr lang="ko-KR" sz="2000" b="1">
+                <a:solidFill>
+                  <a:srgbClr val="0611F2"/>
+                </a:solidFill>
+                <a:latin typeface="맑은 고딕" charset="0"/>
+                <a:ea typeface="맑은 고딕" charset="0"/>
+              </a:rPr>
+              <a:t>9</a:t>
+            </a:r>
+            <a:r>
+              <a:rPr sz="2000" b="1">
+                <a:solidFill>
+                  <a:srgbClr val="0611F2"/>
+                </a:solidFill>
+                <a:latin typeface="맑은 고딕" charset="0"/>
+                <a:ea typeface="맑은 고딕" charset="0"/>
+              </a:rPr>
+              <a:t>. </a:t>
+            </a:r>
+            <a:r>
+              <a:rPr lang="ko-KR" sz="1800">
+                <a:latin typeface="맑은 고딕" charset="0"/>
+                <a:ea typeface="맑은 고딕" charset="0"/>
+              </a:rPr>
+              <a:t>그런 다음 Mouse 스크립트에서 Rigidbody 변수와 GameObject 변수 그리고 VideoPlayer 변수를 선언합니다.</a:t>
+            </a:r>
+            <a:endParaRPr lang="ko-KR" altLang="en-US" sz="1800">
+              <a:latin typeface="맑은 고딕" charset="0"/>
+              <a:ea typeface="맑은 고딕" charset="0"/>
+            </a:endParaRPr>
+          </a:p>
+          <a:p>
+            <a:pPr marL="0" indent="0" rtl="0" algn="l" defTabSz="914400" eaLnBrk="1" latinLnBrk="0" hangingPunct="1">
+              <a:buFontTx/>
+              <a:buNone/>
+            </a:pPr>
+            <a:endParaRPr lang="ko-KR" altLang="en-US" sz="1800">
+              <a:latin typeface="맑은 고딕" charset="0"/>
+              <a:ea typeface="맑은 고딕" charset="0"/>
+            </a:endParaRPr>
+          </a:p>
+          <a:p>
+            <a:pPr marL="0" indent="0" rtl="0" algn="l" defTabSz="914400" eaLnBrk="1" latinLnBrk="0" hangingPunct="1">
+              <a:buFontTx/>
+              <a:buNone/>
+            </a:pPr>
+            <a:r>
+              <a:rPr lang="ko-KR" sz="1800">
+                <a:latin typeface="맑은 고딕" charset="0"/>
+                <a:ea typeface="맑은 고딕" charset="0"/>
+              </a:rPr>
+              <a:t>그러고 나서 LayerMask 변수와 RaycastHit 변수 그리고 boolean 변수를 선언합니다.</a:t>
+            </a:r>
+            <a:endParaRPr lang="ko-KR" altLang="en-US" sz="1800">
+              <a:latin typeface="맑은 고딕" charset="0"/>
+              <a:ea typeface="맑은 고딕" charset="0"/>
+            </a:endParaRPr>
+          </a:p>
+        </p:txBody>
+      </p:sp>
+      <p:sp>
+        <p:nvSpPr>
+          <p:cNvPr id="94" name="텍스트 상자 58"/>
+          <p:cNvSpPr txBox="1">
+            <a:spLocks/>
+          </p:cNvSpPr>
+          <p:nvPr/>
+        </p:nvSpPr>
+        <p:spPr>
+          <a:xfrm rot="0">
+            <a:off x="6814820" y="3861435"/>
+            <a:ext cx="4131310" cy="2338705"/>
+          </a:xfrm>
+          <a:prstGeom prst="rect"/>
+          <a:noFill/>
+          <a:ln w="0">
+            <a:noFill/>
+            <a:prstDash/>
+          </a:ln>
+        </p:spPr>
+        <p:txBody>
+          <a:bodyPr wrap="square" lIns="89535" tIns="46355" rIns="89535" bIns="46355" numCol="1" vert="horz" anchor="t">
+            <a:spAutoFit/>
+          </a:bodyPr>
+          <a:lstStyle/>
+          <a:p>
+            <a:pPr marL="0" indent="0" rtl="0" algn="l" defTabSz="914400" eaLnBrk="1" latinLnBrk="0" hangingPunct="1">
+              <a:buFontTx/>
+              <a:buNone/>
+            </a:pPr>
+            <a:r>
+              <a:rPr lang="ko-KR" sz="2000" b="1">
+                <a:solidFill>
+                  <a:srgbClr val="0611F2"/>
+                </a:solidFill>
+                <a:latin typeface="맑은 고딕" charset="0"/>
+                <a:ea typeface="맑은 고딕" charset="0"/>
+              </a:rPr>
+              <a:t>30</a:t>
+            </a:r>
+            <a:r>
+              <a:rPr sz="2000" b="1">
+                <a:solidFill>
+                  <a:srgbClr val="0611F2"/>
+                </a:solidFill>
+                <a:latin typeface="맑은 고딕" charset="0"/>
+                <a:ea typeface="맑은 고딕" charset="0"/>
+              </a:rPr>
+              <a:t>. </a:t>
+            </a:r>
+            <a:r>
+              <a:rPr lang="ko-KR" sz="1800">
+                <a:latin typeface="맑은 고딕" charset="0"/>
+                <a:ea typeface="맑은 고딕" charset="0"/>
+              </a:rPr>
+              <a:t>이제 Update( ) 함수에서 ray에 대한 정보를 설정한 다음 마우스로 선택했을 때 ray와 특정한 layer를 가진 오브젝트가 충돌했는지 검사합니다.</a:t>
+            </a:r>
+            <a:endParaRPr lang="ko-KR" altLang="en-US" sz="1800">
+              <a:latin typeface="맑은 고딕" charset="0"/>
+              <a:ea typeface="맑은 고딕" charset="0"/>
+            </a:endParaRPr>
+          </a:p>
+          <a:p>
+            <a:pPr marL="0" indent="0" rtl="0" algn="l" defTabSz="914400" eaLnBrk="1" latinLnBrk="0" hangingPunct="1">
+              <a:buFontTx/>
+              <a:buNone/>
+            </a:pPr>
+            <a:endParaRPr lang="ko-KR" altLang="en-US" sz="1800">
+              <a:latin typeface="맑은 고딕" charset="0"/>
+              <a:ea typeface="맑은 고딕" charset="0"/>
+            </a:endParaRPr>
+          </a:p>
+          <a:p>
+            <a:pPr marL="0" indent="0" rtl="0" algn="l" defTabSz="914400" eaLnBrk="1" latinLnBrk="0" hangingPunct="1">
+              <a:buFontTx/>
+              <a:buNone/>
+            </a:pPr>
+            <a:r>
+              <a:rPr lang="ko-KR" sz="1800">
+                <a:latin typeface="맑은 고딕" charset="0"/>
+                <a:ea typeface="맑은 고딕" charset="0"/>
+              </a:rPr>
+              <a:t>그다음 충돌이 되었다면 boolean 변수에 따라 video를 실행하고 정지할 수 있도록 설정합니다.</a:t>
+            </a:r>
+            <a:endParaRPr lang="ko-KR" altLang="en-US" sz="1800">
+              <a:latin typeface="맑은 고딕" charset="0"/>
+              <a:ea typeface="맑은 고딕" charset="0"/>
+            </a:endParaRPr>
+          </a:p>
+        </p:txBody>
+      </p:sp>
+      <p:pic>
+        <p:nvPicPr>
+          <p:cNvPr id="96" name="그림 62" descr="C:/Users/Admin1/AppData/Roaming/PolarisOffice/ETemp/3976_17614504/fImage87322563281.png"/>
+          <p:cNvPicPr>
+            <a:picLocks noChangeAspect="1"/>
+          </p:cNvPicPr>
+          <p:nvPr/>
+        </p:nvPicPr>
+        <p:blipFill rotWithShape="1">
+          <a:blip r:embed="rId2" cstate="print">
             <a:extLst>
               <a:ext uri="{28A0092B-C50C-407E-A947-70E740481C1C}">
                 <a14:useLocalDpi xmlns:a14="http://schemas.microsoft.com/office/drawing/2010/main" val="0"/>
@@ -5864,8 +6191,8 @@
         </p:blipFill>
         <p:spPr>
           <a:xfrm rot="0">
-            <a:off x="9686925" y="1438275"/>
-            <a:ext cx="1286510" cy="1391285"/>
+            <a:off x="1235710" y="1437640"/>
+            <a:ext cx="4142740" cy="2312670"/>
           </a:xfrm>
           <a:prstGeom prst="roundRect"/>
           <a:solidFill>
@@ -5873,6 +6200,1160 @@
           </a:solidFill>
         </p:spPr>
       </p:pic>
+      <p:pic>
+        <p:nvPicPr>
+          <p:cNvPr id="97" name="그림 65" descr="C:/Users/Admin1/AppData/Roaming/PolarisOffice/ETemp/3976_17614504/fImage567822576827.png"/>
+          <p:cNvPicPr>
+            <a:picLocks noChangeAspect="1"/>
+          </p:cNvPicPr>
+          <p:nvPr/>
+        </p:nvPicPr>
+        <p:blipFill rotWithShape="1">
+          <a:blip r:embed="rId3" cstate="print">
+            <a:extLst>
+              <a:ext uri="{28A0092B-C50C-407E-A947-70E740481C1C}">
+                <a14:useLocalDpi xmlns:a14="http://schemas.microsoft.com/office/drawing/2010/main" val="0"/>
+              </a:ext>
+            </a:extLst>
+          </a:blip>
+          <a:stretch>
+            <a:fillRect/>
+          </a:stretch>
+        </p:blipFill>
+        <p:spPr>
+          <a:xfrm rot="0">
+            <a:off x="6814820" y="1437640"/>
+            <a:ext cx="4139565" cy="2312670"/>
+          </a:xfrm>
+          <a:prstGeom prst="roundRect"/>
+          <a:solidFill>
+            <a:srgbClr val="EDEDED"/>
+          </a:solidFill>
+        </p:spPr>
+      </p:pic>
+    </p:spTree>
+  </p:cSld>
+  <p:clrMapOvr>
+    <a:masterClrMapping/>
+  </p:clrMapOvr>
+  <mc:AlternateContent xmlns:mc="http://schemas.openxmlformats.org/markup-compatibility/2006">
+    <mc:Choice xmlns:p14="http://schemas.microsoft.com/office/powerpoint/2010/main" Requires="p14">
+      <p:transition spd="slow" p14:dur="1000"/>
+    </mc:Choice>
+    <mc:Fallback>
+      <p:transition spd="slow"/>
+    </mc:Fallback>
+  </mc:AlternateContent>
+  <p:timing>
+    <p:tnLst>
+      <p:par>
+        <p:cTn id="1" dur="indefinite" restart="never" nodeType="tmRoot"/>
+      </p:par>
+    </p:tnLst>
+  </p:timing>
+</p:sld>
+</file>
+
+<file path=ppt/slides/slide11.xml><?xml version="1.0" encoding="utf-8"?>
+<p:sld xmlns:a="http://schemas.openxmlformats.org/drawingml/2006/main" xmlns:r="http://schemas.openxmlformats.org/officeDocument/2006/relationships" xmlns:p="http://schemas.openxmlformats.org/presentationml/2006/main" xmlns:p14="http://schemas.microsoft.com/office/powerpoint/2010/main">
+  <p:cSld>
+    <p:spTree>
+      <p:nvGrpSpPr>
+        <p:cNvPr id="1" name=""/>
+        <p:cNvGrpSpPr/>
+        <p:nvPr/>
+      </p:nvGrpSpPr>
+      <p:grpSpPr>
+        <a:xfrm>
+          <a:off x="0" y="0"/>
+          <a:ext cx="0" cy="0"/>
+          <a:chOff x="0" y="0"/>
+          <a:chExt cx="0" cy="0"/>
+        </a:xfrm>
+      </p:grpSpPr>
+      <p:sp>
+        <p:nvSpPr>
+          <p:cNvPr id="2" name="Rect 0"/>
+          <p:cNvSpPr txBox="1">
+            <a:spLocks/>
+          </p:cNvSpPr>
+          <p:nvPr/>
+        </p:nvSpPr>
+        <p:spPr>
+          <a:xfrm rot="0">
+            <a:off x="4339590" y="441960"/>
+            <a:ext cx="3508375" cy="478155"/>
+          </a:xfrm>
+          <a:prstGeom prst="rect"/>
+          <a:noFill/>
+          <a:ln w="0">
+            <a:noFill/>
+            <a:prstDash/>
+          </a:ln>
+        </p:spPr>
+        <p:txBody>
+          <a:bodyPr wrap="square" lIns="89535" tIns="46355" rIns="89535" bIns="46355" numCol="1" vert="horz" anchor="t">
+            <a:spAutoFit/>
+          </a:bodyPr>
+          <a:lstStyle/>
+          <a:p>
+            <a:pPr marL="0" indent="0" rtl="0" algn="ctr" defTabSz="914400" eaLnBrk="1" latinLnBrk="0" hangingPunct="1">
+              <a:buFontTx/>
+              <a:buNone/>
+            </a:pPr>
+            <a:r>
+              <a:rPr lang="ko-KR" sz="2500" b="1">
+                <a:solidFill>
+                  <a:schemeClr val="tx1"/>
+                </a:solidFill>
+                <a:latin typeface="나눔바른고딕" charset="0"/>
+                <a:ea typeface="나눔바른고딕" charset="0"/>
+              </a:rPr>
+              <a:t>Space Conversion</a:t>
+            </a:r>
+            <a:endParaRPr lang="ko-KR" altLang="en-US" sz="2500" b="1">
+              <a:solidFill>
+                <a:schemeClr val="tx1"/>
+              </a:solidFill>
+              <a:latin typeface="나눔바른고딕" charset="0"/>
+              <a:ea typeface="나눔바른고딕" charset="0"/>
+            </a:endParaRPr>
+          </a:p>
+        </p:txBody>
+      </p:sp>
+      <p:sp>
+        <p:nvSpPr>
+          <p:cNvPr id="3" name="텍스트 상자 9"/>
+          <p:cNvSpPr txBox="1">
+            <a:spLocks/>
+          </p:cNvSpPr>
+          <p:nvPr/>
+        </p:nvSpPr>
+        <p:spPr>
+          <a:xfrm rot="0">
+            <a:off x="1222375" y="1445895"/>
+            <a:ext cx="4156710" cy="1200785"/>
+          </a:xfrm>
+          <a:prstGeom prst="rect"/>
+          <a:noFill/>
+          <a:ln w="0">
+            <a:noFill/>
+            <a:prstDash/>
+          </a:ln>
+        </p:spPr>
+        <p:txBody>
+          <a:bodyPr wrap="square" lIns="89535" tIns="46355" rIns="89535" bIns="46355" vert="horz" anchor="t">
+            <a:spAutoFit/>
+          </a:bodyPr>
+          <a:lstStyle/>
+          <a:p>
+            <a:pPr marL="0" indent="0" rtl="0" algn="l" defTabSz="914400" eaLnBrk="1" latinLnBrk="0" hangingPunct="1">
+              <a:buFontTx/>
+              <a:buNone/>
+            </a:pPr>
+            <a:r>
+              <a:rPr sz="1800">
+                <a:latin typeface="맑은 고딕" charset="0"/>
+                <a:ea typeface="맑은 고딕" charset="0"/>
+              </a:rPr>
+              <a:t>ScreenPointToRay( ) 함수는 스크린 공간의 좌표를 월드 공간의 좌표로 변환하여 시작점으로 설정하는 함수입니다. </a:t>
+            </a:r>
+            <a:endParaRPr lang="ko-KR" altLang="en-US" sz="1800">
+              <a:latin typeface="맑은 고딕" charset="0"/>
+              <a:ea typeface="맑은 고딕" charset="0"/>
+            </a:endParaRPr>
+          </a:p>
+        </p:txBody>
+      </p:sp>
+      <p:sp>
+        <p:nvSpPr>
+          <p:cNvPr id="4" name="텍스트 상자 10"/>
+          <p:cNvSpPr txBox="1">
+            <a:spLocks/>
+          </p:cNvSpPr>
+          <p:nvPr/>
+        </p:nvSpPr>
+        <p:spPr>
+          <a:xfrm rot="0">
+            <a:off x="1214120" y="5578475"/>
+            <a:ext cx="4156710" cy="647065"/>
+          </a:xfrm>
+          <a:prstGeom prst="rect"/>
+          <a:noFill/>
+          <a:ln w="0">
+            <a:noFill/>
+            <a:prstDash/>
+          </a:ln>
+        </p:spPr>
+        <p:txBody>
+          <a:bodyPr wrap="square" lIns="89535" tIns="46355" rIns="89535" bIns="46355" vert="horz" anchor="t">
+            <a:spAutoFit/>
+          </a:bodyPr>
+          <a:lstStyle/>
+          <a:p>
+            <a:pPr marL="0" indent="0" rtl="0" algn="l" defTabSz="914400" eaLnBrk="1" latinLnBrk="0" hangingPunct="1">
+              <a:buFontTx/>
+              <a:buNone/>
+            </a:pPr>
+            <a:r>
+              <a:rPr sz="1800">
+                <a:latin typeface="맑은 고딕" charset="0"/>
+                <a:ea typeface="맑은 고딕" charset="0"/>
+              </a:rPr>
+              <a:t>방향은 카메라가 비추는 방향으로 설정된 광선 객체를 반환합니다.</a:t>
+            </a:r>
+            <a:endParaRPr lang="ko-KR" altLang="en-US" sz="1800">
+              <a:latin typeface="맑은 고딕" charset="0"/>
+              <a:ea typeface="맑은 고딕" charset="0"/>
+            </a:endParaRPr>
+          </a:p>
+        </p:txBody>
+      </p:sp>
+      <p:pic>
+        <p:nvPicPr>
+          <p:cNvPr id="6" name="그림 12"/>
+          <p:cNvPicPr>
+            <a:picLocks noChangeAspect="1"/>
+          </p:cNvPicPr>
+          <p:nvPr/>
+        </p:nvPicPr>
+        <p:blipFill rotWithShape="1">
+          <a:blip r:embed="rId1" cstate="print">
+            <a:extLst>
+              <a:ext uri="{28A0092B-C50C-407E-A947-70E740481C1C}">
+                <a14:useLocalDpi xmlns:a14="http://schemas.microsoft.com/office/drawing/2010/main" val="0"/>
+              </a:ext>
+            </a:extLst>
+          </a:blip>
+          <a:stretch>
+            <a:fillRect/>
+          </a:stretch>
+        </p:blipFill>
+        <p:spPr>
+          <a:xfrm rot="0">
+            <a:off x="1213485" y="2818130"/>
+            <a:ext cx="4156075" cy="2552700"/>
+          </a:xfrm>
+          <a:prstGeom prst="roundRect"/>
+          <a:solidFill>
+            <a:srgbClr val="EDEDED"/>
+          </a:solidFill>
+        </p:spPr>
+      </p:pic>
+      <p:pic>
+        <p:nvPicPr>
+          <p:cNvPr id="7" name="그림 21"/>
+          <p:cNvPicPr>
+            <a:picLocks noChangeAspect="1"/>
+          </p:cNvPicPr>
+          <p:nvPr/>
+        </p:nvPicPr>
+        <p:blipFill rotWithShape="1">
+          <a:blip r:embed="rId2" cstate="hqprint">
+            <a:extLst>
+              <a:ext uri="{28A0092B-C50C-407E-A947-70E740481C1C}">
+                <a14:useLocalDpi xmlns:a14="http://schemas.microsoft.com/office/drawing/2010/main"/>
+              </a:ext>
+            </a:extLst>
+          </a:blip>
+          <a:stretch>
+            <a:fillRect/>
+          </a:stretch>
+        </p:blipFill>
+        <p:spPr>
+          <a:xfrm rot="0">
+            <a:off x="6816725" y="2875915"/>
+            <a:ext cx="4149090" cy="1965325"/>
+          </a:xfrm>
+          <a:prstGeom prst="roundRect"/>
+          <a:solidFill>
+            <a:srgbClr val="EDEDED"/>
+          </a:solidFill>
+        </p:spPr>
+      </p:pic>
+      <p:sp>
+        <p:nvSpPr>
+          <p:cNvPr id="8" name="텍스트 상자 22"/>
+          <p:cNvSpPr txBox="1">
+            <a:spLocks/>
+          </p:cNvSpPr>
+          <p:nvPr/>
+        </p:nvSpPr>
+        <p:spPr>
+          <a:xfrm rot="0">
+            <a:off x="6816725" y="1457325"/>
+            <a:ext cx="4140835" cy="1200785"/>
+          </a:xfrm>
+          <a:prstGeom prst="rect"/>
+          <a:noFill/>
+          <a:ln w="0">
+            <a:noFill/>
+            <a:prstDash/>
+          </a:ln>
+        </p:spPr>
+        <p:txBody>
+          <a:bodyPr wrap="square" lIns="89535" tIns="46355" rIns="89535" bIns="46355" numCol="1" vert="horz" anchor="t">
+            <a:spAutoFit/>
+          </a:bodyPr>
+          <a:lstStyle/>
+          <a:p>
+            <a:pPr marL="0" indent="0" rtl="0" algn="l" defTabSz="914400" eaLnBrk="1" latinLnBrk="0" hangingPunct="1">
+              <a:buFontTx/>
+              <a:buNone/>
+            </a:pPr>
+            <a:r>
+              <a:rPr lang="ko-KR" sz="1800" b="0">
+                <a:solidFill>
+                  <a:schemeClr val="tx1"/>
+                </a:solidFill>
+                <a:latin typeface="맑은 고딕" charset="0"/>
+                <a:ea typeface="맑은 고딕" charset="0"/>
+              </a:rPr>
+              <a:t>스크린 공간에서 </a:t>
+            </a:r>
+            <a:r>
+              <a:rPr lang="ko-KR" sz="1800" b="0">
+                <a:solidFill>
+                  <a:schemeClr val="tx1"/>
+                </a:solidFill>
+                <a:latin typeface="맑은 고딕" charset="0"/>
+                <a:ea typeface="맑은 고딕" charset="0"/>
+              </a:rPr>
+              <a:t>마우스를 입력했을 때 지정된 좌표 정보를 월드 공간의 위치로 변환한 다음 게임 오브젝트의 위치로 설정합니다. </a:t>
+            </a:r>
+            <a:endParaRPr lang="ko-KR" altLang="en-US" sz="1800" b="0">
+              <a:solidFill>
+                <a:schemeClr val="tx1"/>
+              </a:solidFill>
+              <a:latin typeface="맑은 고딕" charset="0"/>
+              <a:ea typeface="맑은 고딕" charset="0"/>
+            </a:endParaRPr>
+          </a:p>
+        </p:txBody>
+      </p:sp>
+      <p:sp>
+        <p:nvSpPr>
+          <p:cNvPr id="9" name="텍스트 상자 23"/>
+          <p:cNvSpPr txBox="1">
+            <a:spLocks/>
+          </p:cNvSpPr>
+          <p:nvPr/>
+        </p:nvSpPr>
+        <p:spPr>
+          <a:xfrm rot="0">
+            <a:off x="6814820" y="5028565"/>
+            <a:ext cx="4142740" cy="1200785"/>
+          </a:xfrm>
+          <a:prstGeom prst="rect"/>
+          <a:noFill/>
+          <a:ln w="0">
+            <a:noFill/>
+            <a:prstDash/>
+          </a:ln>
+        </p:spPr>
+        <p:txBody>
+          <a:bodyPr wrap="square" lIns="89535" tIns="46355" rIns="89535" bIns="46355" numCol="1" vert="horz" anchor="t">
+            <a:spAutoFit/>
+          </a:bodyPr>
+          <a:lstStyle/>
+          <a:p>
+            <a:pPr marL="0" indent="0" rtl="0" algn="l" defTabSz="914400" eaLnBrk="1" latinLnBrk="0" hangingPunct="1">
+              <a:buFontTx/>
+              <a:buNone/>
+            </a:pPr>
+            <a:r>
+              <a:rPr sz="1800">
+                <a:latin typeface="맑은 고딕" charset="0"/>
+                <a:ea typeface="맑은 고딕" charset="0"/>
+              </a:rPr>
+              <a:t>3차원 공간에서 마우스로 게임 오브젝트를 선택하려면 스크린 공간의 위치를 월드 공간의 위치로 변환해주어야 합니다.</a:t>
+            </a:r>
+            <a:endParaRPr lang="ko-KR" altLang="en-US" sz="1800">
+              <a:latin typeface="맑은 고딕" charset="0"/>
+              <a:ea typeface="맑은 고딕" charset="0"/>
+            </a:endParaRPr>
+          </a:p>
+        </p:txBody>
+      </p:sp>
+    </p:spTree>
+  </p:cSld>
+  <p:clrMapOvr>
+    <a:masterClrMapping/>
+  </p:clrMapOvr>
+  <mc:AlternateContent xmlns:mc="http://schemas.openxmlformats.org/markup-compatibility/2006">
+    <mc:Choice xmlns:p14="http://schemas.microsoft.com/office/powerpoint/2010/main" Requires="p14">
+      <p:transition spd="slow" p14:dur="1000"/>
+    </mc:Choice>
+    <mc:Fallback>
+      <p:transition spd="slow"/>
+    </mc:Fallback>
+  </mc:AlternateContent>
+  <p:timing>
+    <p:tnLst>
+      <p:par>
+        <p:cTn id="1" dur="indefinite" restart="never" nodeType="tmRoot"/>
+      </p:par>
+    </p:tnLst>
+  </p:timing>
+</p:sld>
+</file>
+
+<file path=ppt/slides/slide12.xml><?xml version="1.0" encoding="utf-8"?>
+<p:sld xmlns:a="http://schemas.openxmlformats.org/drawingml/2006/main" xmlns:r="http://schemas.openxmlformats.org/officeDocument/2006/relationships" xmlns:p="http://schemas.openxmlformats.org/presentationml/2006/main">
+  <p:cSld>
+    <p:spTree>
+      <p:nvGrpSpPr>
+        <p:cNvPr id="1" name=""/>
+        <p:cNvGrpSpPr/>
+        <p:nvPr/>
+      </p:nvGrpSpPr>
+      <p:grpSpPr>
+        <a:xfrm>
+          <a:off x="0" y="0"/>
+          <a:ext cx="0" cy="0"/>
+          <a:chOff x="0" y="0"/>
+          <a:chExt cx="0" cy="0"/>
+        </a:xfrm>
+      </p:grpSpPr>
+      <p:sp>
+        <p:nvSpPr>
+          <p:cNvPr id="2" name="Rect 0"/>
+          <p:cNvSpPr txBox="1">
+            <a:spLocks/>
+          </p:cNvSpPr>
+          <p:nvPr/>
+        </p:nvSpPr>
+        <p:spPr>
+          <a:xfrm rot="0">
+            <a:off x="4339590" y="383540"/>
+            <a:ext cx="3524885" cy="478155"/>
+          </a:xfrm>
+          <a:prstGeom prst="rect"/>
+          <a:noFill/>
+          <a:ln w="0">
+            <a:noFill/>
+            <a:prstDash/>
+          </a:ln>
+        </p:spPr>
+        <p:txBody>
+          <a:bodyPr wrap="square" lIns="89535" tIns="46355" rIns="89535" bIns="46355" numCol="1" vert="horz" anchor="t">
+            <a:spAutoFit/>
+          </a:bodyPr>
+          <a:lstStyle/>
+          <a:p>
+            <a:pPr marL="0" indent="0" rtl="0" algn="ctr" defTabSz="914400" eaLnBrk="1" latinLnBrk="0" hangingPunct="1">
+              <a:buFontTx/>
+              <a:buNone/>
+            </a:pPr>
+            <a:r>
+              <a:rPr lang="ko-KR" sz="2500" b="1">
+                <a:solidFill>
+                  <a:schemeClr val="tx1"/>
+                </a:solidFill>
+                <a:latin typeface="나눔바른고딕" charset="0"/>
+                <a:ea typeface="나눔바른고딕" charset="0"/>
+              </a:rPr>
+              <a:t>열한</a:t>
+            </a:r>
+            <a:r>
+              <a:rPr lang="ko-KR" sz="2500" b="1">
+                <a:solidFill>
+                  <a:schemeClr val="tx1"/>
+                </a:solidFill>
+                <a:latin typeface="나눔바른고딕" charset="0"/>
+                <a:ea typeface="나눔바른고딕" charset="0"/>
+              </a:rPr>
+              <a:t> 번째 튜토리얼</a:t>
+            </a:r>
+            <a:endParaRPr lang="ko-KR" altLang="en-US" sz="2500" b="1">
+              <a:solidFill>
+                <a:schemeClr val="tx1"/>
+              </a:solidFill>
+              <a:latin typeface="나눔바른고딕" charset="0"/>
+              <a:ea typeface="나눔바른고딕" charset="0"/>
+            </a:endParaRPr>
+          </a:p>
+        </p:txBody>
+      </p:sp>
+      <p:sp>
+        <p:nvSpPr>
+          <p:cNvPr id="91" name="Rect 0"/>
+          <p:cNvSpPr txBox="1">
+            <a:spLocks/>
+          </p:cNvSpPr>
+          <p:nvPr/>
+        </p:nvSpPr>
+        <p:spPr>
+          <a:xfrm rot="0">
+            <a:off x="1247775" y="4084955"/>
+            <a:ext cx="4138930" cy="2061845"/>
+          </a:xfrm>
+          <a:prstGeom prst="rect"/>
+          <a:noFill/>
+          <a:ln w="0">
+            <a:noFill/>
+            <a:prstDash/>
+          </a:ln>
+        </p:spPr>
+        <p:txBody>
+          <a:bodyPr wrap="square" lIns="89535" tIns="46355" rIns="89535" bIns="46355" numCol="1" vert="horz" anchor="t">
+            <a:spAutoFit/>
+          </a:bodyPr>
+          <a:lstStyle/>
+          <a:p>
+            <a:pPr marL="0" indent="0" rtl="0" algn="l" defTabSz="914400" eaLnBrk="1" latinLnBrk="0" hangingPunct="1">
+              <a:buFontTx/>
+              <a:buNone/>
+            </a:pPr>
+            <a:r>
+              <a:rPr lang="ko-KR" sz="2000" b="1">
+                <a:solidFill>
+                  <a:srgbClr val="0611F2"/>
+                </a:solidFill>
+                <a:latin typeface="맑은 고딕" charset="0"/>
+                <a:ea typeface="맑은 고딕" charset="0"/>
+              </a:rPr>
+              <a:t>31</a:t>
+            </a:r>
+            <a:r>
+              <a:rPr sz="2000" b="1">
+                <a:solidFill>
+                  <a:srgbClr val="0611F2"/>
+                </a:solidFill>
+                <a:latin typeface="맑은 고딕" charset="0"/>
+                <a:ea typeface="맑은 고딕" charset="0"/>
+              </a:rPr>
+              <a:t>. </a:t>
+            </a:r>
+            <a:r>
+              <a:rPr lang="ko-KR" sz="1800">
+                <a:latin typeface="맑은 고딕" charset="0"/>
+                <a:ea typeface="맑은 고딕" charset="0"/>
+              </a:rPr>
+              <a:t>그리고 OnMouseDown( ) 함수를 선언한 다음 state 오브젝트가 활성화되도록 정의합니다.</a:t>
+            </a:r>
+            <a:endParaRPr lang="ko-KR" altLang="en-US" sz="1800">
+              <a:latin typeface="맑은 고딕" charset="0"/>
+              <a:ea typeface="맑은 고딕" charset="0"/>
+            </a:endParaRPr>
+          </a:p>
+          <a:p>
+            <a:pPr marL="0" indent="0" rtl="0" algn="l" defTabSz="914400" eaLnBrk="1" latinLnBrk="0" hangingPunct="1">
+              <a:buFontTx/>
+              <a:buNone/>
+            </a:pPr>
+            <a:endParaRPr lang="ko-KR" altLang="en-US" sz="1800">
+              <a:latin typeface="맑은 고딕" charset="0"/>
+              <a:ea typeface="맑은 고딕" charset="0"/>
+            </a:endParaRPr>
+          </a:p>
+          <a:p>
+            <a:pPr marL="0" indent="0" rtl="0" algn="l" defTabSz="914400" eaLnBrk="1" latinLnBrk="0" hangingPunct="1">
+              <a:buFontTx/>
+              <a:buNone/>
+            </a:pPr>
+            <a:r>
+              <a:rPr lang="ko-KR" sz="1800">
+                <a:latin typeface="맑은 고딕" charset="0"/>
+                <a:ea typeface="맑은 고딕" charset="0"/>
+              </a:rPr>
+              <a:t>그런 다음 RigidBody가 물리적인 영향을 받지 않도록 isKinematic을 활성화합니다.</a:t>
+            </a:r>
+            <a:endParaRPr lang="ko-KR" altLang="en-US" sz="1800">
+              <a:latin typeface="맑은 고딕" charset="0"/>
+              <a:ea typeface="맑은 고딕" charset="0"/>
+            </a:endParaRPr>
+          </a:p>
+        </p:txBody>
+      </p:sp>
+      <p:pic>
+        <p:nvPicPr>
+          <p:cNvPr id="98" name="그림 68" descr="C:/Users/Admin1/AppData/Roaming/PolarisOffice/ETemp/3976_17614504/fImage204692639961.png"/>
+          <p:cNvPicPr>
+            <a:picLocks noChangeAspect="1"/>
+          </p:cNvPicPr>
+          <p:nvPr/>
+        </p:nvPicPr>
+        <p:blipFill rotWithShape="1">
+          <a:blip r:embed="rId2" cstate="print">
+            <a:extLst>
+              <a:ext uri="{28A0092B-C50C-407E-A947-70E740481C1C}">
+                <a14:useLocalDpi xmlns:a14="http://schemas.microsoft.com/office/drawing/2010/main" val="0"/>
+              </a:ext>
+            </a:extLst>
+          </a:blip>
+          <a:stretch>
+            <a:fillRect/>
+          </a:stretch>
+        </p:blipFill>
+        <p:spPr>
+          <a:xfrm rot="0">
+            <a:off x="1236345" y="1445895"/>
+            <a:ext cx="4150360" cy="2468880"/>
+          </a:xfrm>
+          <a:prstGeom prst="roundRect"/>
+          <a:solidFill>
+            <a:srgbClr val="EDEDED"/>
+          </a:solidFill>
+        </p:spPr>
+      </p:pic>
+      <p:pic>
+        <p:nvPicPr>
+          <p:cNvPr id="99" name="그림 75" descr="C:/Users/Admin1/AppData/Roaming/PolarisOffice/ETemp/3976_17614504/fImage77736269491.png"/>
+          <p:cNvPicPr>
+            <a:picLocks noChangeAspect="1"/>
+          </p:cNvPicPr>
+          <p:nvPr/>
+        </p:nvPicPr>
+        <p:blipFill rotWithShape="1">
+          <a:blip r:embed="rId3" cstate="print">
+            <a:extLst>
+              <a:ext uri="{28A0092B-C50C-407E-A947-70E740481C1C}">
+                <a14:useLocalDpi xmlns:a14="http://schemas.microsoft.com/office/drawing/2010/main" val="0"/>
+              </a:ext>
+            </a:extLst>
+          </a:blip>
+          <a:stretch>
+            <a:fillRect/>
+          </a:stretch>
+        </p:blipFill>
+        <p:spPr>
+          <a:xfrm rot="0">
+            <a:off x="6814820" y="1445895"/>
+            <a:ext cx="4139565" cy="2479040"/>
+          </a:xfrm>
+          <a:prstGeom prst="roundRect"/>
+          <a:solidFill>
+            <a:srgbClr val="EDEDED"/>
+          </a:solidFill>
+        </p:spPr>
+      </p:pic>
+      <p:sp>
+        <p:nvSpPr>
+          <p:cNvPr id="100" name="텍스트 상자 78"/>
+          <p:cNvSpPr txBox="1">
+            <a:spLocks/>
+          </p:cNvSpPr>
+          <p:nvPr/>
+        </p:nvSpPr>
+        <p:spPr>
+          <a:xfrm rot="0">
+            <a:off x="6809105" y="4087495"/>
+            <a:ext cx="4137025" cy="2061845"/>
+          </a:xfrm>
+          <a:prstGeom prst="rect"/>
+          <a:noFill/>
+          <a:ln w="0">
+            <a:noFill/>
+            <a:prstDash/>
+          </a:ln>
+        </p:spPr>
+        <p:txBody>
+          <a:bodyPr wrap="square" lIns="89535" tIns="46355" rIns="89535" bIns="46355" numCol="1" vert="horz" anchor="t">
+            <a:spAutoFit/>
+          </a:bodyPr>
+          <a:lstStyle/>
+          <a:p>
+            <a:pPr marL="0" indent="0" rtl="0" algn="l" defTabSz="914400" eaLnBrk="1" latinLnBrk="0" hangingPunct="1">
+              <a:buFontTx/>
+              <a:buNone/>
+            </a:pPr>
+            <a:r>
+              <a:rPr lang="ko-KR" sz="2000" b="1">
+                <a:solidFill>
+                  <a:srgbClr val="0611F2"/>
+                </a:solidFill>
+                <a:latin typeface="맑은 고딕" charset="0"/>
+                <a:ea typeface="맑은 고딕" charset="0"/>
+              </a:rPr>
+              <a:t>32</a:t>
+            </a:r>
+            <a:r>
+              <a:rPr sz="2000" b="1">
+                <a:solidFill>
+                  <a:srgbClr val="0611F2"/>
+                </a:solidFill>
+                <a:latin typeface="맑은 고딕" charset="0"/>
+                <a:ea typeface="맑은 고딕" charset="0"/>
+              </a:rPr>
+              <a:t>. </a:t>
+            </a:r>
+            <a:r>
+              <a:rPr lang="ko-KR" sz="1800">
+                <a:latin typeface="맑은 고딕" charset="0"/>
+                <a:ea typeface="맑은 고딕" charset="0"/>
+              </a:rPr>
+              <a:t>그러고 나서 OnMouseDrag( ) 함수를 선언하고 마우스 위치 정보를 설정합니다.</a:t>
+            </a:r>
+            <a:endParaRPr lang="ko-KR" altLang="en-US" sz="1800">
+              <a:latin typeface="맑은 고딕" charset="0"/>
+              <a:ea typeface="맑은 고딕" charset="0"/>
+            </a:endParaRPr>
+          </a:p>
+          <a:p>
+            <a:pPr marL="0" indent="0" rtl="0" algn="l" defTabSz="914400" eaLnBrk="1" latinLnBrk="0" hangingPunct="1">
+              <a:buFontTx/>
+              <a:buNone/>
+            </a:pPr>
+            <a:endParaRPr lang="ko-KR" altLang="en-US" sz="1800">
+              <a:latin typeface="맑은 고딕" charset="0"/>
+              <a:ea typeface="맑은 고딕" charset="0"/>
+            </a:endParaRPr>
+          </a:p>
+          <a:p>
+            <a:pPr marL="0" indent="0" rtl="0" algn="l" defTabSz="914400" eaLnBrk="1" latinLnBrk="0" hangingPunct="1">
+              <a:buFontTx/>
+              <a:buNone/>
+            </a:pPr>
+            <a:r>
+              <a:rPr lang="ko-KR" sz="1800">
+                <a:latin typeface="맑은 고딕" charset="0"/>
+                <a:ea typeface="맑은 고딕" charset="0"/>
+              </a:rPr>
+              <a:t>마지막으로 스크린 공간에 있는 좌표 정보를 변환하여 게임 오브젝트의 위치로 저장합니다.</a:t>
+            </a:r>
+            <a:endParaRPr lang="ko-KR" altLang="en-US" sz="1800">
+              <a:latin typeface="맑은 고딕" charset="0"/>
+              <a:ea typeface="맑은 고딕" charset="0"/>
+            </a:endParaRPr>
+          </a:p>
+        </p:txBody>
+      </p:sp>
+    </p:spTree>
+  </p:cSld>
+  <p:clrMapOvr>
+    <a:masterClrMapping/>
+  </p:clrMapOvr>
+  <mc:AlternateContent xmlns:mc="http://schemas.openxmlformats.org/markup-compatibility/2006">
+    <mc:Choice xmlns:p14="http://schemas.microsoft.com/office/powerpoint/2010/main" Requires="p14">
+      <p:transition spd="slow" p14:dur="1000"/>
+    </mc:Choice>
+    <mc:Fallback>
+      <p:transition spd="slow"/>
+    </mc:Fallback>
+  </mc:AlternateContent>
+  <p:timing>
+    <p:tnLst>
+      <p:par>
+        <p:cTn id="1" dur="indefinite" restart="never" nodeType="tmRoot"/>
+      </p:par>
+    </p:tnLst>
+  </p:timing>
+</p:sld>
+</file>
+
+<file path=ppt/slides/slide13.xml><?xml version="1.0" encoding="utf-8"?>
+<p:sld xmlns:a="http://schemas.openxmlformats.org/drawingml/2006/main" xmlns:r="http://schemas.openxmlformats.org/officeDocument/2006/relationships" xmlns:p="http://schemas.openxmlformats.org/presentationml/2006/main" xmlns:p14="http://schemas.microsoft.com/office/powerpoint/2010/main">
+  <p:cSld>
+    <p:spTree>
+      <p:nvGrpSpPr>
+        <p:cNvPr id="1" name=""/>
+        <p:cNvGrpSpPr/>
+        <p:nvPr/>
+      </p:nvGrpSpPr>
+      <p:grpSpPr>
+        <a:xfrm>
+          <a:off x="0" y="0"/>
+          <a:ext cx="0" cy="0"/>
+          <a:chOff x="0" y="0"/>
+          <a:chExt cx="0" cy="0"/>
+        </a:xfrm>
+      </p:grpSpPr>
+      <p:sp>
+        <p:nvSpPr>
+          <p:cNvPr id="2" name="Rect 0"/>
+          <p:cNvSpPr txBox="1">
+            <a:spLocks/>
+          </p:cNvSpPr>
+          <p:nvPr/>
+        </p:nvSpPr>
+        <p:spPr>
+          <a:xfrm rot="0">
+            <a:off x="4658995" y="450215"/>
+            <a:ext cx="2877185" cy="478155"/>
+          </a:xfrm>
+          <a:prstGeom prst="rect"/>
+          <a:noFill/>
+          <a:ln w="0">
+            <a:noFill/>
+            <a:prstDash/>
+          </a:ln>
+        </p:spPr>
+        <p:txBody>
+          <a:bodyPr wrap="square" lIns="89535" tIns="46355" rIns="89535" bIns="46355" numCol="1" vert="horz" anchor="t">
+            <a:spAutoFit/>
+          </a:bodyPr>
+          <a:lstStyle/>
+          <a:p>
+            <a:pPr marL="0" indent="0" rtl="0" algn="ctr" defTabSz="914400" eaLnBrk="1" latinLnBrk="0" hangingPunct="1">
+              <a:buFontTx/>
+              <a:buNone/>
+            </a:pPr>
+            <a:r>
+              <a:rPr lang="ko-KR" sz="2500" b="1">
+                <a:solidFill>
+                  <a:schemeClr val="tx1"/>
+                </a:solidFill>
+                <a:latin typeface="나눔바른고딕" charset="0"/>
+                <a:ea typeface="나눔바른고딕" charset="0"/>
+              </a:rPr>
+              <a:t>RayCast</a:t>
+            </a:r>
+            <a:endParaRPr lang="ko-KR" altLang="en-US" sz="2500" b="1">
+              <a:solidFill>
+                <a:schemeClr val="tx1"/>
+              </a:solidFill>
+              <a:latin typeface="나눔바른고딕" charset="0"/>
+              <a:ea typeface="나눔바른고딕" charset="0"/>
+            </a:endParaRPr>
+          </a:p>
+        </p:txBody>
+      </p:sp>
+      <p:sp>
+        <p:nvSpPr>
+          <p:cNvPr id="61" name="텍스트 상자 4"/>
+          <p:cNvSpPr txBox="1">
+            <a:spLocks/>
+          </p:cNvSpPr>
+          <p:nvPr/>
+        </p:nvSpPr>
+        <p:spPr>
+          <a:xfrm rot="0">
+            <a:off x="1229995" y="1454785"/>
+            <a:ext cx="4132580" cy="923925"/>
+          </a:xfrm>
+          <a:prstGeom prst="rect"/>
+          <a:noFill/>
+          <a:ln w="0">
+            <a:noFill/>
+            <a:prstDash/>
+          </a:ln>
+        </p:spPr>
+        <p:txBody>
+          <a:bodyPr wrap="square" lIns="89535" tIns="46355" rIns="89535" bIns="46355" vert="horz" anchor="t">
+            <a:spAutoFit/>
+          </a:bodyPr>
+          <a:lstStyle/>
+          <a:p>
+            <a:pPr marL="0" indent="0" rtl="0" algn="l" defTabSz="914400" eaLnBrk="1" latinLnBrk="0" hangingPunct="1">
+              <a:buFontTx/>
+              <a:buNone/>
+            </a:pPr>
+            <a:r>
+              <a:rPr sz="1800">
+                <a:latin typeface="맑은 고딕" charset="0"/>
+                <a:ea typeface="맑은 고딕" charset="0"/>
+              </a:rPr>
+              <a:t>Physics.Raycast( ) 함수는 3</a:t>
+            </a:r>
+            <a:r>
+              <a:rPr sz="1800">
+                <a:latin typeface="맑은 고딕" charset="0"/>
+                <a:ea typeface="맑은 고딕" charset="0"/>
+              </a:rPr>
+              <a:t> </a:t>
+            </a:r>
+            <a:r>
+              <a:rPr sz="1800">
+                <a:latin typeface="맑은 고딕" charset="0"/>
+                <a:ea typeface="맑은 고딕" charset="0"/>
+              </a:rPr>
+              <a:t>차원 공간에서 </a:t>
+            </a:r>
+            <a:r>
+              <a:rPr lang="ko-KR" sz="1800">
+                <a:latin typeface="맑은 고딕" charset="0"/>
+                <a:ea typeface="맑은 고딕" charset="0"/>
+              </a:rPr>
+              <a:t>특정한</a:t>
+            </a:r>
+            <a:r>
+              <a:rPr sz="1800">
+                <a:latin typeface="맑은 고딕" charset="0"/>
+                <a:ea typeface="맑은 고딕" charset="0"/>
+              </a:rPr>
+              <a:t> 방향으로 광선을 발사하</a:t>
+            </a:r>
+            <a:r>
+              <a:rPr lang="ko-KR" sz="1800">
+                <a:latin typeface="맑은 고딕" charset="0"/>
+                <a:ea typeface="맑은 고딕" charset="0"/>
+              </a:rPr>
+              <a:t>는 함수입니다.</a:t>
+            </a:r>
+            <a:endParaRPr lang="ko-KR" altLang="en-US" sz="1800">
+              <a:latin typeface="맑은 고딕" charset="0"/>
+              <a:ea typeface="맑은 고딕" charset="0"/>
+            </a:endParaRPr>
+          </a:p>
+        </p:txBody>
+      </p:sp>
+      <p:sp>
+        <p:nvSpPr>
+          <p:cNvPr id="62" name="텍스트 상자 5"/>
+          <p:cNvSpPr txBox="1">
+            <a:spLocks/>
+          </p:cNvSpPr>
+          <p:nvPr/>
+        </p:nvSpPr>
+        <p:spPr>
+          <a:xfrm rot="0">
+            <a:off x="1230630" y="5034915"/>
+            <a:ext cx="4140200" cy="1200785"/>
+          </a:xfrm>
+          <a:prstGeom prst="rect"/>
+          <a:noFill/>
+          <a:ln w="0">
+            <a:noFill/>
+            <a:prstDash/>
+          </a:ln>
+        </p:spPr>
+        <p:txBody>
+          <a:bodyPr wrap="square" lIns="89535" tIns="46355" rIns="89535" bIns="46355" vert="horz" anchor="t">
+            <a:spAutoFit/>
+          </a:bodyPr>
+          <a:lstStyle/>
+          <a:p>
+            <a:pPr marL="0" indent="0" rtl="0" algn="l" defTabSz="914400" eaLnBrk="1" latinLnBrk="0" hangingPunct="1">
+              <a:buFontTx/>
+              <a:buNone/>
+            </a:pPr>
+            <a:r>
+              <a:rPr sz="1800">
+                <a:latin typeface="맑은 고딕" charset="0"/>
+                <a:ea typeface="맑은 고딕" charset="0"/>
+              </a:rPr>
+              <a:t>Physics.Raycast( ) 함수</a:t>
+            </a:r>
+            <a:r>
+              <a:rPr lang="ko-KR" sz="1800">
+                <a:latin typeface="맑은 고딕" charset="0"/>
+                <a:ea typeface="맑은 고딕" charset="0"/>
+              </a:rPr>
+              <a:t>의 경우</a:t>
+            </a:r>
+            <a:r>
+              <a:rPr sz="1800">
+                <a:latin typeface="맑은 고딕" charset="0"/>
+                <a:ea typeface="맑은 고딕" charset="0"/>
+              </a:rPr>
+              <a:t> </a:t>
+            </a:r>
+            <a:r>
+              <a:rPr lang="ko-KR" sz="1800">
+                <a:latin typeface="맑은 고딕" charset="0"/>
+                <a:ea typeface="맑은 고딕" charset="0"/>
+              </a:rPr>
+              <a:t>광선과 충돌한 오브젝트는</a:t>
+            </a:r>
+            <a:r>
+              <a:rPr sz="1800">
+                <a:latin typeface="맑은 고딕" charset="0"/>
+                <a:ea typeface="맑은 고딕" charset="0"/>
+              </a:rPr>
+              <a:t> 콜라이더 컴포넌트를 가지고 있어야 </a:t>
+            </a:r>
+            <a:r>
+              <a:rPr lang="ko-KR" sz="1800">
+                <a:latin typeface="맑은 고딕" charset="0"/>
+                <a:ea typeface="맑은 고딕" charset="0"/>
+              </a:rPr>
+              <a:t>감지할 수 있습니다.</a:t>
+            </a:r>
+            <a:endParaRPr lang="ko-KR" altLang="en-US" sz="1800">
+              <a:latin typeface="맑은 고딕" charset="0"/>
+              <a:ea typeface="맑은 고딕" charset="0"/>
+            </a:endParaRPr>
+          </a:p>
+        </p:txBody>
+      </p:sp>
+      <p:pic>
+        <p:nvPicPr>
+          <p:cNvPr id="63" name="그림 6"/>
+          <p:cNvPicPr>
+            <a:picLocks noChangeAspect="1"/>
+          </p:cNvPicPr>
+          <p:nvPr/>
+        </p:nvPicPr>
+        <p:blipFill rotWithShape="1">
+          <a:blip r:embed="rId5" cstate="print">
+            <a:extLst>
+              <a:ext uri="{28A0092B-C50C-407E-A947-70E740481C1C}">
+                <a14:useLocalDpi xmlns:a14="http://schemas.microsoft.com/office/drawing/2010/main" val="0"/>
+              </a:ext>
+            </a:extLst>
+          </a:blip>
+          <a:stretch>
+            <a:fillRect/>
+          </a:stretch>
+        </p:blipFill>
+        <p:spPr>
+          <a:xfrm rot="0">
+            <a:off x="1229995" y="2560320"/>
+            <a:ext cx="4140835" cy="2303145"/>
+          </a:xfrm>
+          <a:prstGeom prst="roundRect"/>
+          <a:solidFill>
+            <a:srgbClr val="EDEDED"/>
+          </a:solidFill>
+        </p:spPr>
+      </p:pic>
+      <p:pic>
+        <p:nvPicPr>
+          <p:cNvPr id="64" name="그림 25"/>
+          <p:cNvPicPr>
+            <a:picLocks noChangeAspect="1"/>
+          </p:cNvPicPr>
+          <p:nvPr/>
+        </p:nvPicPr>
+        <p:blipFill rotWithShape="1">
+          <a:blip r:embed="rId6" cstate="hqprint">
+            <a:extLst>
+              <a:ext uri="{28A0092B-C50C-407E-A947-70E740481C1C}">
+                <a14:useLocalDpi xmlns:a14="http://schemas.microsoft.com/office/drawing/2010/main"/>
+              </a:ext>
+            </a:extLst>
+          </a:blip>
+          <a:stretch>
+            <a:fillRect/>
+          </a:stretch>
+        </p:blipFill>
+        <p:spPr>
+          <a:xfrm rot="0">
+            <a:off x="6814820" y="2571750"/>
+            <a:ext cx="4148455" cy="2459990"/>
+          </a:xfrm>
+          <a:prstGeom prst="roundRect"/>
+          <a:solidFill>
+            <a:srgbClr val="EDEDED"/>
+          </a:solidFill>
+        </p:spPr>
+      </p:pic>
+      <p:sp>
+        <p:nvSpPr>
+          <p:cNvPr id="65" name="텍스트 상자 26"/>
+          <p:cNvSpPr txBox="1">
+            <a:spLocks/>
+          </p:cNvSpPr>
+          <p:nvPr/>
+        </p:nvSpPr>
+        <p:spPr>
+          <a:xfrm rot="0">
+            <a:off x="6826885" y="1463675"/>
+            <a:ext cx="4145280" cy="961390"/>
+          </a:xfrm>
+          <a:prstGeom prst="rect"/>
+          <a:noFill/>
+        </p:spPr>
+        <p:txBody>
+          <a:bodyPr wrap="square" lIns="0" tIns="0" rIns="0" bIns="0" vert="horz" anchor="t">
+            <a:noAutofit/>
+          </a:bodyPr>
+          <a:lstStyle/>
+          <a:p>
+            <a:pPr marL="0" indent="0" rtl="0" algn="l" defTabSz="914400" eaLnBrk="1" latinLnBrk="0" hangingPunct="1">
+              <a:buFontTx/>
+              <a:buNone/>
+            </a:pPr>
+            <a:r>
+              <a:rPr sz="1800">
+                <a:latin typeface="맑은 고딕" charset="0"/>
+                <a:ea typeface="맑은 고딕" charset="0"/>
+              </a:rPr>
+              <a:t>Physics.Raycast( )</a:t>
+            </a:r>
+            <a:r>
+              <a:rPr sz="1800">
+                <a:latin typeface="맑은 고딕" charset="0"/>
+                <a:ea typeface="맑은 고딕" charset="0"/>
+              </a:rPr>
+              <a:t> </a:t>
+            </a:r>
+            <a:r>
+              <a:rPr lang="ko-KR" sz="1800">
+                <a:latin typeface="맑은 고딕" charset="0"/>
+                <a:ea typeface="맑은 고딕" charset="0"/>
+              </a:rPr>
+              <a:t>함수로</a:t>
+            </a:r>
+            <a:r>
+              <a:rPr sz="1800">
+                <a:latin typeface="맑은 고딕" charset="0"/>
+                <a:ea typeface="맑은 고딕" charset="0"/>
+              </a:rPr>
+              <a:t> 특정한 Layer만 검출하여 충돌하도록 설정할 수 있습니다.</a:t>
+            </a:r>
+            <a:endParaRPr lang="ko-KR" altLang="en-US" sz="1800">
+              <a:latin typeface="맑은 고딕" charset="0"/>
+              <a:ea typeface="맑은 고딕" charset="0"/>
+            </a:endParaRPr>
+          </a:p>
+          <a:p>
+            <a:pPr marL="0" indent="0" rtl="0" algn="l" defTabSz="914400" eaLnBrk="1" latinLnBrk="0" hangingPunct="1">
+              <a:buFontTx/>
+              <a:buNone/>
+            </a:pPr>
+            <a:endParaRPr lang="ko-KR" altLang="en-US" sz="1800">
+              <a:latin typeface="맑은 고딕" charset="0"/>
+              <a:ea typeface="맑은 고딕" charset="0"/>
+            </a:endParaRPr>
+          </a:p>
+        </p:txBody>
+      </p:sp>
+      <p:sp>
+        <p:nvSpPr>
+          <p:cNvPr id="66" name="텍스트 상자 27"/>
+          <p:cNvSpPr txBox="1">
+            <a:spLocks/>
+          </p:cNvSpPr>
+          <p:nvPr/>
+        </p:nvSpPr>
+        <p:spPr>
+          <a:xfrm rot="0">
+            <a:off x="6812280" y="5274310"/>
+            <a:ext cx="4159885" cy="961390"/>
+          </a:xfrm>
+          <a:prstGeom prst="rect"/>
+          <a:noFill/>
+        </p:spPr>
+        <p:txBody>
+          <a:bodyPr wrap="square" lIns="0" tIns="0" rIns="0" bIns="0" vert="horz" anchor="t">
+            <a:noAutofit/>
+          </a:bodyPr>
+          <a:lstStyle/>
+          <a:p>
+            <a:pPr marL="0" indent="0" rtl="0" algn="l" defTabSz="914400" eaLnBrk="1" latinLnBrk="0" hangingPunct="1">
+              <a:buFontTx/>
+              <a:buNone/>
+            </a:pPr>
+            <a:r>
+              <a:rPr sz="1800">
+                <a:latin typeface="맑은 고딕" charset="0"/>
+                <a:ea typeface="맑은 고딕" charset="0"/>
+              </a:rPr>
+              <a:t>LayerMask의 경우 32 bit의 int 형으로 bit로 각각의 </a:t>
+            </a:r>
+            <a:r>
+              <a:rPr lang="ko-KR" sz="1800">
+                <a:latin typeface="맑은 고딕" charset="0"/>
+                <a:ea typeface="맑은 고딕" charset="0"/>
+              </a:rPr>
+              <a:t>Layer</a:t>
+            </a:r>
+            <a:r>
+              <a:rPr sz="1800">
+                <a:latin typeface="맑은 고딕" charset="0"/>
+                <a:ea typeface="맑은 고딕" charset="0"/>
+              </a:rPr>
+              <a:t>를 구분하여 사용합니다.</a:t>
+            </a:r>
+            <a:endParaRPr lang="ko-KR" altLang="en-US" sz="1800">
+              <a:latin typeface="맑은 고딕" charset="0"/>
+              <a:ea typeface="맑은 고딕" charset="0"/>
+            </a:endParaRPr>
+          </a:p>
+        </p:txBody>
+      </p:sp>
     </p:spTree>
   </p:cSld>
   <p:clrMapOvr>
@@ -6194,7 +7675,7 @@
       </p:sp>
       <p:pic>
         <p:nvPicPr>
-          <p:cNvPr id="45" name="그림 16" descr="C:/Users/Admin1/AppData/Roaming/PolarisOffice/ETemp/19904_10543744/fImage122381159169.png"/>
+          <p:cNvPr id="45" name="그림 16"/>
           <p:cNvPicPr>
             <a:picLocks noChangeAspect="1"/>
           </p:cNvPicPr>
@@ -6256,7 +7737,7 @@
       </p:pic>
       <p:pic>
         <p:nvPicPr>
-          <p:cNvPr id="47" name="그림 36" descr="C:/Users/Admin1/AppData/Roaming/PolarisOffice/ETemp/19904_10543744/fImage518712141.png"/>
+          <p:cNvPr id="47" name="그림 36"/>
           <p:cNvPicPr>
             <a:picLocks noChangeAspect="1"/>
           </p:cNvPicPr>
@@ -6287,7 +7768,7 @@
       </p:pic>
       <p:pic>
         <p:nvPicPr>
-          <p:cNvPr id="48" name="그림 39" descr="C:/Users/Admin1/AppData/Roaming/PolarisOffice/ETemp/19904_10543744/fImage18501228467.png"/>
+          <p:cNvPr id="48" name="그림 39"/>
           <p:cNvPicPr>
             <a:picLocks noChangeAspect="1"/>
           </p:cNvPicPr>
@@ -7170,7 +8651,7 @@
       </p:sp>
       <p:pic>
         <p:nvPicPr>
-          <p:cNvPr id="46" name="그림 28" descr="C:/Users/Admin1/AppData/Roaming/PolarisOffice/ETemp/19904_10543744/fImage124272065705.png"/>
+          <p:cNvPr id="46" name="그림 28"/>
           <p:cNvPicPr>
             <a:picLocks noChangeAspect="1"/>
           </p:cNvPicPr>
@@ -7428,7 +8909,7 @@
       </p:pic>
       <p:pic>
         <p:nvPicPr>
-          <p:cNvPr id="56" name="그림 11" descr="C:/Users/Admin1/AppData/Roaming/PolarisOffice/ETemp/19904_10543744/fImage138331066334.png"/>
+          <p:cNvPr id="56" name="그림 11"/>
           <p:cNvPicPr>
             <a:picLocks noChangeAspect="1"/>
           </p:cNvPicPr>
@@ -7492,7 +8973,7 @@
       </p:cxnSp>
       <p:pic>
         <p:nvPicPr>
-          <p:cNvPr id="57" name="그림 27" descr="C:/Users/Admin1/AppData/Roaming/PolarisOffice/ETemp/19904_10543744/fImage80801146500.png"/>
+          <p:cNvPr id="57" name="그림 27"/>
           <p:cNvPicPr>
             <a:picLocks noChangeAspect="1"/>
           </p:cNvPicPr>
@@ -7655,7 +9136,7 @@
       </p:sp>
       <p:pic>
         <p:nvPicPr>
-          <p:cNvPr id="59" name="그림 29" descr="C:/Users/Admin1/AppData/Roaming/PolarisOffice/ETemp/19904_10543744/fImage138331169169.png"/>
+          <p:cNvPr id="59" name="그림 29"/>
           <p:cNvPicPr>
             <a:picLocks noChangeAspect="1"/>
           </p:cNvPicPr>
@@ -8049,7 +9530,7 @@
       </p:pic>
       <p:pic>
         <p:nvPicPr>
-          <p:cNvPr id="62" name="그림 33" descr="C:/Users/Admin1/AppData/Roaming/PolarisOffice/ETemp/19904_10543744/fImage81101119358.png"/>
+          <p:cNvPr id="62" name="그림 33"/>
           <p:cNvPicPr>
             <a:picLocks noChangeAspect="1"/>
           </p:cNvPicPr>
@@ -8246,7 +9727,7 @@
       </p:cxnSp>
       <p:pic>
         <p:nvPicPr>
-          <p:cNvPr id="68" name="그림 7" descr="C:/Users/Admin1/AppData/Roaming/PolarisOffice/ETemp/19904_10543744/fImage138331045724.png"/>
+          <p:cNvPr id="68" name="그림 7"/>
           <p:cNvPicPr>
             <a:picLocks noChangeAspect="1"/>
           </p:cNvPicPr>
@@ -8410,7 +9891,7 @@
       </p:sp>
       <p:pic>
         <p:nvPicPr>
-          <p:cNvPr id="79" name="그림 39" descr="C:/Users/Admin1/AppData/Roaming/PolarisOffice/ETemp/19904_10543744/fImage157591155705.png"/>
+          <p:cNvPr id="79" name="그림 39"/>
           <p:cNvPicPr>
             <a:picLocks noChangeAspect="1"/>
           </p:cNvPicPr>
@@ -8519,7 +10000,7 @@
       </p:sp>
       <p:pic>
         <p:nvPicPr>
-          <p:cNvPr id="81" name="그림 59" descr="C:/Users/Admin1/AppData/Roaming/PolarisOffice/ETemp/19904_10543744/fImage80701258145.png"/>
+          <p:cNvPr id="81" name="그림 59"/>
           <p:cNvPicPr>
             <a:picLocks noChangeAspect="1"/>
           </p:cNvPicPr>
@@ -8651,17 +10132,17 @@
       </p:sp>
       <p:pic>
         <p:nvPicPr>
-          <p:cNvPr id="87" name="그림 16" descr="C:/Users/Admin1/AppData/Roaming/PolarisOffice/ETemp/19904_10543744/fImage161511091478.png"/>
+          <p:cNvPr id="87" name="그림 16" descr="C:/Users/Admin1/AppData/Roaming/PolarisOffice/ETemp/3976_17614504/fImage161511091478.png"/>
           <p:cNvPicPr>
             <a:picLocks noChangeAspect="1"/>
           </p:cNvPicPr>
           <p:nvPr/>
         </p:nvPicPr>
         <p:blipFill rotWithShape="1">
-          <a:blip r:embed="rId19" cstate="print">
+          <a:blip r:embed="rId19" cstate="hqprint">
             <a:extLst>
               <a:ext uri="{28A0092B-C50C-407E-A947-70E740481C1C}">
-                <a14:useLocalDpi xmlns:a14="http://schemas.microsoft.com/office/drawing/2010/main" val="0"/>
+                <a14:useLocalDpi xmlns:a14="http://schemas.microsoft.com/office/drawing/2010/main"/>
               </a:ext>
             </a:extLst>
           </a:blip>
@@ -8671,8 +10152,8 @@
         </p:blipFill>
         <p:spPr>
           <a:xfrm rot="0">
-            <a:off x="8122285" y="1420495"/>
-            <a:ext cx="2832100" cy="1446530"/>
+            <a:off x="8122285" y="1446530"/>
+            <a:ext cx="2832735" cy="1421130"/>
           </a:xfrm>
           <a:prstGeom prst="roundRect"/>
           <a:solidFill>
@@ -8783,7 +10264,7 @@
       </p:sp>
       <p:pic>
         <p:nvPicPr>
-          <p:cNvPr id="89" name="그림 20" descr="C:/Users/Admin1/AppData/Roaming/PolarisOffice/ETemp/19904_10543744/fImage80461119358.png"/>
+          <p:cNvPr id="89" name="그림 20"/>
           <p:cNvPicPr>
             <a:picLocks noChangeAspect="1"/>
           </p:cNvPicPr>
@@ -8814,7 +10295,7 @@
       </p:pic>
       <p:pic>
         <p:nvPicPr>
-          <p:cNvPr id="90" name="그림 33" descr="C:/Users/Admin1/AppData/Roaming/PolarisOffice/ETemp/19904_10543744/fImage125992078145.png"/>
+          <p:cNvPr id="90" name="그림 33"/>
           <p:cNvPicPr>
             <a:picLocks noChangeAspect="1"/>
           </p:cNvPicPr>
@@ -8916,7 +10397,7 @@
       </p:sp>
       <p:pic>
         <p:nvPicPr>
-          <p:cNvPr id="92" name="그림 35" descr="C:/Users/Admin1/AppData/Roaming/PolarisOffice/ETemp/19904_10543744/fImage113691271478.png"/>
+          <p:cNvPr id="92" name="그림 35"/>
           <p:cNvPicPr>
             <a:picLocks noChangeAspect="1"/>
           </p:cNvPicPr>
@@ -8969,7 +10450,7 @@
 </file>
 
 <file path=ppt/slides/slide7.xml><?xml version="1.0" encoding="utf-8"?>
-<p:sld xmlns:a="http://schemas.openxmlformats.org/drawingml/2006/main" xmlns:r="http://schemas.openxmlformats.org/officeDocument/2006/relationships" xmlns:p="http://schemas.openxmlformats.org/presentationml/2006/main">
+<p:sld xmlns:a="http://schemas.openxmlformats.org/drawingml/2006/main" xmlns:r="http://schemas.openxmlformats.org/officeDocument/2006/relationships" xmlns:p="http://schemas.openxmlformats.org/presentationml/2006/main" xmlns:p14="http://schemas.microsoft.com/office/powerpoint/2010/main">
   <p:cSld>
     <p:spTree>
       <p:nvGrpSpPr>
@@ -9139,8 +10620,8 @@
         </p:nvSpPr>
         <p:spPr>
           <a:xfrm rot="0">
-            <a:off x="6859905" y="4925060"/>
-            <a:ext cx="4103370" cy="1231265"/>
+            <a:off x="6859905" y="4916805"/>
+            <a:ext cx="4104005" cy="1231900"/>
           </a:xfrm>
           <a:prstGeom prst="rect"/>
           <a:noFill/>
@@ -9195,17 +10676,17 @@
       </p:sp>
       <p:pic>
         <p:nvPicPr>
-          <p:cNvPr id="93" name="그림 43" descr="C:/Users/Admin1/AppData/Roaming/PolarisOffice/ETemp/19904_10543744/fImage173662076962.png"/>
+          <p:cNvPr id="93" name="그림 43" descr="C:/Users/Admin1/AppData/Roaming/PolarisOffice/ETemp/3976_17614504/fImage173662076962.png"/>
           <p:cNvPicPr>
             <a:picLocks noChangeAspect="1"/>
           </p:cNvPicPr>
           <p:nvPr/>
         </p:nvPicPr>
         <p:blipFill rotWithShape="1">
-          <a:blip r:embed="rId2" cstate="print">
+          <a:blip r:embed="rId2" cstate="hqprint">
             <a:extLst>
               <a:ext uri="{28A0092B-C50C-407E-A947-70E740481C1C}">
-                <a14:useLocalDpi xmlns:a14="http://schemas.microsoft.com/office/drawing/2010/main" val="0"/>
+                <a14:useLocalDpi xmlns:a14="http://schemas.microsoft.com/office/drawing/2010/main"/>
               </a:ext>
             </a:extLst>
           </a:blip>
@@ -9215,8 +10696,8 @@
         </p:blipFill>
         <p:spPr>
           <a:xfrm rot="0">
-            <a:off x="1221105" y="1420495"/>
-            <a:ext cx="4157345" cy="1749425"/>
+            <a:off x="1221105" y="1454785"/>
+            <a:ext cx="4157980" cy="1715770"/>
           </a:xfrm>
           <a:prstGeom prst="roundRect"/>
           <a:solidFill>
@@ -9313,17 +10794,17 @@
       </p:sp>
       <p:pic>
         <p:nvPicPr>
-          <p:cNvPr id="95" name="그림 47" descr="C:/Users/Admin1/AppData/Roaming/PolarisOffice/ETemp/19904_10543744/fImage164012094464.png"/>
+          <p:cNvPr id="95" name="그림 47" descr="C:/Users/Admin1/AppData/Roaming/PolarisOffice/ETemp/3976_17614504/fImage164012094464.png"/>
           <p:cNvPicPr>
             <a:picLocks noChangeAspect="1"/>
           </p:cNvPicPr>
           <p:nvPr/>
         </p:nvPicPr>
         <p:blipFill rotWithShape="1">
-          <a:blip r:embed="rId3" cstate="print">
+          <a:blip r:embed="rId3" cstate="hqprint">
             <a:extLst>
               <a:ext uri="{28A0092B-C50C-407E-A947-70E740481C1C}">
-                <a14:useLocalDpi xmlns:a14="http://schemas.microsoft.com/office/drawing/2010/main" val="0"/>
+                <a14:useLocalDpi xmlns:a14="http://schemas.microsoft.com/office/drawing/2010/main"/>
               </a:ext>
             </a:extLst>
           </a:blip>
@@ -9333,8 +10814,8 @@
         </p:blipFill>
         <p:spPr>
           <a:xfrm rot="0">
-            <a:off x="6848475" y="1420495"/>
-            <a:ext cx="4105910" cy="2096135"/>
+            <a:off x="6848475" y="1454785"/>
+            <a:ext cx="4106545" cy="2062480"/>
           </a:xfrm>
           <a:prstGeom prst="roundRect"/>
           <a:solidFill>
@@ -9344,7 +10825,7 @@
       </p:pic>
       <p:pic>
         <p:nvPicPr>
-          <p:cNvPr id="96" name="그림 50" descr="C:/Users/Admin1/AppData/Roaming/PolarisOffice/ETemp/19904_10543744/fImage212342105705.png"/>
+          <p:cNvPr id="96" name="그림 50"/>
           <p:cNvPicPr>
             <a:picLocks noChangeAspect="1"/>
           </p:cNvPicPr>
@@ -9408,7 +10889,7 @@
       </p:cxnSp>
       <p:pic>
         <p:nvPicPr>
-          <p:cNvPr id="98" name="그림 55" descr="C:/Users/Admin1/AppData/Roaming/PolarisOffice/ETemp/19904_10543744/fImage70042138145.png"/>
+          <p:cNvPr id="98" name="그림 55"/>
           <p:cNvPicPr>
             <a:picLocks noChangeAspect="1"/>
           </p:cNvPicPr>
@@ -9439,7 +10920,7 @@
       </p:pic>
       <p:pic>
         <p:nvPicPr>
-          <p:cNvPr id="99" name="그림 56" descr="C:/Users/Admin1/AppData/Roaming/PolarisOffice/ETemp/19904_10543744/fImage120842143281.png"/>
+          <p:cNvPr id="99" name="그림 56"/>
           <p:cNvPicPr>
             <a:picLocks noChangeAspect="1"/>
           </p:cNvPicPr>
@@ -9525,7 +11006,7 @@
 </file>
 
 <file path=ppt/slides/slide8.xml><?xml version="1.0" encoding="utf-8"?>
-<p:sld xmlns:a="http://schemas.openxmlformats.org/drawingml/2006/main" xmlns:r="http://schemas.openxmlformats.org/officeDocument/2006/relationships" xmlns:p="http://schemas.openxmlformats.org/presentationml/2006/main" xmlns:p14="http://schemas.microsoft.com/office/powerpoint/2010/main">
+<p:sld xmlns:a="http://schemas.openxmlformats.org/drawingml/2006/main" xmlns:r="http://schemas.openxmlformats.org/officeDocument/2006/relationships" xmlns:p="http://schemas.openxmlformats.org/presentationml/2006/main">
   <p:cSld>
     <p:spTree>
       <p:nvGrpSpPr>
@@ -9551,8 +11032,8 @@
         </p:nvSpPr>
         <p:spPr>
           <a:xfrm rot="0">
-            <a:off x="4658995" y="450215"/>
-            <a:ext cx="2877185" cy="478155"/>
+            <a:off x="4339590" y="383540"/>
+            <a:ext cx="3524885" cy="478155"/>
           </a:xfrm>
           <a:prstGeom prst="rect"/>
           <a:noFill/>
@@ -9579,7 +11060,17 @@
                 <a:latin typeface="나눔바른고딕" charset="0"/>
                 <a:ea typeface="나눔바른고딕" charset="0"/>
               </a:rPr>
-              <a:t>RayCast</a:t>
+              <a:t>여덟</a:t>
+            </a:r>
+            <a:r>
+              <a:rPr lang="ko-KR" sz="2500" b="1">
+                <a:solidFill>
+                  <a:schemeClr val="tx1"/>
+                </a:solidFill>
+                <a:latin typeface="나눔바른고딕" charset="0"/>
+                <a:ea typeface="나눔바른고딕" charset="0"/>
+              </a:rPr>
+              <a:t> 번째 튜토리얼</a:t>
             </a:r>
             <a:endParaRPr lang="ko-KR" altLang="en-US" sz="2500" b="1">
               <a:solidFill>
@@ -9593,7 +11084,7 @@
       </p:sp>
       <p:sp>
         <p:nvSpPr>
-          <p:cNvPr id="61" name="텍스트 상자 4"/>
+          <p:cNvPr id="84" name="Rect 0"/>
           <p:cNvSpPr txBox="1">
             <a:spLocks/>
           </p:cNvSpPr>
@@ -9601,8 +11092,8 @@
         </p:nvSpPr>
         <p:spPr>
           <a:xfrm rot="0">
-            <a:off x="1229995" y="1454785"/>
-            <a:ext cx="4132580" cy="923925"/>
+            <a:off x="1221105" y="5476875"/>
+            <a:ext cx="4141470" cy="677545"/>
           </a:xfrm>
           <a:prstGeom prst="rect"/>
           <a:noFill/>
@@ -9612,7 +11103,7 @@
           </a:ln>
         </p:spPr>
         <p:txBody>
-          <a:bodyPr wrap="square" lIns="89535" tIns="46355" rIns="89535" bIns="46355" vert="horz" anchor="t">
+          <a:bodyPr wrap="square" lIns="89535" tIns="46355" rIns="89535" bIns="46355" numCol="1" vert="horz" anchor="t">
             <a:spAutoFit/>
           </a:bodyPr>
           <a:lstStyle/>
@@ -9622,48 +11113,53 @@
               <a:buNone/>
             </a:pPr>
             <a:r>
-              <a:rPr sz="1800">
-                <a:latin typeface="맑은 고딕" charset="0"/>
-                <a:ea typeface="맑은 고딕" charset="0"/>
-              </a:rPr>
-              <a:t>Physics.Raycast( ) 함수는 3</a:t>
-            </a:r>
-            <a:r>
-              <a:rPr sz="1800">
+              <a:rPr lang="ko-KR" sz="2000" b="1">
+                <a:solidFill>
+                  <a:srgbClr val="0611F2"/>
+                </a:solidFill>
+                <a:latin typeface="맑은 고딕" charset="0"/>
+                <a:ea typeface="맑은 고딕" charset="0"/>
+              </a:rPr>
+              <a:t>23</a:t>
+            </a:r>
+            <a:r>
+              <a:rPr sz="2000" b="1">
+                <a:solidFill>
+                  <a:srgbClr val="0611F2"/>
+                </a:solidFill>
+                <a:latin typeface="맑은 고딕" charset="0"/>
+                <a:ea typeface="맑은 고딕" charset="0"/>
+              </a:rPr>
+              <a:t>. </a:t>
+            </a:r>
+            <a:r>
+              <a:rPr lang="ko-KR" sz="1800">
+                <a:latin typeface="맑은 고딕" charset="0"/>
+                <a:ea typeface="맑은 고딕" charset="0"/>
+              </a:rPr>
+              <a:t>이제</a:t>
+            </a:r>
+            <a:r>
+              <a:rPr lang="ko-KR" sz="1800">
                 <a:latin typeface="맑은 고딕" charset="0"/>
                 <a:ea typeface="맑은 고딕" charset="0"/>
               </a:rPr>
               <a:t> </a:t>
             </a:r>
             <a:r>
-              <a:rPr sz="1800">
-                <a:latin typeface="맑은 고딕" charset="0"/>
-                <a:ea typeface="맑은 고딕" charset="0"/>
-              </a:rPr>
-              <a:t>차원 공간에서 </a:t>
-            </a:r>
-            <a:r>
-              <a:rPr lang="ko-KR" sz="1800">
-                <a:latin typeface="맑은 고딕" charset="0"/>
-                <a:ea typeface="맑은 고딕" charset="0"/>
-              </a:rPr>
-              <a:t>특정한</a:t>
-            </a:r>
-            <a:r>
-              <a:rPr sz="1800">
-                <a:latin typeface="맑은 고딕" charset="0"/>
-                <a:ea typeface="맑은 고딕" charset="0"/>
-              </a:rPr>
-              <a:t> 방향으로 광선을 발사하</a:t>
-            </a:r>
-            <a:r>
-              <a:rPr lang="ko-KR" sz="1800">
-                <a:latin typeface="맑은 고딕" charset="0"/>
-                <a:ea typeface="맑은 고딕" charset="0"/>
-              </a:rPr>
-              <a:t>는 함수입니다.</a:t>
-            </a:r>
-            <a:endParaRPr lang="ko-KR" altLang="en-US" sz="1800">
+              <a:rPr lang="ko-KR" sz="1800" b="0">
+                <a:solidFill>
+                  <a:schemeClr val="tx1"/>
+                </a:solidFill>
+                <a:latin typeface="맑은 고딕" charset="0"/>
+                <a:ea typeface="맑은 고딕" charset="0"/>
+              </a:rPr>
+              <a:t>HD TV 오브젝트의 위치와 회전 그리고 크기를 설정합니다.</a:t>
+            </a:r>
+            <a:endParaRPr lang="ko-KR" altLang="en-US" sz="1800" b="0">
+              <a:solidFill>
+                <a:schemeClr val="tx1"/>
+              </a:solidFill>
               <a:latin typeface="맑은 고딕" charset="0"/>
               <a:ea typeface="맑은 고딕" charset="0"/>
             </a:endParaRPr>
@@ -9672,7 +11168,7 @@
       </p:sp>
       <p:sp>
         <p:nvSpPr>
-          <p:cNvPr id="62" name="텍스트 상자 5"/>
+          <p:cNvPr id="91" name="Rect 0"/>
           <p:cNvSpPr txBox="1">
             <a:spLocks/>
           </p:cNvSpPr>
@@ -9680,8 +11176,8 @@
         </p:nvSpPr>
         <p:spPr>
           <a:xfrm rot="0">
-            <a:off x="1230630" y="5034915"/>
-            <a:ext cx="4140200" cy="1200785"/>
+            <a:off x="6808470" y="4925060"/>
+            <a:ext cx="4131945" cy="1231265"/>
           </a:xfrm>
           <a:prstGeom prst="rect"/>
           <a:noFill/>
@@ -9691,7 +11187,7 @@
           </a:ln>
         </p:spPr>
         <p:txBody>
-          <a:bodyPr wrap="square" lIns="89535" tIns="46355" rIns="89535" bIns="46355" vert="horz" anchor="t">
+          <a:bodyPr wrap="square" lIns="89535" tIns="46355" rIns="89535" bIns="46355" numCol="1" vert="horz" anchor="t">
             <a:spAutoFit/>
           </a:bodyPr>
           <a:lstStyle/>
@@ -9701,46 +11197,48 @@
               <a:buNone/>
             </a:pPr>
             <a:r>
-              <a:rPr sz="1800">
-                <a:latin typeface="맑은 고딕" charset="0"/>
-                <a:ea typeface="맑은 고딕" charset="0"/>
-              </a:rPr>
-              <a:t>Physics.Raycast( ) 함수</a:t>
+              <a:rPr lang="ko-KR" sz="2000" b="1">
+                <a:solidFill>
+                  <a:srgbClr val="0611F2"/>
+                </a:solidFill>
+                <a:latin typeface="맑은 고딕" charset="0"/>
+                <a:ea typeface="맑은 고딕" charset="0"/>
+              </a:rPr>
+              <a:t>2</a:t>
+            </a:r>
+            <a:r>
+              <a:rPr lang="ko-KR" sz="2000" b="1">
+                <a:solidFill>
+                  <a:srgbClr val="0611F2"/>
+                </a:solidFill>
+                <a:latin typeface="맑은 고딕" charset="0"/>
+                <a:ea typeface="맑은 고딕" charset="0"/>
+              </a:rPr>
+              <a:t>4</a:t>
+            </a:r>
+            <a:r>
+              <a:rPr sz="2000" b="1">
+                <a:solidFill>
+                  <a:srgbClr val="0611F2"/>
+                </a:solidFill>
+                <a:latin typeface="맑은 고딕" charset="0"/>
+                <a:ea typeface="맑은 고딕" charset="0"/>
+              </a:rPr>
+              <a:t>. </a:t>
             </a:r>
             <a:r>
               <a:rPr lang="ko-KR" sz="1800">
                 <a:latin typeface="맑은 고딕" charset="0"/>
                 <a:ea typeface="맑은 고딕" charset="0"/>
               </a:rPr>
-              <a:t>의 경우</a:t>
-            </a:r>
-            <a:r>
-              <a:rPr sz="1800">
-                <a:latin typeface="맑은 고딕" charset="0"/>
-                <a:ea typeface="맑은 고딕" charset="0"/>
-              </a:rPr>
-              <a:t> </a:t>
+              <a:t>그런 다음 </a:t>
             </a:r>
             <a:r>
               <a:rPr lang="ko-KR" sz="1800">
                 <a:latin typeface="맑은 고딕" charset="0"/>
                 <a:ea typeface="맑은 고딕" charset="0"/>
               </a:rPr>
-              <a:t>광선과 충돌한 오브젝트는</a:t>
-            </a:r>
-            <a:r>
-              <a:rPr sz="1800">
-                <a:latin typeface="맑은 고딕" charset="0"/>
-                <a:ea typeface="맑은 고딕" charset="0"/>
-              </a:rPr>
-              <a:t> 콜라이더 컴포넌트를 가지고 있어야 </a:t>
-            </a:r>
-            <a:r>
-              <a:rPr lang="ko-KR" sz="1800">
-                <a:latin typeface="맑은 고딕" charset="0"/>
-                <a:ea typeface="맑은 고딕" charset="0"/>
-              </a:rPr>
-              <a:t>감지할 수 있습니다.</a:t>
+              <a:t>HD TV 오브젝트 하위 오브젝트로 Quad 오브젝트를 생성하고 Screen이라는 이름으로 정의합니다.</a:t>
             </a:r>
             <a:endParaRPr lang="ko-KR" altLang="en-US" sz="1800">
               <a:latin typeface="맑은 고딕" charset="0"/>
@@ -9749,9 +11247,230 @@
           </a:p>
         </p:txBody>
       </p:sp>
+      <p:sp>
+        <p:nvSpPr>
+          <p:cNvPr id="94" name="Rect 0"/>
+          <p:cNvSpPr txBox="1">
+            <a:spLocks/>
+          </p:cNvSpPr>
+          <p:nvPr/>
+        </p:nvSpPr>
+        <p:spPr>
+          <a:xfrm rot="0">
+            <a:off x="1223645" y="2747645"/>
+            <a:ext cx="4147185" cy="954405"/>
+          </a:xfrm>
+          <a:prstGeom prst="rect"/>
+          <a:noFill/>
+          <a:ln w="0">
+            <a:noFill/>
+            <a:prstDash/>
+          </a:ln>
+        </p:spPr>
+        <p:txBody>
+          <a:bodyPr wrap="square" lIns="89535" tIns="46355" rIns="89535" bIns="46355" numCol="1" vert="horz" anchor="t">
+            <a:spAutoFit/>
+          </a:bodyPr>
+          <a:lstStyle/>
+          <a:p>
+            <a:pPr marL="0" indent="0" rtl="0" algn="l" defTabSz="914400" eaLnBrk="1" latinLnBrk="0" hangingPunct="1">
+              <a:buFontTx/>
+              <a:buNone/>
+            </a:pPr>
+            <a:r>
+              <a:rPr lang="ko-KR" sz="2000" b="1">
+                <a:solidFill>
+                  <a:srgbClr val="0611F2"/>
+                </a:solidFill>
+                <a:latin typeface="맑은 고딕" charset="0"/>
+                <a:ea typeface="맑은 고딕" charset="0"/>
+              </a:rPr>
+              <a:t>22</a:t>
+            </a:r>
+            <a:r>
+              <a:rPr sz="2000" b="1">
+                <a:solidFill>
+                  <a:srgbClr val="0611F2"/>
+                </a:solidFill>
+                <a:latin typeface="맑은 고딕" charset="0"/>
+                <a:ea typeface="맑은 고딕" charset="0"/>
+              </a:rPr>
+              <a:t>. </a:t>
+            </a:r>
+            <a:r>
+              <a:rPr lang="ko-KR" sz="1800">
+                <a:latin typeface="맑은 고딕" charset="0"/>
+                <a:ea typeface="맑은 고딕" charset="0"/>
+              </a:rPr>
+              <a:t>그</a:t>
+            </a:r>
+            <a:r>
+              <a:rPr lang="ko-KR" sz="1800">
+                <a:latin typeface="맑은 고딕" charset="0"/>
+                <a:ea typeface="맑은 고딕" charset="0"/>
+              </a:rPr>
+              <a:t>러고 나서</a:t>
+            </a:r>
+            <a:r>
+              <a:rPr lang="ko-KR" sz="1800">
+                <a:latin typeface="맑은 고딕" charset="0"/>
+                <a:ea typeface="맑은 고딕" charset="0"/>
+              </a:rPr>
+              <a:t> Project 폴더 아래에 있는 </a:t>
+            </a:r>
+            <a:r>
+              <a:rPr lang="ko-KR" sz="1800">
+                <a:latin typeface="맑은 고딕" charset="0"/>
+                <a:ea typeface="맑은 고딕" charset="0"/>
+              </a:rPr>
+              <a:t>Model </a:t>
+            </a:r>
+            <a:r>
+              <a:rPr lang="ko-KR" sz="1800">
+                <a:latin typeface="맑은 고딕" charset="0"/>
+                <a:ea typeface="맑은 고딕" charset="0"/>
+              </a:rPr>
+              <a:t>폴더에 </a:t>
+            </a:r>
+            <a:r>
+              <a:rPr lang="ko-KR" sz="1800">
+                <a:latin typeface="맑은 고딕" charset="0"/>
+                <a:ea typeface="맑은 고딕" charset="0"/>
+              </a:rPr>
+              <a:t>HD TV 모델을</a:t>
+            </a:r>
+            <a:r>
+              <a:rPr lang="ko-KR" sz="1800">
+                <a:latin typeface="맑은 고딕" charset="0"/>
+                <a:ea typeface="맑은 고딕" charset="0"/>
+              </a:rPr>
+              <a:t> 선</a:t>
+            </a:r>
+            <a:r>
+              <a:rPr lang="ko-KR" sz="1800">
+                <a:latin typeface="맑은 고딕" charset="0"/>
+                <a:ea typeface="맑은 고딕" charset="0"/>
+              </a:rPr>
+              <a:t>택한 다음</a:t>
+            </a:r>
+            <a:r>
+              <a:rPr lang="ko-KR" sz="1800">
+                <a:latin typeface="맑은 고딕" charset="0"/>
+                <a:ea typeface="맑은 고딕" charset="0"/>
+              </a:rPr>
+              <a:t> </a:t>
+            </a:r>
+            <a:r>
+              <a:rPr lang="ko-KR" sz="1800">
+                <a:latin typeface="맑은 고딕" charset="0"/>
+                <a:ea typeface="맑은 고딕" charset="0"/>
+              </a:rPr>
+              <a:t>월드 공간에 배치합니다.</a:t>
+            </a:r>
+            <a:endParaRPr lang="ko-KR" altLang="en-US" sz="1800" b="0">
+              <a:solidFill>
+                <a:schemeClr val="tx1"/>
+              </a:solidFill>
+              <a:latin typeface="맑은 고딕" charset="0"/>
+              <a:ea typeface="맑은 고딕" charset="0"/>
+            </a:endParaRPr>
+          </a:p>
+        </p:txBody>
+      </p:sp>
       <p:pic>
         <p:nvPicPr>
-          <p:cNvPr id="63" name="그림 6"/>
+          <p:cNvPr id="101" name="그림 1" descr="C:/Users/Admin1/AppData/Roaming/PolarisOffice/ETemp/3976_17614504/fImage802820741.png"/>
+          <p:cNvPicPr>
+            <a:picLocks noChangeAspect="1"/>
+          </p:cNvPicPr>
+          <p:nvPr/>
+        </p:nvPicPr>
+        <p:blipFill rotWithShape="1">
+          <a:blip r:embed="rId2" cstate="print">
+            <a:extLst>
+              <a:ext uri="{28A0092B-C50C-407E-A947-70E740481C1C}">
+                <a14:useLocalDpi xmlns:a14="http://schemas.microsoft.com/office/drawing/2010/main" val="0"/>
+              </a:ext>
+            </a:extLst>
+          </a:blip>
+          <a:stretch>
+            <a:fillRect/>
+          </a:stretch>
+        </p:blipFill>
+        <p:spPr>
+          <a:xfrm rot="0">
+            <a:off x="1230630" y="1454785"/>
+            <a:ext cx="1272540" cy="1139190"/>
+          </a:xfrm>
+          <a:prstGeom prst="roundRect"/>
+          <a:solidFill>
+            <a:srgbClr val="EDEDED"/>
+          </a:solidFill>
+        </p:spPr>
+      </p:pic>
+      <p:pic>
+        <p:nvPicPr>
+          <p:cNvPr id="102" name="그림 4" descr="C:/Users/Admin1/AppData/Roaming/PolarisOffice/ETemp/3976_17614504/fImage51772088467.png"/>
+          <p:cNvPicPr>
+            <a:picLocks noChangeAspect="1"/>
+          </p:cNvPicPr>
+          <p:nvPr/>
+        </p:nvPicPr>
+        <p:blipFill rotWithShape="1">
+          <a:blip r:embed="rId3" cstate="print">
+            <a:extLst>
+              <a:ext uri="{28A0092B-C50C-407E-A947-70E740481C1C}">
+                <a14:useLocalDpi xmlns:a14="http://schemas.microsoft.com/office/drawing/2010/main" val="0"/>
+              </a:ext>
+            </a:extLst>
+          </a:blip>
+          <a:stretch>
+            <a:fillRect/>
+          </a:stretch>
+        </p:blipFill>
+        <p:spPr>
+          <a:xfrm rot="0">
+            <a:off x="2668905" y="1454785"/>
+            <a:ext cx="2702560" cy="1148080"/>
+          </a:xfrm>
+          <a:prstGeom prst="roundRect"/>
+          <a:solidFill>
+            <a:srgbClr val="EDEDED"/>
+          </a:solidFill>
+        </p:spPr>
+      </p:pic>
+      <p:pic>
+        <p:nvPicPr>
+          <p:cNvPr id="103" name="그림 12" descr="C:/Users/Admin1/AppData/Roaming/PolarisOffice/ETemp/3976_17614504/fImage2242172176334.png"/>
+          <p:cNvPicPr>
+            <a:picLocks noChangeAspect="1"/>
+          </p:cNvPicPr>
+          <p:nvPr/>
+        </p:nvPicPr>
+        <p:blipFill rotWithShape="1">
+          <a:blip r:embed="rId4" cstate="hqprint">
+            <a:extLst>
+              <a:ext uri="{28A0092B-C50C-407E-A947-70E740481C1C}">
+                <a14:useLocalDpi xmlns:a14="http://schemas.microsoft.com/office/drawing/2010/main"/>
+              </a:ext>
+            </a:extLst>
+          </a:blip>
+          <a:stretch>
+            <a:fillRect/>
+          </a:stretch>
+        </p:blipFill>
+        <p:spPr>
+          <a:xfrm rot="10800000">
+            <a:off x="2148205" y="1822450"/>
+            <a:ext cx="762000" cy="426085"/>
+          </a:xfrm>
+          <a:prstGeom prst="rect"/>
+          <a:noFill/>
+        </p:spPr>
+      </p:pic>
+      <p:pic>
+        <p:nvPicPr>
+          <p:cNvPr id="104" name="그림 13" descr="C:/Users/Admin1/AppData/Roaming/PolarisOffice/ETemp/3976_17614504/fImage149552186500.png"/>
           <p:cNvPicPr>
             <a:picLocks noChangeAspect="1"/>
           </p:cNvPicPr>
@@ -9771,8 +11490,8 @@
         </p:blipFill>
         <p:spPr>
           <a:xfrm rot="0">
-            <a:off x="1229995" y="2560320"/>
-            <a:ext cx="4140835" cy="2303145"/>
+            <a:off x="1230630" y="3832225"/>
+            <a:ext cx="4140200" cy="1544955"/>
           </a:xfrm>
           <a:prstGeom prst="roundRect"/>
           <a:solidFill>
@@ -9782,17 +11501,17 @@
       </p:pic>
       <p:pic>
         <p:nvPicPr>
-          <p:cNvPr id="64" name="그림 25"/>
+          <p:cNvPr id="105" name="그림 16" descr="C:/Users/Admin1/AppData/Roaming/PolarisOffice/ETemp/3976_17614504/fImage186572199169.png"/>
           <p:cNvPicPr>
             <a:picLocks noChangeAspect="1"/>
           </p:cNvPicPr>
           <p:nvPr/>
         </p:nvPicPr>
         <p:blipFill rotWithShape="1">
-          <a:blip r:embed="rId6" cstate="hqprint">
+          <a:blip r:embed="rId6" cstate="print">
             <a:extLst>
               <a:ext uri="{28A0092B-C50C-407E-A947-70E740481C1C}">
-                <a14:useLocalDpi xmlns:a14="http://schemas.microsoft.com/office/drawing/2010/main"/>
+                <a14:useLocalDpi xmlns:a14="http://schemas.microsoft.com/office/drawing/2010/main" val="0"/>
               </a:ext>
             </a:extLst>
           </a:blip>
@@ -9802,8 +11521,8 @@
         </p:blipFill>
         <p:spPr>
           <a:xfrm rot="0">
-            <a:off x="6814820" y="2571750"/>
-            <a:ext cx="4148455" cy="2459990"/>
+            <a:off x="6816725" y="1446530"/>
+            <a:ext cx="2686050" cy="3308985"/>
           </a:xfrm>
           <a:prstGeom prst="roundRect"/>
           <a:solidFill>
@@ -9811,131 +11530,37 @@
           </a:solidFill>
         </p:spPr>
       </p:pic>
-      <p:sp>
-        <p:nvSpPr>
-          <p:cNvPr id="65" name="텍스트 상자 26"/>
-          <p:cNvSpPr txBox="1">
-            <a:spLocks/>
-          </p:cNvSpPr>
-          <p:nvPr/>
-        </p:nvSpPr>
-        <p:spPr>
-          <a:xfrm rot="0">
-            <a:off x="6826885" y="1463675"/>
-            <a:ext cx="4145280" cy="961390"/>
-          </a:xfrm>
-          <a:prstGeom prst="rect"/>
-          <a:noFill/>
-        </p:spPr>
-        <p:txBody>
-          <a:bodyPr wrap="square" lIns="0" tIns="0" rIns="0" bIns="0" vert="horz" anchor="t">
-            <a:noAutofit/>
-          </a:bodyPr>
-          <a:lstStyle/>
-          <a:p>
-            <a:pPr marL="0" indent="0" rtl="0" algn="l" defTabSz="914400" eaLnBrk="1" latinLnBrk="0" hangingPunct="1">
-              <a:buFontTx/>
-              <a:buNone/>
-            </a:pPr>
-            <a:r>
-              <a:rPr sz="1800">
-                <a:latin typeface="맑은 고딕" charset="0"/>
-                <a:ea typeface="맑은 고딕" charset="0"/>
-              </a:rPr>
-              <a:t>Physics.Raycast( )</a:t>
-            </a:r>
-            <a:r>
-              <a:rPr sz="1800">
-                <a:latin typeface="맑은 고딕" charset="0"/>
-                <a:ea typeface="맑은 고딕" charset="0"/>
-              </a:rPr>
-              <a:t> </a:t>
-            </a:r>
-            <a:r>
-              <a:rPr lang="ko-KR" sz="1800">
-                <a:latin typeface="맑은 고딕" charset="0"/>
-                <a:ea typeface="맑은 고딕" charset="0"/>
-              </a:rPr>
-              <a:t>함수로</a:t>
-            </a:r>
-            <a:r>
-              <a:rPr sz="1800">
-                <a:latin typeface="맑은 고딕" charset="0"/>
-                <a:ea typeface="맑은 고딕" charset="0"/>
-              </a:rPr>
-              <a:t> 특정한 Layer만 검출하여 충돌하도록 설정할 수 있습니다.</a:t>
-            </a:r>
-            <a:endParaRPr lang="ko-KR" altLang="en-US" sz="1800">
-              <a:latin typeface="맑은 고딕" charset="0"/>
-              <a:ea typeface="맑은 고딕" charset="0"/>
-            </a:endParaRPr>
-          </a:p>
-          <a:p>
-            <a:pPr marL="0" indent="0" rtl="0" algn="l" defTabSz="914400" eaLnBrk="1" latinLnBrk="0" hangingPunct="1">
-              <a:buFontTx/>
-              <a:buNone/>
-            </a:pPr>
-            <a:endParaRPr lang="ko-KR" altLang="en-US" sz="1800">
-              <a:latin typeface="맑은 고딕" charset="0"/>
-              <a:ea typeface="맑은 고딕" charset="0"/>
-            </a:endParaRPr>
-          </a:p>
-        </p:txBody>
-      </p:sp>
-      <p:sp>
-        <p:nvSpPr>
-          <p:cNvPr id="66" name="텍스트 상자 27"/>
-          <p:cNvSpPr txBox="1">
-            <a:spLocks/>
-          </p:cNvSpPr>
-          <p:nvPr/>
-        </p:nvSpPr>
-        <p:spPr>
-          <a:xfrm rot="0">
-            <a:off x="6812280" y="5274310"/>
-            <a:ext cx="4159885" cy="961390"/>
-          </a:xfrm>
-          <a:prstGeom prst="rect"/>
-          <a:noFill/>
-        </p:spPr>
-        <p:txBody>
-          <a:bodyPr wrap="square" lIns="0" tIns="0" rIns="0" bIns="0" vert="horz" anchor="t">
-            <a:noAutofit/>
-          </a:bodyPr>
-          <a:lstStyle/>
-          <a:p>
-            <a:pPr marL="0" indent="0" rtl="0" algn="l" defTabSz="914400" eaLnBrk="1" latinLnBrk="0" hangingPunct="1">
-              <a:buFontTx/>
-              <a:buNone/>
-            </a:pPr>
-            <a:r>
-              <a:rPr sz="1800">
-                <a:latin typeface="맑은 고딕" charset="0"/>
-                <a:ea typeface="맑은 고딕" charset="0"/>
-              </a:rPr>
-              <a:t>LayerMask의 경우 32 bit의 int 형으로 bit로 각각의 </a:t>
-            </a:r>
-            <a:r>
-              <a:rPr lang="ko-KR" sz="1800">
-                <a:latin typeface="맑은 고딕" charset="0"/>
-                <a:ea typeface="맑은 고딕" charset="0"/>
-              </a:rPr>
-              <a:t>Layer</a:t>
-            </a:r>
-            <a:r>
-              <a:rPr sz="1800">
-                <a:latin typeface="맑은 고딕" charset="0"/>
-                <a:ea typeface="맑은 고딕" charset="0"/>
-              </a:rPr>
-              <a:t>를 구분하여 사용합니다.</a:t>
-            </a:r>
-            <a:endParaRPr lang="ko-KR" altLang="en-US" sz="1800">
-              <a:latin typeface="맑은 고딕" charset="0"/>
-              <a:ea typeface="맑은 고딕" charset="0"/>
-            </a:endParaRPr>
-          </a:p>
-        </p:txBody>
-      </p:sp>
+      <p:pic>
+        <p:nvPicPr>
+          <p:cNvPr id="106" name="그림 19" descr="C:/Users/Admin1/AppData/Roaming/PolarisOffice/ETemp/3976_17614504/fImage99522205724.png"/>
+          <p:cNvPicPr>
+            <a:picLocks noChangeAspect="1"/>
+          </p:cNvPicPr>
+          <p:nvPr/>
+        </p:nvPicPr>
+        <p:blipFill rotWithShape="1">
+          <a:blip r:embed="rId7" cstate="print">
+            <a:extLst>
+              <a:ext uri="{28A0092B-C50C-407E-A947-70E740481C1C}">
+                <a14:useLocalDpi xmlns:a14="http://schemas.microsoft.com/office/drawing/2010/main" val="0"/>
+              </a:ext>
+            </a:extLst>
+          </a:blip>
+          <a:stretch>
+            <a:fillRect/>
+          </a:stretch>
+        </p:blipFill>
+        <p:spPr>
+          <a:xfrm rot="0">
+            <a:off x="9659620" y="2178685"/>
+            <a:ext cx="1281430" cy="2078990"/>
+          </a:xfrm>
+          <a:prstGeom prst="roundRect"/>
+          <a:solidFill>
+            <a:srgbClr val="EDEDED"/>
+          </a:solidFill>
+        </p:spPr>
+      </p:pic>
     </p:spTree>
   </p:cSld>
   <p:clrMapOvr>
@@ -9960,7 +11585,7 @@
 </file>
 
 <file path=ppt/slides/slide9.xml><?xml version="1.0" encoding="utf-8"?>
-<p:sld xmlns:a="http://schemas.openxmlformats.org/drawingml/2006/main" xmlns:r="http://schemas.openxmlformats.org/officeDocument/2006/relationships" xmlns:p="http://schemas.openxmlformats.org/presentationml/2006/main" xmlns:p14="http://schemas.microsoft.com/office/powerpoint/2010/main">
+<p:sld xmlns:a="http://schemas.openxmlformats.org/drawingml/2006/main" xmlns:r="http://schemas.openxmlformats.org/officeDocument/2006/relationships" xmlns:p="http://schemas.openxmlformats.org/presentationml/2006/main">
   <p:cSld>
     <p:spTree>
       <p:nvGrpSpPr>
@@ -9986,8 +11611,8 @@
         </p:nvSpPr>
         <p:spPr>
           <a:xfrm rot="0">
-            <a:off x="4339590" y="441960"/>
-            <a:ext cx="3508375" cy="478155"/>
+            <a:off x="4339590" y="383540"/>
+            <a:ext cx="3524885" cy="478155"/>
           </a:xfrm>
           <a:prstGeom prst="rect"/>
           <a:noFill/>
@@ -10014,7 +11639,17 @@
                 <a:latin typeface="나눔바른고딕" charset="0"/>
                 <a:ea typeface="나눔바른고딕" charset="0"/>
               </a:rPr>
-              <a:t>Space Conversion</a:t>
+              <a:t>아홉</a:t>
+            </a:r>
+            <a:r>
+              <a:rPr lang="ko-KR" sz="2500" b="1">
+                <a:solidFill>
+                  <a:schemeClr val="tx1"/>
+                </a:solidFill>
+                <a:latin typeface="나눔바른고딕" charset="0"/>
+                <a:ea typeface="나눔바른고딕" charset="0"/>
+              </a:rPr>
+              <a:t> 번째 튜토리얼</a:t>
             </a:r>
             <a:endParaRPr lang="ko-KR" altLang="en-US" sz="2500" b="1">
               <a:solidFill>
@@ -10028,7 +11663,7 @@
       </p:sp>
       <p:sp>
         <p:nvSpPr>
-          <p:cNvPr id="3" name="텍스트 상자 9"/>
+          <p:cNvPr id="84" name="Rect 0"/>
           <p:cNvSpPr txBox="1">
             <a:spLocks/>
           </p:cNvSpPr>
@@ -10036,8 +11671,8 @@
         </p:nvSpPr>
         <p:spPr>
           <a:xfrm rot="0">
-            <a:off x="1222375" y="1445895"/>
-            <a:ext cx="4156710" cy="1200785"/>
+            <a:off x="1221105" y="5476875"/>
+            <a:ext cx="4141470" cy="677545"/>
           </a:xfrm>
           <a:prstGeom prst="rect"/>
           <a:noFill/>
@@ -10047,7 +11682,7 @@
           </a:ln>
         </p:spPr>
         <p:txBody>
-          <a:bodyPr wrap="square" lIns="89535" tIns="46355" rIns="89535" bIns="46355" vert="horz" anchor="t">
+          <a:bodyPr wrap="square" lIns="89535" tIns="46355" rIns="89535" bIns="46355" numCol="1" vert="horz" anchor="t">
             <a:spAutoFit/>
           </a:bodyPr>
           <a:lstStyle/>
@@ -10057,13 +11692,53 @@
               <a:buNone/>
             </a:pPr>
             <a:r>
-              <a:rPr sz="1800">
-                <a:latin typeface="맑은 고딕" charset="0"/>
-                <a:ea typeface="맑은 고딕" charset="0"/>
-              </a:rPr>
-              <a:t>ScreenPointToRay( ) 함수는 스크린 공간의 좌표를 월드 공간의 좌표로 변환하여 시작점으로 설정하는 함수입니다. </a:t>
-            </a:r>
-            <a:endParaRPr lang="ko-KR" altLang="en-US" sz="1800">
+              <a:rPr lang="ko-KR" sz="2000" b="1">
+                <a:solidFill>
+                  <a:srgbClr val="0611F2"/>
+                </a:solidFill>
+                <a:latin typeface="맑은 고딕" charset="0"/>
+                <a:ea typeface="맑은 고딕" charset="0"/>
+              </a:rPr>
+              <a:t>26</a:t>
+            </a:r>
+            <a:r>
+              <a:rPr sz="2000" b="1">
+                <a:solidFill>
+                  <a:srgbClr val="0611F2"/>
+                </a:solidFill>
+                <a:latin typeface="맑은 고딕" charset="0"/>
+                <a:ea typeface="맑은 고딕" charset="0"/>
+              </a:rPr>
+              <a:t>. </a:t>
+            </a:r>
+            <a:r>
+              <a:rPr lang="ko-KR" sz="1800">
+                <a:latin typeface="맑은 고딕" charset="0"/>
+                <a:ea typeface="맑은 고딕" charset="0"/>
+              </a:rPr>
+              <a:t>그러고 나서</a:t>
+            </a:r>
+            <a:r>
+              <a:rPr lang="ko-KR" sz="1800">
+                <a:latin typeface="맑은 고딕" charset="0"/>
+                <a:ea typeface="맑은 고딕" charset="0"/>
+              </a:rPr>
+              <a:t> </a:t>
+            </a:r>
+            <a:r>
+              <a:rPr lang="ko-KR" sz="1800" b="0">
+                <a:solidFill>
+                  <a:schemeClr val="tx1"/>
+                </a:solidFill>
+                <a:latin typeface="맑은 고딕" charset="0"/>
+                <a:ea typeface="맑은 고딕" charset="0"/>
+              </a:rPr>
+              <a:t>Screen 오브젝트의 Video Player 컴포넌트를 추가합니다.</a:t>
+            </a:r>
+            <a:endParaRPr lang="ko-KR" altLang="en-US" sz="1800" b="0">
+              <a:solidFill>
+                <a:schemeClr val="tx1"/>
+              </a:solidFill>
               <a:latin typeface="맑은 고딕" charset="0"/>
               <a:ea typeface="맑은 고딕" charset="0"/>
             </a:endParaRPr>
@@ -10072,7 +11747,7 @@
       </p:sp>
       <p:sp>
         <p:nvSpPr>
-          <p:cNvPr id="4" name="텍스트 상자 10"/>
+          <p:cNvPr id="91" name="Rect 0"/>
           <p:cNvSpPr txBox="1">
             <a:spLocks/>
           </p:cNvSpPr>
@@ -10080,8 +11755,8 @@
         </p:nvSpPr>
         <p:spPr>
           <a:xfrm rot="0">
-            <a:off x="1214120" y="5578475"/>
-            <a:ext cx="4156710" cy="647065"/>
+            <a:off x="6797675" y="2790190"/>
+            <a:ext cx="4156710" cy="1231265"/>
           </a:xfrm>
           <a:prstGeom prst="rect"/>
           <a:noFill/>
@@ -10091,7 +11766,7 @@
           </a:ln>
         </p:spPr>
         <p:txBody>
-          <a:bodyPr wrap="square" lIns="89535" tIns="46355" rIns="89535" bIns="46355" vert="horz" anchor="t">
+          <a:bodyPr wrap="square" lIns="89535" tIns="46355" rIns="89535" bIns="46355" numCol="1" vert="horz" anchor="t">
             <a:spAutoFit/>
           </a:bodyPr>
           <a:lstStyle/>
@@ -10101,11 +11776,104 @@
               <a:buNone/>
             </a:pPr>
             <a:r>
-              <a:rPr sz="1800">
-                <a:latin typeface="맑은 고딕" charset="0"/>
-                <a:ea typeface="맑은 고딕" charset="0"/>
-              </a:rPr>
-              <a:t>방향은 카메라가 비추는 방향으로 설정된 광선 객체를 반환합니다.</a:t>
+              <a:rPr lang="ko-KR" sz="2000" b="1">
+                <a:solidFill>
+                  <a:srgbClr val="0611F2"/>
+                </a:solidFill>
+                <a:latin typeface="맑은 고딕" charset="0"/>
+                <a:ea typeface="맑은 고딕" charset="0"/>
+              </a:rPr>
+              <a:t>2</a:t>
+            </a:r>
+            <a:r>
+              <a:rPr lang="ko-KR" sz="2000" b="1">
+                <a:solidFill>
+                  <a:srgbClr val="0611F2"/>
+                </a:solidFill>
+                <a:latin typeface="맑은 고딕" charset="0"/>
+                <a:ea typeface="맑은 고딕" charset="0"/>
+              </a:rPr>
+              <a:t>7</a:t>
+            </a:r>
+            <a:r>
+              <a:rPr sz="2000" b="1">
+                <a:solidFill>
+                  <a:srgbClr val="0611F2"/>
+                </a:solidFill>
+                <a:latin typeface="맑은 고딕" charset="0"/>
+                <a:ea typeface="맑은 고딕" charset="0"/>
+              </a:rPr>
+              <a:t>. </a:t>
+            </a:r>
+            <a:r>
+              <a:rPr lang="ko-KR" sz="1800">
+                <a:latin typeface="맑은 고딕" charset="0"/>
+                <a:ea typeface="맑은 고딕" charset="0"/>
+              </a:rPr>
+              <a:t>이제 </a:t>
+            </a:r>
+            <a:r>
+              <a:rPr lang="ko-KR" sz="1800">
+                <a:latin typeface="맑은 고딕" charset="0"/>
+                <a:ea typeface="맑은 고딕" charset="0"/>
+              </a:rPr>
+              <a:t>Project 폴더 아래에 있는 </a:t>
+            </a:r>
+            <a:r>
+              <a:rPr lang="ko-KR" sz="1800">
+                <a:latin typeface="맑은 고딕" charset="0"/>
+                <a:ea typeface="맑은 고딕" charset="0"/>
+              </a:rPr>
+              <a:t>Video Player </a:t>
+            </a:r>
+            <a:r>
+              <a:rPr lang="ko-KR" sz="1800">
+                <a:latin typeface="맑은 고딕" charset="0"/>
+                <a:ea typeface="맑은 고딕" charset="0"/>
+              </a:rPr>
+              <a:t>폴더에 </a:t>
+            </a:r>
+            <a:r>
+              <a:rPr lang="ko-KR" sz="1800">
+                <a:latin typeface="맑은 고딕" charset="0"/>
+                <a:ea typeface="맑은 고딕" charset="0"/>
+              </a:rPr>
+              <a:t>Game Video</a:t>
+            </a:r>
+            <a:r>
+              <a:rPr lang="ko-KR" sz="1800">
+                <a:latin typeface="맑은 고딕" charset="0"/>
+                <a:ea typeface="맑은 고딕" charset="0"/>
+              </a:rPr>
+              <a:t>를 선택</a:t>
+            </a:r>
+            <a:r>
+              <a:rPr lang="ko-KR" sz="1800">
+                <a:latin typeface="맑은 고딕" charset="0"/>
+                <a:ea typeface="맑은 고딕" charset="0"/>
+              </a:rPr>
+              <a:t>한 다음</a:t>
+            </a:r>
+            <a:r>
+              <a:rPr lang="ko-KR" sz="1800">
+                <a:latin typeface="맑은 고딕" charset="0"/>
+                <a:ea typeface="맑은 고딕" charset="0"/>
+              </a:rPr>
+              <a:t> </a:t>
+            </a:r>
+            <a:r>
+              <a:rPr lang="ko-KR" sz="1800">
+                <a:latin typeface="맑은 고딕" charset="0"/>
+                <a:ea typeface="맑은 고딕" charset="0"/>
+              </a:rPr>
+              <a:t>Screen </a:t>
+            </a:r>
+            <a:r>
+              <a:rPr lang="ko-KR" sz="1800">
+                <a:latin typeface="맑은 고딕" charset="0"/>
+                <a:ea typeface="맑은 고딕" charset="0"/>
+              </a:rPr>
+              <a:t>오브젝트에 넣어줍니다.</a:t>
             </a:r>
             <a:endParaRPr lang="ko-KR" altLang="en-US" sz="1800">
               <a:latin typeface="맑은 고딕" charset="0"/>
@@ -10114,16 +11882,90 @@
           </a:p>
         </p:txBody>
       </p:sp>
+      <p:sp>
+        <p:nvSpPr>
+          <p:cNvPr id="94" name="Rect 0"/>
+          <p:cNvSpPr txBox="1">
+            <a:spLocks/>
+          </p:cNvSpPr>
+          <p:nvPr/>
+        </p:nvSpPr>
+        <p:spPr>
+          <a:xfrm rot="0">
+            <a:off x="1223645" y="3194050"/>
+            <a:ext cx="4147185" cy="677545"/>
+          </a:xfrm>
+          <a:prstGeom prst="rect"/>
+          <a:noFill/>
+          <a:ln w="0">
+            <a:noFill/>
+            <a:prstDash/>
+          </a:ln>
+        </p:spPr>
+        <p:txBody>
+          <a:bodyPr wrap="square" lIns="89535" tIns="46355" rIns="89535" bIns="46355" numCol="1" vert="horz" anchor="t">
+            <a:spAutoFit/>
+          </a:bodyPr>
+          <a:lstStyle/>
+          <a:p>
+            <a:pPr marL="0" indent="0" rtl="0" algn="l" defTabSz="914400" eaLnBrk="1" latinLnBrk="0" hangingPunct="1">
+              <a:buFontTx/>
+              <a:buNone/>
+            </a:pPr>
+            <a:r>
+              <a:rPr lang="ko-KR" sz="2000" b="1">
+                <a:solidFill>
+                  <a:srgbClr val="0611F2"/>
+                </a:solidFill>
+                <a:latin typeface="맑은 고딕" charset="0"/>
+                <a:ea typeface="맑은 고딕" charset="0"/>
+              </a:rPr>
+              <a:t>25</a:t>
+            </a:r>
+            <a:r>
+              <a:rPr sz="2000" b="1">
+                <a:solidFill>
+                  <a:srgbClr val="0611F2"/>
+                </a:solidFill>
+                <a:latin typeface="맑은 고딕" charset="0"/>
+                <a:ea typeface="맑은 고딕" charset="0"/>
+              </a:rPr>
+              <a:t>. </a:t>
+            </a:r>
+            <a:r>
+              <a:rPr lang="ko-KR" sz="1800">
+                <a:latin typeface="맑은 고딕" charset="0"/>
+                <a:ea typeface="맑은 고딕" charset="0"/>
+              </a:rPr>
+              <a:t>그</a:t>
+            </a:r>
+            <a:r>
+              <a:rPr lang="ko-KR" sz="1800">
+                <a:latin typeface="맑은 고딕" charset="0"/>
+                <a:ea typeface="맑은 고딕" charset="0"/>
+              </a:rPr>
+              <a:t>다음 Screen 오브젝트의 위치와 회전 그리고 크기 값을 설정합니다.</a:t>
+            </a:r>
+            <a:endParaRPr lang="ko-KR" altLang="en-US" sz="1800" b="0">
+              <a:solidFill>
+                <a:schemeClr val="tx1"/>
+              </a:solidFill>
+              <a:latin typeface="맑은 고딕" charset="0"/>
+              <a:ea typeface="맑은 고딕" charset="0"/>
+            </a:endParaRPr>
+          </a:p>
+        </p:txBody>
+      </p:sp>
       <p:pic>
         <p:nvPicPr>
-          <p:cNvPr id="6" name="그림 12"/>
+          <p:cNvPr id="108" name="그림 30" descr="C:/Users/Admin1/AppData/Roaming/PolarisOffice/ETemp/3976_17614504/fImage115792351478.png"/>
           <p:cNvPicPr>
             <a:picLocks noChangeAspect="1"/>
           </p:cNvPicPr>
           <p:nvPr/>
         </p:nvPicPr>
         <p:blipFill rotWithShape="1">
-          <a:blip r:embed="rId1" cstate="print">
+          <a:blip r:embed="rId2" cstate="print">
             <a:extLst>
               <a:ext uri="{28A0092B-C50C-407E-A947-70E740481C1C}">
                 <a14:useLocalDpi xmlns:a14="http://schemas.microsoft.com/office/drawing/2010/main" val="0"/>
@@ -10136,8 +11978,8 @@
         </p:blipFill>
         <p:spPr>
           <a:xfrm rot="0">
-            <a:off x="1213485" y="2818130"/>
-            <a:ext cx="4156075" cy="2552700"/>
+            <a:off x="1229995" y="1438275"/>
+            <a:ext cx="4132580" cy="1662430"/>
           </a:xfrm>
           <a:prstGeom prst="roundRect"/>
           <a:solidFill>
@@ -10147,17 +11989,17 @@
       </p:pic>
       <p:pic>
         <p:nvPicPr>
-          <p:cNvPr id="7" name="그림 21"/>
+          <p:cNvPr id="109" name="그림 33" descr="C:/Users/Admin1/AppData/Roaming/PolarisOffice/ETemp/3976_17614504/fImage101942369358.png"/>
           <p:cNvPicPr>
             <a:picLocks noChangeAspect="1"/>
           </p:cNvPicPr>
           <p:nvPr/>
         </p:nvPicPr>
         <p:blipFill rotWithShape="1">
-          <a:blip r:embed="rId2" cstate="hqprint">
+          <a:blip r:embed="rId3" cstate="print">
             <a:extLst>
               <a:ext uri="{28A0092B-C50C-407E-A947-70E740481C1C}">
-                <a14:useLocalDpi xmlns:a14="http://schemas.microsoft.com/office/drawing/2010/main"/>
+                <a14:useLocalDpi xmlns:a14="http://schemas.microsoft.com/office/drawing/2010/main" val="0"/>
               </a:ext>
             </a:extLst>
           </a:blip>
@@ -10167,8 +12009,8 @@
         </p:blipFill>
         <p:spPr>
           <a:xfrm rot="0">
-            <a:off x="6816725" y="2875915"/>
-            <a:ext cx="4149090" cy="1965325"/>
+            <a:off x="8239125" y="1445895"/>
+            <a:ext cx="2710180" cy="1223010"/>
           </a:xfrm>
           <a:prstGeom prst="roundRect"/>
           <a:solidFill>
@@ -10176,9 +12018,166 @@
           </a:solidFill>
         </p:spPr>
       </p:pic>
+      <p:pic>
+        <p:nvPicPr>
+          <p:cNvPr id="112" name="그림 38" descr="C:/Users/Admin1/AppData/Roaming/PolarisOffice/ETemp/3976_17614504/fImage35882466962.png"/>
+          <p:cNvPicPr>
+            <a:picLocks noChangeAspect="1"/>
+          </p:cNvPicPr>
+          <p:nvPr/>
+        </p:nvPicPr>
+        <p:blipFill rotWithShape="1">
+          <a:blip r:embed="rId4" cstate="print">
+            <a:extLst>
+              <a:ext uri="{28A0092B-C50C-407E-A947-70E740481C1C}">
+                <a14:useLocalDpi xmlns:a14="http://schemas.microsoft.com/office/drawing/2010/main" val="0"/>
+              </a:ext>
+            </a:extLst>
+          </a:blip>
+          <a:stretch>
+            <a:fillRect/>
+          </a:stretch>
+        </p:blipFill>
+        <p:spPr>
+          <a:xfrm rot="0">
+            <a:off x="1221105" y="4008755"/>
+            <a:ext cx="4139565" cy="1351280"/>
+          </a:xfrm>
+          <a:prstGeom prst="roundRect"/>
+          <a:solidFill>
+            <a:srgbClr val="EDEDED"/>
+          </a:solidFill>
+        </p:spPr>
+      </p:pic>
+      <p:pic>
+        <p:nvPicPr>
+          <p:cNvPr id="113" name="그림 42" descr="C:/Users/Admin1/AppData/Roaming/PolarisOffice/ETemp/3976_17614504/fImage99522484464.png"/>
+          <p:cNvPicPr>
+            <a:picLocks noChangeAspect="1"/>
+          </p:cNvPicPr>
+          <p:nvPr/>
+        </p:nvPicPr>
+        <p:blipFill rotWithShape="1">
+          <a:blip r:embed="rId5" cstate="print">
+            <a:extLst>
+              <a:ext uri="{28A0092B-C50C-407E-A947-70E740481C1C}">
+                <a14:useLocalDpi xmlns:a14="http://schemas.microsoft.com/office/drawing/2010/main" val="0"/>
+              </a:ext>
+            </a:extLst>
+          </a:blip>
+          <a:stretch>
+            <a:fillRect/>
+          </a:stretch>
+        </p:blipFill>
+        <p:spPr>
+          <a:xfrm rot="0">
+            <a:off x="6806565" y="1451610"/>
+            <a:ext cx="1346200" cy="1224915"/>
+          </a:xfrm>
+          <a:prstGeom prst="roundRect"/>
+          <a:solidFill>
+            <a:srgbClr val="EDEDED"/>
+          </a:solidFill>
+        </p:spPr>
+      </p:pic>
+      <p:cxnSp>
+        <p:nvCxnSpPr>
+          <p:cNvPr id="111" name="도형 37"/>
+          <p:cNvCxnSpPr/>
+          <p:nvPr/>
+        </p:nvCxnSpPr>
+        <p:spPr>
+          <a:xfrm rot="0" flipH="1">
+            <a:off x="7715250" y="2147570"/>
+            <a:ext cx="615950" cy="416560"/>
+          </a:xfrm>
+          <a:prstGeom prst="straightConnector1"/>
+          <a:ln w="6350" cap="flat" cmpd="sng">
+            <a:prstDash/>
+            <a:headEnd type="none" w="med" len="med"/>
+            <a:tailEnd type="triangle" w="med" len="med"/>
+          </a:ln>
+        </p:spPr>
+        <p:style>
+          <a:lnRef idx="1">
+            <a:schemeClr val="accent1"/>
+          </a:lnRef>
+          <a:fillRef idx="0">
+            <a:schemeClr val="accent1"/>
+          </a:fillRef>
+          <a:effectRef idx="0">
+            <a:schemeClr val="accent1"/>
+          </a:effectRef>
+          <a:fontRef idx="minor">
+            <a:schemeClr val="tx1"/>
+          </a:fontRef>
+        </p:style>
+      </p:cxnSp>
+      <p:pic>
+        <p:nvPicPr>
+          <p:cNvPr id="114" name="그림 46" descr="C:/Users/Admin1/AppData/Roaming/PolarisOffice/ETemp/3976_17614504/fImage50792505705.png"/>
+          <p:cNvPicPr>
+            <a:picLocks noChangeAspect="1"/>
+          </p:cNvPicPr>
+          <p:nvPr/>
+        </p:nvPicPr>
+        <p:blipFill rotWithShape="1">
+          <a:blip r:embed="rId6" cstate="print">
+            <a:extLst>
+              <a:ext uri="{28A0092B-C50C-407E-A947-70E740481C1C}">
+                <a14:useLocalDpi xmlns:a14="http://schemas.microsoft.com/office/drawing/2010/main" val="0"/>
+              </a:ext>
+            </a:extLst>
+          </a:blip>
+          <a:stretch>
+            <a:fillRect/>
+          </a:stretch>
+        </p:blipFill>
+        <p:spPr>
+          <a:xfrm rot="0">
+            <a:off x="8243570" y="4147820"/>
+            <a:ext cx="2710815" cy="1212850"/>
+          </a:xfrm>
+          <a:prstGeom prst="roundRect"/>
+          <a:solidFill>
+            <a:srgbClr val="EDEDED"/>
+          </a:solidFill>
+        </p:spPr>
+      </p:pic>
+      <p:pic>
+        <p:nvPicPr>
+          <p:cNvPr id="115" name="그림 49" descr="C:/Users/Admin1/AppData/Roaming/PolarisOffice/ETemp/3976_17614504/fImage80282518145.png"/>
+          <p:cNvPicPr>
+            <a:picLocks noChangeAspect="1"/>
+          </p:cNvPicPr>
+          <p:nvPr/>
+        </p:nvPicPr>
+        <p:blipFill rotWithShape="1">
+          <a:blip r:embed="rId7" cstate="print">
+            <a:extLst>
+              <a:ext uri="{28A0092B-C50C-407E-A947-70E740481C1C}">
+                <a14:useLocalDpi xmlns:a14="http://schemas.microsoft.com/office/drawing/2010/main" val="0"/>
+              </a:ext>
+            </a:extLst>
+          </a:blip>
+          <a:stretch>
+            <a:fillRect/>
+          </a:stretch>
+        </p:blipFill>
+        <p:spPr>
+          <a:xfrm rot="0">
+            <a:off x="6797675" y="4147820"/>
+            <a:ext cx="1343025" cy="1216025"/>
+          </a:xfrm>
+          <a:prstGeom prst="roundRect"/>
+          <a:solidFill>
+            <a:srgbClr val="EDEDED"/>
+          </a:solidFill>
+        </p:spPr>
+      </p:pic>
       <p:sp>
         <p:nvSpPr>
-          <p:cNvPr id="8" name="텍스트 상자 22"/>
+          <p:cNvPr id="116" name="텍스트 상자 50"/>
           <p:cNvSpPr txBox="1">
             <a:spLocks/>
           </p:cNvSpPr>
@@ -10186,8 +12185,8 @@
         </p:nvSpPr>
         <p:spPr>
           <a:xfrm rot="0">
-            <a:off x="6816725" y="1457325"/>
-            <a:ext cx="4140835" cy="1200785"/>
+            <a:off x="6800215" y="5477510"/>
+            <a:ext cx="4154170" cy="677545"/>
           </a:xfrm>
           <a:prstGeom prst="rect"/>
           <a:noFill/>
@@ -10207,71 +12206,41 @@
               <a:buNone/>
             </a:pPr>
             <a:r>
-              <a:rPr lang="ko-KR" sz="1800" b="0">
+              <a:rPr lang="ko-KR" sz="2000" b="1">
                 <a:solidFill>
-                  <a:schemeClr val="tx1"/>
+                  <a:srgbClr val="0611F2"/>
                 </a:solidFill>
                 <a:latin typeface="맑은 고딕" charset="0"/>
                 <a:ea typeface="맑은 고딕" charset="0"/>
               </a:rPr>
-              <a:t>스크린 공간에서 </a:t>
-            </a:r>
-            <a:r>
-              <a:rPr lang="ko-KR" sz="1800" b="0">
+              <a:t>2</a:t>
+            </a:r>
+            <a:r>
+              <a:rPr lang="ko-KR" sz="2000" b="1">
                 <a:solidFill>
-                  <a:schemeClr val="tx1"/>
+                  <a:srgbClr val="0611F2"/>
                 </a:solidFill>
                 <a:latin typeface="맑은 고딕" charset="0"/>
                 <a:ea typeface="맑은 고딕" charset="0"/>
               </a:rPr>
-              <a:t>마우스를 입력했을 때 지정된 좌표 정보를 월드 공간의 위치로 변환한 다음 게임 오브젝트의 위치로 설정합니다. </a:t>
-            </a:r>
-            <a:endParaRPr lang="ko-KR" altLang="en-US" sz="1800" b="0">
-              <a:solidFill>
-                <a:schemeClr val="tx1"/>
-              </a:solidFill>
-              <a:latin typeface="맑은 고딕" charset="0"/>
-              <a:ea typeface="맑은 고딕" charset="0"/>
-            </a:endParaRPr>
-          </a:p>
-        </p:txBody>
-      </p:sp>
-      <p:sp>
-        <p:nvSpPr>
-          <p:cNvPr id="9" name="텍스트 상자 23"/>
-          <p:cNvSpPr txBox="1">
-            <a:spLocks/>
-          </p:cNvSpPr>
-          <p:nvPr/>
-        </p:nvSpPr>
-        <p:spPr>
-          <a:xfrm rot="0">
-            <a:off x="6814820" y="5028565"/>
-            <a:ext cx="4142740" cy="1200785"/>
-          </a:xfrm>
-          <a:prstGeom prst="rect"/>
-          <a:noFill/>
-          <a:ln w="0">
-            <a:noFill/>
-            <a:prstDash/>
-          </a:ln>
-        </p:spPr>
-        <p:txBody>
-          <a:bodyPr wrap="square" lIns="89535" tIns="46355" rIns="89535" bIns="46355" numCol="1" vert="horz" anchor="t">
-            <a:spAutoFit/>
-          </a:bodyPr>
-          <a:lstStyle/>
-          <a:p>
-            <a:pPr marL="0" indent="0" rtl="0" algn="l" defTabSz="914400" eaLnBrk="1" latinLnBrk="0" hangingPunct="1">
-              <a:buFontTx/>
-              <a:buNone/>
-            </a:pPr>
-            <a:r>
-              <a:rPr sz="1800">
-                <a:latin typeface="맑은 고딕" charset="0"/>
-                <a:ea typeface="맑은 고딕" charset="0"/>
-              </a:rPr>
-              <a:t>3차원 공간에서 마우스로 게임 오브젝트를 선택하려면 스크린 공간의 위치를 월드 공간의 위치로 변환해주어야 합니다.</a:t>
+              <a:t>8</a:t>
+            </a:r>
+            <a:r>
+              <a:rPr sz="2000" b="1">
+                <a:solidFill>
+                  <a:srgbClr val="0611F2"/>
+                </a:solidFill>
+                <a:latin typeface="맑은 고딕" charset="0"/>
+                <a:ea typeface="맑은 고딕" charset="0"/>
+              </a:rPr>
+              <a:t>. </a:t>
+            </a:r>
+            <a:r>
+              <a:rPr lang="ko-KR" sz="1800">
+                <a:latin typeface="맑은 고딕" charset="0"/>
+                <a:ea typeface="맑은 고딕" charset="0"/>
+              </a:rPr>
+              <a:t>그다음 HD TV 오브젝트에 Sphere Collideer 컴포넌트를 추가합니다.</a:t>
             </a:r>
             <a:endParaRPr lang="ko-KR" altLang="en-US" sz="1800">
               <a:latin typeface="맑은 고딕" charset="0"/>

</xml_diff>